<commit_message>
plot gemeinden, die schon ausgezählt sind
</commit_message>
<xml_diff>
--- a/report/presentation.pptx
+++ b/report/presentation.pptx
@@ -6,8 +6,14 @@
   </p:sldMasterIdLst>
   <p:sldIdLst>
     <p:sldId id="256" r:id="rId2"/>
-    <p:sldId id="257" r:id="rId3"/>
-    <p:sldId id="258" r:id="rId4"/>
+    <p:sldId id="259" r:id="rId3"/>
+    <p:sldId id="260" r:id="rId4"/>
+    <p:sldId id="261" r:id="rId5"/>
+    <p:sldId id="264" r:id="rId6"/>
+    <p:sldId id="262" r:id="rId7"/>
+    <p:sldId id="257" r:id="rId8"/>
+    <p:sldId id="263" r:id="rId9"/>
+    <p:sldId id="258" r:id="rId10"/>
   </p:sldIdLst>
   <p:sldSz cx="12192000" cy="6858000"/>
   <p:notesSz cx="6858000" cy="9144000"/>
@@ -106,13 +112,18 @@
       </a:defRPr>
     </a:lvl9pPr>
   </p:defaultTextStyle>
+  <p:extLst>
+    <p:ext uri="{EFAFB233-063F-42B5-8137-9DF3F51BA10A}">
+      <p15:sldGuideLst xmlns:p15="http://schemas.microsoft.com/office/powerpoint/2012/main"/>
+    </p:ext>
+  </p:extLst>
 </p:presentation>
 </file>
 
 <file path=ppt/revisionInfo.xml><?xml version="1.0" encoding="utf-8"?>
 <p1510:revInfo xmlns:a="http://schemas.openxmlformats.org/drawingml/2006/main" xmlns:r="http://schemas.openxmlformats.org/officeDocument/2006/relationships" xmlns:p1510="http://schemas.microsoft.com/office/powerpoint/2015/10/main">
   <p1510:revLst>
-    <p1510:client id="{26A58844-2FB7-4F90-9501-5CC089926BE8}" v="6" dt="2025-01-27T10:11:33.826"/>
+    <p1510:client id="{26A58844-2FB7-4F90-9501-5CC089926BE8}" v="8" dt="2025-01-27T10:36:05.771"/>
   </p1510:revLst>
 </p1510:revInfo>
 </file>
@@ -121,8 +132,8 @@
 <pc:chgInfo xmlns:a="http://schemas.openxmlformats.org/drawingml/2006/main" xmlns:r="http://schemas.openxmlformats.org/officeDocument/2006/relationships" xmlns:ac="http://schemas.microsoft.com/office/drawing/2013/main/command" xmlns:pc="http://schemas.microsoft.com/office/powerpoint/2013/main/command">
   <pc:docChgLst>
     <pc:chgData name="Himmelbauer, Clara" userId="12d7e35a-e13e-4c49-b9be-a181bf83ad46" providerId="ADAL" clId="{26A58844-2FB7-4F90-9501-5CC089926BE8}"/>
-    <pc:docChg chg="addSld modSld">
-      <pc:chgData name="Himmelbauer, Clara" userId="12d7e35a-e13e-4c49-b9be-a181bf83ad46" providerId="ADAL" clId="{26A58844-2FB7-4F90-9501-5CC089926BE8}" dt="2025-01-27T10:11:59.892" v="121" actId="20577"/>
+    <pc:docChg chg="custSel addSld modSld">
+      <pc:chgData name="Himmelbauer, Clara" userId="12d7e35a-e13e-4c49-b9be-a181bf83ad46" providerId="ADAL" clId="{26A58844-2FB7-4F90-9501-5CC089926BE8}" dt="2025-01-27T10:36:05.771" v="631" actId="5736"/>
       <pc:docMkLst>
         <pc:docMk/>
       </pc:docMkLst>
@@ -150,7 +161,7 @@
         </pc:spChg>
       </pc:sldChg>
       <pc:sldChg chg="addSp delSp modSp new mod">
-        <pc:chgData name="Himmelbauer, Clara" userId="12d7e35a-e13e-4c49-b9be-a181bf83ad46" providerId="ADAL" clId="{26A58844-2FB7-4F90-9501-5CC089926BE8}" dt="2025-01-27T10:11:39.634" v="66" actId="20577"/>
+        <pc:chgData name="Himmelbauer, Clara" userId="12d7e35a-e13e-4c49-b9be-a181bf83ad46" providerId="ADAL" clId="{26A58844-2FB7-4F90-9501-5CC089926BE8}" dt="2025-01-27T10:36:05.771" v="631" actId="5736"/>
         <pc:sldMkLst>
           <pc:docMk/>
           <pc:sldMk cId="4171298435" sldId="257"/>
@@ -180,7 +191,7 @@
           </ac:graphicFrameMkLst>
         </pc:graphicFrameChg>
         <pc:graphicFrameChg chg="add mod">
-          <ac:chgData name="Himmelbauer, Clara" userId="12d7e35a-e13e-4c49-b9be-a181bf83ad46" providerId="ADAL" clId="{26A58844-2FB7-4F90-9501-5CC089926BE8}" dt="2025-01-27T10:11:28.491" v="38" actId="403"/>
+          <ac:chgData name="Himmelbauer, Clara" userId="12d7e35a-e13e-4c49-b9be-a181bf83ad46" providerId="ADAL" clId="{26A58844-2FB7-4F90-9501-5CC089926BE8}" dt="2025-01-27T10:36:05.771" v="631" actId="5736"/>
           <ac:graphicFrameMkLst>
             <pc:docMk/>
             <pc:sldMk cId="4171298435" sldId="257"/>
@@ -189,7 +200,7 @@
         </pc:graphicFrameChg>
       </pc:sldChg>
       <pc:sldChg chg="modSp new mod">
-        <pc:chgData name="Himmelbauer, Clara" userId="12d7e35a-e13e-4c49-b9be-a181bf83ad46" providerId="ADAL" clId="{26A58844-2FB7-4F90-9501-5CC089926BE8}" dt="2025-01-27T10:11:44.810" v="74" actId="20577"/>
+        <pc:chgData name="Himmelbauer, Clara" userId="12d7e35a-e13e-4c49-b9be-a181bf83ad46" providerId="ADAL" clId="{26A58844-2FB7-4F90-9501-5CC089926BE8}" dt="2025-01-27T10:34:59.625" v="594" actId="20577"/>
         <pc:sldMkLst>
           <pc:docMk/>
           <pc:sldMk cId="1720390971" sldId="258"/>
@@ -200,6 +211,112 @@
             <pc:docMk/>
             <pc:sldMk cId="1720390971" sldId="258"/>
             <ac:spMk id="2" creationId="{E598A848-6A90-634E-F347-3421E1503D22}"/>
+          </ac:spMkLst>
+        </pc:spChg>
+        <pc:spChg chg="mod">
+          <ac:chgData name="Himmelbauer, Clara" userId="12d7e35a-e13e-4c49-b9be-a181bf83ad46" providerId="ADAL" clId="{26A58844-2FB7-4F90-9501-5CC089926BE8}" dt="2025-01-27T10:34:59.625" v="594" actId="20577"/>
+          <ac:spMkLst>
+            <pc:docMk/>
+            <pc:sldMk cId="1720390971" sldId="258"/>
+            <ac:spMk id="3" creationId="{1FA04347-D704-73DD-249E-ACCB8AB8D9EB}"/>
+          </ac:spMkLst>
+        </pc:spChg>
+      </pc:sldChg>
+      <pc:sldChg chg="modSp new mod">
+        <pc:chgData name="Himmelbauer, Clara" userId="12d7e35a-e13e-4c49-b9be-a181bf83ad46" providerId="ADAL" clId="{26A58844-2FB7-4F90-9501-5CC089926BE8}" dt="2025-01-27T10:32:17.938" v="147" actId="20577"/>
+        <pc:sldMkLst>
+          <pc:docMk/>
+          <pc:sldMk cId="492563053" sldId="259"/>
+        </pc:sldMkLst>
+        <pc:spChg chg="mod">
+          <ac:chgData name="Himmelbauer, Clara" userId="12d7e35a-e13e-4c49-b9be-a181bf83ad46" providerId="ADAL" clId="{26A58844-2FB7-4F90-9501-5CC089926BE8}" dt="2025-01-27T10:32:17.938" v="147" actId="20577"/>
+          <ac:spMkLst>
+            <pc:docMk/>
+            <pc:sldMk cId="492563053" sldId="259"/>
+            <ac:spMk id="2" creationId="{1E4605C5-5701-3037-3C04-C8942A8964E0}"/>
+          </ac:spMkLst>
+        </pc:spChg>
+      </pc:sldChg>
+      <pc:sldChg chg="modSp new mod">
+        <pc:chgData name="Himmelbauer, Clara" userId="12d7e35a-e13e-4c49-b9be-a181bf83ad46" providerId="ADAL" clId="{26A58844-2FB7-4F90-9501-5CC089926BE8}" dt="2025-01-27T10:32:25.398" v="166" actId="20577"/>
+        <pc:sldMkLst>
+          <pc:docMk/>
+          <pc:sldMk cId="2475301093" sldId="260"/>
+        </pc:sldMkLst>
+        <pc:spChg chg="mod">
+          <ac:chgData name="Himmelbauer, Clara" userId="12d7e35a-e13e-4c49-b9be-a181bf83ad46" providerId="ADAL" clId="{26A58844-2FB7-4F90-9501-5CC089926BE8}" dt="2025-01-27T10:32:25.398" v="166" actId="20577"/>
+          <ac:spMkLst>
+            <pc:docMk/>
+            <pc:sldMk cId="2475301093" sldId="260"/>
+            <ac:spMk id="2" creationId="{DFE68D6C-E9A8-08F2-72B8-C51F4075EB7A}"/>
+          </ac:spMkLst>
+        </pc:spChg>
+      </pc:sldChg>
+      <pc:sldChg chg="modSp new mod">
+        <pc:chgData name="Himmelbauer, Clara" userId="12d7e35a-e13e-4c49-b9be-a181bf83ad46" providerId="ADAL" clId="{26A58844-2FB7-4F90-9501-5CC089926BE8}" dt="2025-01-27T10:32:34.229" v="208" actId="20577"/>
+        <pc:sldMkLst>
+          <pc:docMk/>
+          <pc:sldMk cId="2183538183" sldId="261"/>
+        </pc:sldMkLst>
+        <pc:spChg chg="mod">
+          <ac:chgData name="Himmelbauer, Clara" userId="12d7e35a-e13e-4c49-b9be-a181bf83ad46" providerId="ADAL" clId="{26A58844-2FB7-4F90-9501-5CC089926BE8}" dt="2025-01-27T10:32:34.229" v="208" actId="20577"/>
+          <ac:spMkLst>
+            <pc:docMk/>
+            <pc:sldMk cId="2183538183" sldId="261"/>
+            <ac:spMk id="2" creationId="{BA8B69C5-C240-88A4-BD48-850C48BE733B}"/>
+          </ac:spMkLst>
+        </pc:spChg>
+      </pc:sldChg>
+      <pc:sldChg chg="modSp new mod">
+        <pc:chgData name="Himmelbauer, Clara" userId="12d7e35a-e13e-4c49-b9be-a181bf83ad46" providerId="ADAL" clId="{26A58844-2FB7-4F90-9501-5CC089926BE8}" dt="2025-01-27T10:33:02.685" v="254" actId="20577"/>
+        <pc:sldMkLst>
+          <pc:docMk/>
+          <pc:sldMk cId="4082787262" sldId="262"/>
+        </pc:sldMkLst>
+        <pc:spChg chg="mod">
+          <ac:chgData name="Himmelbauer, Clara" userId="12d7e35a-e13e-4c49-b9be-a181bf83ad46" providerId="ADAL" clId="{26A58844-2FB7-4F90-9501-5CC089926BE8}" dt="2025-01-27T10:33:02.685" v="254" actId="20577"/>
+          <ac:spMkLst>
+            <pc:docMk/>
+            <pc:sldMk cId="4082787262" sldId="262"/>
+            <ac:spMk id="2" creationId="{AB4F34F2-FD1A-FC57-D53E-8A5C1321C35A}"/>
+          </ac:spMkLst>
+        </pc:spChg>
+      </pc:sldChg>
+      <pc:sldChg chg="modSp new mod">
+        <pc:chgData name="Himmelbauer, Clara" userId="12d7e35a-e13e-4c49-b9be-a181bf83ad46" providerId="ADAL" clId="{26A58844-2FB7-4F90-9501-5CC089926BE8}" dt="2025-01-27T10:34:47.460" v="559" actId="20577"/>
+        <pc:sldMkLst>
+          <pc:docMk/>
+          <pc:sldMk cId="2842475990" sldId="263"/>
+        </pc:sldMkLst>
+        <pc:spChg chg="mod">
+          <ac:chgData name="Himmelbauer, Clara" userId="12d7e35a-e13e-4c49-b9be-a181bf83ad46" providerId="ADAL" clId="{26A58844-2FB7-4F90-9501-5CC089926BE8}" dt="2025-01-27T10:33:07.570" v="268" actId="20577"/>
+          <ac:spMkLst>
+            <pc:docMk/>
+            <pc:sldMk cId="2842475990" sldId="263"/>
+            <ac:spMk id="2" creationId="{332DC837-2141-5975-411F-A47B8BE2D2C2}"/>
+          </ac:spMkLst>
+        </pc:spChg>
+        <pc:spChg chg="mod">
+          <ac:chgData name="Himmelbauer, Clara" userId="12d7e35a-e13e-4c49-b9be-a181bf83ad46" providerId="ADAL" clId="{26A58844-2FB7-4F90-9501-5CC089926BE8}" dt="2025-01-27T10:34:47.460" v="559" actId="20577"/>
+          <ac:spMkLst>
+            <pc:docMk/>
+            <pc:sldMk cId="2842475990" sldId="263"/>
+            <ac:spMk id="3" creationId="{84B95D0F-A849-7CA7-C56E-8B67EAE5CCEA}"/>
+          </ac:spMkLst>
+        </pc:spChg>
+      </pc:sldChg>
+      <pc:sldChg chg="modSp new mod">
+        <pc:chgData name="Himmelbauer, Clara" userId="12d7e35a-e13e-4c49-b9be-a181bf83ad46" providerId="ADAL" clId="{26A58844-2FB7-4F90-9501-5CC089926BE8}" dt="2025-01-27T10:35:21.864" v="630" actId="20577"/>
+        <pc:sldMkLst>
+          <pc:docMk/>
+          <pc:sldMk cId="2130042208" sldId="264"/>
+        </pc:sldMkLst>
+        <pc:spChg chg="mod">
+          <ac:chgData name="Himmelbauer, Clara" userId="12d7e35a-e13e-4c49-b9be-a181bf83ad46" providerId="ADAL" clId="{26A58844-2FB7-4F90-9501-5CC089926BE8}" dt="2025-01-27T10:35:21.864" v="630" actId="20577"/>
+          <ac:spMkLst>
+            <pc:docMk/>
+            <pc:sldMk cId="2130042208" sldId="264"/>
+            <ac:spMk id="2" creationId="{B0F12AB1-0276-235A-A78F-AC7C856D3ABB}"/>
           </ac:spMkLst>
         </pc:spChg>
       </pc:sldChg>
@@ -4452,7 +4569,7 @@
           <p:cNvPr id="2" name="Titel 1">
             <a:extLst>
               <a:ext uri="{FF2B5EF4-FFF2-40B4-BE49-F238E27FC236}">
-                <a16:creationId xmlns:a16="http://schemas.microsoft.com/office/drawing/2014/main" id="{BB36368B-FAB8-C20B-35F4-757B95A5D4EF}"/>
+                <a16:creationId xmlns:a16="http://schemas.microsoft.com/office/drawing/2014/main" id="{1E4605C5-5701-3037-3C04-C8942A8964E0}"/>
               </a:ext>
             </a:extLst>
           </p:cNvPr>
@@ -4470,47 +4587,41 @@
           <a:p>
             <a:r>
               <a:rPr lang="de-DE" dirty="0"/>
-              <a:t>Ziel: Urnenwahlergebnis NRW 2024</a:t>
+              <a:t>Was ist eine Hochrechnung</a:t>
             </a:r>
             <a:endParaRPr lang="de-AT" dirty="0"/>
           </a:p>
         </p:txBody>
       </p:sp>
-      <p:graphicFrame>
-        <p:nvGraphicFramePr>
-          <p:cNvPr id="5" name="Inhaltsplatzhalter 4">
-            <a:extLst>
-              <a:ext uri="{FF2B5EF4-FFF2-40B4-BE49-F238E27FC236}">
-                <a16:creationId xmlns:a16="http://schemas.microsoft.com/office/drawing/2014/main" id="{0B7A5EA3-4E87-D48C-6EF1-E98D90806FEE}"/>
-              </a:ext>
-            </a:extLst>
-          </p:cNvPr>
-          <p:cNvGraphicFramePr>
-            <a:graphicFrameLocks noGrp="1"/>
-          </p:cNvGraphicFramePr>
+      <p:sp>
+        <p:nvSpPr>
+          <p:cNvPr id="3" name="Inhaltsplatzhalter 2">
+            <a:extLst>
+              <a:ext uri="{FF2B5EF4-FFF2-40B4-BE49-F238E27FC236}">
+                <a16:creationId xmlns:a16="http://schemas.microsoft.com/office/drawing/2014/main" id="{0226F2C6-85B6-6062-A2C7-E4F57EE7EB2C}"/>
+              </a:ext>
+            </a:extLst>
+          </p:cNvPr>
+          <p:cNvSpPr>
+            <a:spLocks noGrp="1"/>
+          </p:cNvSpPr>
           <p:nvPr>
             <p:ph idx="1"/>
-            <p:extLst>
-              <p:ext uri="{D42A27DB-BD31-4B8C-83A1-F6EECF244321}">
-                <p14:modId xmlns:p14="http://schemas.microsoft.com/office/powerpoint/2010/main" val="3731833475"/>
-              </p:ext>
-            </p:extLst>
-          </p:nvPr>
-        </p:nvGraphicFramePr>
-        <p:xfrm>
-          <a:off x="838200" y="1825625"/>
-          <a:ext cx="10515600" cy="4351338"/>
-        </p:xfrm>
-        <a:graphic>
-          <a:graphicData uri="http://schemas.openxmlformats.org/drawingml/2006/chart">
-            <c:chart xmlns:c="http://schemas.openxmlformats.org/drawingml/2006/chart" xmlns:r="http://schemas.openxmlformats.org/officeDocument/2006/relationships" r:id="rId2"/>
-          </a:graphicData>
-        </a:graphic>
-      </p:graphicFrame>
+          </p:nvPr>
+        </p:nvSpPr>
+        <p:spPr/>
+        <p:txBody>
+          <a:bodyPr/>
+          <a:lstStyle/>
+          <a:p>
+            <a:endParaRPr lang="de-AT" dirty="0"/>
+          </a:p>
+        </p:txBody>
+      </p:sp>
     </p:spTree>
     <p:extLst>
       <p:ext uri="{BB962C8B-B14F-4D97-AF65-F5344CB8AC3E}">
-        <p14:creationId xmlns:p14="http://schemas.microsoft.com/office/powerpoint/2010/main" val="4171298435"/>
+        <p14:creationId xmlns:p14="http://schemas.microsoft.com/office/powerpoint/2010/main" val="492563053"/>
       </p:ext>
     </p:extLst>
   </p:cSld>
@@ -4542,6 +4653,552 @@
           <p:cNvPr id="2" name="Titel 1">
             <a:extLst>
               <a:ext uri="{FF2B5EF4-FFF2-40B4-BE49-F238E27FC236}">
+                <a16:creationId xmlns:a16="http://schemas.microsoft.com/office/drawing/2014/main" id="{DFE68D6C-E9A8-08F2-72B8-C51F4075EB7A}"/>
+              </a:ext>
+            </a:extLst>
+          </p:cNvPr>
+          <p:cNvSpPr>
+            <a:spLocks noGrp="1"/>
+          </p:cNvSpPr>
+          <p:nvPr>
+            <p:ph type="title"/>
+          </p:nvPr>
+        </p:nvSpPr>
+        <p:spPr/>
+        <p:txBody>
+          <a:bodyPr/>
+          <a:lstStyle/>
+          <a:p>
+            <a:r>
+              <a:rPr lang="de-DE" dirty="0"/>
+              <a:t>Lineare Funktionen</a:t>
+            </a:r>
+            <a:endParaRPr lang="de-AT" dirty="0"/>
+          </a:p>
+        </p:txBody>
+      </p:sp>
+      <p:sp>
+        <p:nvSpPr>
+          <p:cNvPr id="3" name="Inhaltsplatzhalter 2">
+            <a:extLst>
+              <a:ext uri="{FF2B5EF4-FFF2-40B4-BE49-F238E27FC236}">
+                <a16:creationId xmlns:a16="http://schemas.microsoft.com/office/drawing/2014/main" id="{8B4F73BC-6221-7151-9E3D-A10E327370F1}"/>
+              </a:ext>
+            </a:extLst>
+          </p:cNvPr>
+          <p:cNvSpPr>
+            <a:spLocks noGrp="1"/>
+          </p:cNvSpPr>
+          <p:nvPr>
+            <p:ph idx="1"/>
+          </p:nvPr>
+        </p:nvSpPr>
+        <p:spPr/>
+        <p:txBody>
+          <a:bodyPr/>
+          <a:lstStyle/>
+          <a:p>
+            <a:endParaRPr lang="de-AT"/>
+          </a:p>
+        </p:txBody>
+      </p:sp>
+    </p:spTree>
+    <p:extLst>
+      <p:ext uri="{BB962C8B-B14F-4D97-AF65-F5344CB8AC3E}">
+        <p14:creationId xmlns:p14="http://schemas.microsoft.com/office/powerpoint/2010/main" val="2475301093"/>
+      </p:ext>
+    </p:extLst>
+  </p:cSld>
+  <p:clrMapOvr>
+    <a:masterClrMapping/>
+  </p:clrMapOvr>
+</p:sld>
+</file>
+
+<file path=ppt/slides/slide4.xml><?xml version="1.0" encoding="utf-8"?>
+<p:sld xmlns:a="http://schemas.openxmlformats.org/drawingml/2006/main" xmlns:r="http://schemas.openxmlformats.org/officeDocument/2006/relationships" xmlns:p="http://schemas.openxmlformats.org/presentationml/2006/main">
+  <p:cSld>
+    <p:spTree>
+      <p:nvGrpSpPr>
+        <p:cNvPr id="1" name=""/>
+        <p:cNvGrpSpPr/>
+        <p:nvPr/>
+      </p:nvGrpSpPr>
+      <p:grpSpPr>
+        <a:xfrm>
+          <a:off x="0" y="0"/>
+          <a:ext cx="0" cy="0"/>
+          <a:chOff x="0" y="0"/>
+          <a:chExt cx="0" cy="0"/>
+        </a:xfrm>
+      </p:grpSpPr>
+      <p:sp>
+        <p:nvSpPr>
+          <p:cNvPr id="2" name="Titel 1">
+            <a:extLst>
+              <a:ext uri="{FF2B5EF4-FFF2-40B4-BE49-F238E27FC236}">
+                <a16:creationId xmlns:a16="http://schemas.microsoft.com/office/drawing/2014/main" id="{BA8B69C5-C240-88A4-BD48-850C48BE733B}"/>
+              </a:ext>
+            </a:extLst>
+          </p:cNvPr>
+          <p:cNvSpPr>
+            <a:spLocks noGrp="1"/>
+          </p:cNvSpPr>
+          <p:nvPr>
+            <p:ph type="title"/>
+          </p:nvPr>
+        </p:nvSpPr>
+        <p:spPr/>
+        <p:txBody>
+          <a:bodyPr/>
+          <a:lstStyle/>
+          <a:p>
+            <a:r>
+              <a:rPr lang="de-DE" dirty="0"/>
+              <a:t>Multivariate lineare Regression</a:t>
+            </a:r>
+            <a:endParaRPr lang="de-AT" dirty="0"/>
+          </a:p>
+        </p:txBody>
+      </p:sp>
+      <p:sp>
+        <p:nvSpPr>
+          <p:cNvPr id="3" name="Inhaltsplatzhalter 2">
+            <a:extLst>
+              <a:ext uri="{FF2B5EF4-FFF2-40B4-BE49-F238E27FC236}">
+                <a16:creationId xmlns:a16="http://schemas.microsoft.com/office/drawing/2014/main" id="{4C57A619-47FE-2F4B-4C80-DBFC185BAAF1}"/>
+              </a:ext>
+            </a:extLst>
+          </p:cNvPr>
+          <p:cNvSpPr>
+            <a:spLocks noGrp="1"/>
+          </p:cNvSpPr>
+          <p:nvPr>
+            <p:ph idx="1"/>
+          </p:nvPr>
+        </p:nvSpPr>
+        <p:spPr/>
+        <p:txBody>
+          <a:bodyPr/>
+          <a:lstStyle/>
+          <a:p>
+            <a:endParaRPr lang="de-AT"/>
+          </a:p>
+        </p:txBody>
+      </p:sp>
+    </p:spTree>
+    <p:extLst>
+      <p:ext uri="{BB962C8B-B14F-4D97-AF65-F5344CB8AC3E}">
+        <p14:creationId xmlns:p14="http://schemas.microsoft.com/office/powerpoint/2010/main" val="2183538183"/>
+      </p:ext>
+    </p:extLst>
+  </p:cSld>
+  <p:clrMapOvr>
+    <a:masterClrMapping/>
+  </p:clrMapOvr>
+</p:sld>
+</file>
+
+<file path=ppt/slides/slide5.xml><?xml version="1.0" encoding="utf-8"?>
+<p:sld xmlns:a="http://schemas.openxmlformats.org/drawingml/2006/main" xmlns:r="http://schemas.openxmlformats.org/officeDocument/2006/relationships" xmlns:p="http://schemas.openxmlformats.org/presentationml/2006/main">
+  <p:cSld>
+    <p:spTree>
+      <p:nvGrpSpPr>
+        <p:cNvPr id="1" name=""/>
+        <p:cNvGrpSpPr/>
+        <p:nvPr/>
+      </p:nvGrpSpPr>
+      <p:grpSpPr>
+        <a:xfrm>
+          <a:off x="0" y="0"/>
+          <a:ext cx="0" cy="0"/>
+          <a:chOff x="0" y="0"/>
+          <a:chExt cx="0" cy="0"/>
+        </a:xfrm>
+      </p:grpSpPr>
+      <p:sp>
+        <p:nvSpPr>
+          <p:cNvPr id="2" name="Titel 1">
+            <a:extLst>
+              <a:ext uri="{FF2B5EF4-FFF2-40B4-BE49-F238E27FC236}">
+                <a16:creationId xmlns:a16="http://schemas.microsoft.com/office/drawing/2014/main" id="{B0F12AB1-0276-235A-A78F-AC7C856D3ABB}"/>
+              </a:ext>
+            </a:extLst>
+          </p:cNvPr>
+          <p:cNvSpPr>
+            <a:spLocks noGrp="1"/>
+          </p:cNvSpPr>
+          <p:nvPr>
+            <p:ph type="title"/>
+          </p:nvPr>
+        </p:nvSpPr>
+        <p:spPr/>
+        <p:txBody>
+          <a:bodyPr/>
+          <a:lstStyle/>
+          <a:p>
+            <a:r>
+              <a:rPr lang="de-DE" dirty="0"/>
+              <a:t>Hochrechnung und lineare Regression</a:t>
+            </a:r>
+            <a:endParaRPr lang="de-AT" dirty="0"/>
+          </a:p>
+        </p:txBody>
+      </p:sp>
+      <p:sp>
+        <p:nvSpPr>
+          <p:cNvPr id="3" name="Inhaltsplatzhalter 2">
+            <a:extLst>
+              <a:ext uri="{FF2B5EF4-FFF2-40B4-BE49-F238E27FC236}">
+                <a16:creationId xmlns:a16="http://schemas.microsoft.com/office/drawing/2014/main" id="{AC7F4988-7C23-A449-FACD-67CE41C01E74}"/>
+              </a:ext>
+            </a:extLst>
+          </p:cNvPr>
+          <p:cNvSpPr>
+            <a:spLocks noGrp="1"/>
+          </p:cNvSpPr>
+          <p:nvPr>
+            <p:ph idx="1"/>
+          </p:nvPr>
+        </p:nvSpPr>
+        <p:spPr/>
+        <p:txBody>
+          <a:bodyPr/>
+          <a:lstStyle/>
+          <a:p>
+            <a:endParaRPr lang="de-AT"/>
+          </a:p>
+        </p:txBody>
+      </p:sp>
+    </p:spTree>
+    <p:extLst>
+      <p:ext uri="{BB962C8B-B14F-4D97-AF65-F5344CB8AC3E}">
+        <p14:creationId xmlns:p14="http://schemas.microsoft.com/office/powerpoint/2010/main" val="2130042208"/>
+      </p:ext>
+    </p:extLst>
+  </p:cSld>
+  <p:clrMapOvr>
+    <a:masterClrMapping/>
+  </p:clrMapOvr>
+</p:sld>
+</file>
+
+<file path=ppt/slides/slide6.xml><?xml version="1.0" encoding="utf-8"?>
+<p:sld xmlns:a="http://schemas.openxmlformats.org/drawingml/2006/main" xmlns:r="http://schemas.openxmlformats.org/officeDocument/2006/relationships" xmlns:p="http://schemas.openxmlformats.org/presentationml/2006/main">
+  <p:cSld>
+    <p:spTree>
+      <p:nvGrpSpPr>
+        <p:cNvPr id="1" name=""/>
+        <p:cNvGrpSpPr/>
+        <p:nvPr/>
+      </p:nvGrpSpPr>
+      <p:grpSpPr>
+        <a:xfrm>
+          <a:off x="0" y="0"/>
+          <a:ext cx="0" cy="0"/>
+          <a:chOff x="0" y="0"/>
+          <a:chExt cx="0" cy="0"/>
+        </a:xfrm>
+      </p:grpSpPr>
+      <p:sp>
+        <p:nvSpPr>
+          <p:cNvPr id="2" name="Titel 1">
+            <a:extLst>
+              <a:ext uri="{FF2B5EF4-FFF2-40B4-BE49-F238E27FC236}">
+                <a16:creationId xmlns:a16="http://schemas.microsoft.com/office/drawing/2014/main" id="{AB4F34F2-FD1A-FC57-D53E-8A5C1321C35A}"/>
+              </a:ext>
+            </a:extLst>
+          </p:cNvPr>
+          <p:cNvSpPr>
+            <a:spLocks noGrp="1"/>
+          </p:cNvSpPr>
+          <p:nvPr>
+            <p:ph type="title"/>
+          </p:nvPr>
+        </p:nvSpPr>
+        <p:spPr/>
+        <p:txBody>
+          <a:bodyPr/>
+          <a:lstStyle/>
+          <a:p>
+            <a:r>
+              <a:rPr lang="de-DE" dirty="0"/>
+              <a:t>Hochrechnung in Excel machen</a:t>
+            </a:r>
+            <a:endParaRPr lang="de-AT" dirty="0"/>
+          </a:p>
+        </p:txBody>
+      </p:sp>
+      <p:sp>
+        <p:nvSpPr>
+          <p:cNvPr id="3" name="Inhaltsplatzhalter 2">
+            <a:extLst>
+              <a:ext uri="{FF2B5EF4-FFF2-40B4-BE49-F238E27FC236}">
+                <a16:creationId xmlns:a16="http://schemas.microsoft.com/office/drawing/2014/main" id="{6471F93C-8191-3241-8A23-E9A5E8781D29}"/>
+              </a:ext>
+            </a:extLst>
+          </p:cNvPr>
+          <p:cNvSpPr>
+            <a:spLocks noGrp="1"/>
+          </p:cNvSpPr>
+          <p:nvPr>
+            <p:ph idx="1"/>
+          </p:nvPr>
+        </p:nvSpPr>
+        <p:spPr/>
+        <p:txBody>
+          <a:bodyPr/>
+          <a:lstStyle/>
+          <a:p>
+            <a:endParaRPr lang="de-AT"/>
+          </a:p>
+        </p:txBody>
+      </p:sp>
+    </p:spTree>
+    <p:extLst>
+      <p:ext uri="{BB962C8B-B14F-4D97-AF65-F5344CB8AC3E}">
+        <p14:creationId xmlns:p14="http://schemas.microsoft.com/office/powerpoint/2010/main" val="4082787262"/>
+      </p:ext>
+    </p:extLst>
+  </p:cSld>
+  <p:clrMapOvr>
+    <a:masterClrMapping/>
+  </p:clrMapOvr>
+</p:sld>
+</file>
+
+<file path=ppt/slides/slide7.xml><?xml version="1.0" encoding="utf-8"?>
+<p:sld xmlns:a="http://schemas.openxmlformats.org/drawingml/2006/main" xmlns:r="http://schemas.openxmlformats.org/officeDocument/2006/relationships" xmlns:p="http://schemas.openxmlformats.org/presentationml/2006/main">
+  <p:cSld>
+    <p:spTree>
+      <p:nvGrpSpPr>
+        <p:cNvPr id="1" name=""/>
+        <p:cNvGrpSpPr/>
+        <p:nvPr/>
+      </p:nvGrpSpPr>
+      <p:grpSpPr>
+        <a:xfrm>
+          <a:off x="0" y="0"/>
+          <a:ext cx="0" cy="0"/>
+          <a:chOff x="0" y="0"/>
+          <a:chExt cx="0" cy="0"/>
+        </a:xfrm>
+      </p:grpSpPr>
+      <p:sp>
+        <p:nvSpPr>
+          <p:cNvPr id="2" name="Titel 1">
+            <a:extLst>
+              <a:ext uri="{FF2B5EF4-FFF2-40B4-BE49-F238E27FC236}">
+                <a16:creationId xmlns:a16="http://schemas.microsoft.com/office/drawing/2014/main" id="{BB36368B-FAB8-C20B-35F4-757B95A5D4EF}"/>
+              </a:ext>
+            </a:extLst>
+          </p:cNvPr>
+          <p:cNvSpPr>
+            <a:spLocks noGrp="1"/>
+          </p:cNvSpPr>
+          <p:nvPr>
+            <p:ph type="title"/>
+          </p:nvPr>
+        </p:nvSpPr>
+        <p:spPr/>
+        <p:txBody>
+          <a:bodyPr/>
+          <a:lstStyle/>
+          <a:p>
+            <a:r>
+              <a:rPr lang="de-DE" dirty="0"/>
+              <a:t>Ziel: Urnenwahlergebnis NRW 2024</a:t>
+            </a:r>
+            <a:endParaRPr lang="de-AT" dirty="0"/>
+          </a:p>
+        </p:txBody>
+      </p:sp>
+      <p:graphicFrame>
+        <p:nvGraphicFramePr>
+          <p:cNvPr id="5" name="Inhaltsplatzhalter 4">
+            <a:extLst>
+              <a:ext uri="{FF2B5EF4-FFF2-40B4-BE49-F238E27FC236}">
+                <a16:creationId xmlns:a16="http://schemas.microsoft.com/office/drawing/2014/main" id="{0B7A5EA3-4E87-D48C-6EF1-E98D90806FEE}"/>
+              </a:ext>
+            </a:extLst>
+          </p:cNvPr>
+          <p:cNvGraphicFramePr>
+            <a:graphicFrameLocks noGrp="1"/>
+          </p:cNvGraphicFramePr>
+          <p:nvPr>
+            <p:ph idx="1"/>
+            <p:extLst>
+              <p:ext uri="{D42A27DB-BD31-4B8C-83A1-F6EECF244321}">
+                <p14:modId xmlns:p14="http://schemas.microsoft.com/office/powerpoint/2010/main" val="4105898660"/>
+              </p:ext>
+            </p:extLst>
+          </p:nvPr>
+        </p:nvGraphicFramePr>
+        <p:xfrm>
+          <a:off x="838200" y="1825625"/>
+          <a:ext cx="10515600" cy="4351338"/>
+        </p:xfrm>
+        <a:graphic>
+          <a:graphicData uri="http://schemas.openxmlformats.org/drawingml/2006/chart">
+            <c:chart xmlns:c="http://schemas.openxmlformats.org/drawingml/2006/chart" xmlns:r="http://schemas.openxmlformats.org/officeDocument/2006/relationships" r:id="rId2"/>
+          </a:graphicData>
+        </a:graphic>
+      </p:graphicFrame>
+    </p:spTree>
+    <p:extLst>
+      <p:ext uri="{BB962C8B-B14F-4D97-AF65-F5344CB8AC3E}">
+        <p14:creationId xmlns:p14="http://schemas.microsoft.com/office/powerpoint/2010/main" val="4171298435"/>
+      </p:ext>
+    </p:extLst>
+  </p:cSld>
+  <p:clrMapOvr>
+    <a:masterClrMapping/>
+  </p:clrMapOvr>
+</p:sld>
+</file>
+
+<file path=ppt/slides/slide8.xml><?xml version="1.0" encoding="utf-8"?>
+<p:sld xmlns:a="http://schemas.openxmlformats.org/drawingml/2006/main" xmlns:r="http://schemas.openxmlformats.org/officeDocument/2006/relationships" xmlns:p="http://schemas.openxmlformats.org/presentationml/2006/main">
+  <p:cSld>
+    <p:spTree>
+      <p:nvGrpSpPr>
+        <p:cNvPr id="1" name=""/>
+        <p:cNvGrpSpPr/>
+        <p:nvPr/>
+      </p:nvGrpSpPr>
+      <p:grpSpPr>
+        <a:xfrm>
+          <a:off x="0" y="0"/>
+          <a:ext cx="0" cy="0"/>
+          <a:chOff x="0" y="0"/>
+          <a:chExt cx="0" cy="0"/>
+        </a:xfrm>
+      </p:grpSpPr>
+      <p:sp>
+        <p:nvSpPr>
+          <p:cNvPr id="2" name="Titel 1">
+            <a:extLst>
+              <a:ext uri="{FF2B5EF4-FFF2-40B4-BE49-F238E27FC236}">
+                <a16:creationId xmlns:a16="http://schemas.microsoft.com/office/drawing/2014/main" id="{332DC837-2141-5975-411F-A47B8BE2D2C2}"/>
+              </a:ext>
+            </a:extLst>
+          </p:cNvPr>
+          <p:cNvSpPr>
+            <a:spLocks noGrp="1"/>
+          </p:cNvSpPr>
+          <p:nvPr>
+            <p:ph type="title"/>
+          </p:nvPr>
+        </p:nvSpPr>
+        <p:spPr/>
+        <p:txBody>
+          <a:bodyPr/>
+          <a:lstStyle/>
+          <a:p>
+            <a:r>
+              <a:rPr lang="de-DE" dirty="0"/>
+              <a:t>Datenstruktur</a:t>
+            </a:r>
+            <a:endParaRPr lang="de-AT" dirty="0"/>
+          </a:p>
+        </p:txBody>
+      </p:sp>
+      <p:sp>
+        <p:nvSpPr>
+          <p:cNvPr id="3" name="Inhaltsplatzhalter 2">
+            <a:extLst>
+              <a:ext uri="{FF2B5EF4-FFF2-40B4-BE49-F238E27FC236}">
+                <a16:creationId xmlns:a16="http://schemas.microsoft.com/office/drawing/2014/main" id="{84B95D0F-A849-7CA7-C56E-8B67EAE5CCEA}"/>
+              </a:ext>
+            </a:extLst>
+          </p:cNvPr>
+          <p:cNvSpPr>
+            <a:spLocks noGrp="1"/>
+          </p:cNvSpPr>
+          <p:nvPr>
+            <p:ph idx="1"/>
+          </p:nvPr>
+        </p:nvSpPr>
+        <p:spPr/>
+        <p:txBody>
+          <a:bodyPr/>
+          <a:lstStyle/>
+          <a:p>
+            <a:r>
+              <a:rPr lang="de-DE" dirty="0"/>
+              <a:t>GKZ = Gemeindekennziffer</a:t>
+            </a:r>
+          </a:p>
+          <a:p>
+            <a:pPr lvl="1"/>
+            <a:r>
+              <a:rPr lang="de-DE" dirty="0"/>
+              <a:t>1. Stelle: Bundesland</a:t>
+            </a:r>
+          </a:p>
+          <a:p>
+            <a:pPr lvl="1"/>
+            <a:r>
+              <a:rPr lang="de-DE" dirty="0"/>
+              <a:t>1.-3. Stelle: Bezirkskennziffer BKZ</a:t>
+            </a:r>
+          </a:p>
+          <a:p>
+            <a:pPr lvl="1"/>
+            <a:r>
+              <a:rPr lang="de-AT" dirty="0"/>
+              <a:t>1.-5. Stelle: GKZ</a:t>
+            </a:r>
+          </a:p>
+          <a:p>
+            <a:r>
+              <a:rPr lang="de-DE" dirty="0"/>
+              <a:t>Wahlberechtigte, Abgegebene, Ungültige, Gültige Stimmen</a:t>
+            </a:r>
+          </a:p>
+          <a:p>
+            <a:r>
+              <a:rPr lang="de-DE" dirty="0"/>
+              <a:t>Parteienergebnisse: ÖVP, SPÖ, FPÖ, Grüne, NEOS, Sonstige</a:t>
+            </a:r>
+          </a:p>
+        </p:txBody>
+      </p:sp>
+    </p:spTree>
+    <p:extLst>
+      <p:ext uri="{BB962C8B-B14F-4D97-AF65-F5344CB8AC3E}">
+        <p14:creationId xmlns:p14="http://schemas.microsoft.com/office/powerpoint/2010/main" val="2842475990"/>
+      </p:ext>
+    </p:extLst>
+  </p:cSld>
+  <p:clrMapOvr>
+    <a:masterClrMapping/>
+  </p:clrMapOvr>
+</p:sld>
+</file>
+
+<file path=ppt/slides/slide9.xml><?xml version="1.0" encoding="utf-8"?>
+<p:sld xmlns:a="http://schemas.openxmlformats.org/drawingml/2006/main" xmlns:r="http://schemas.openxmlformats.org/officeDocument/2006/relationships" xmlns:p="http://schemas.openxmlformats.org/presentationml/2006/main">
+  <p:cSld>
+    <p:spTree>
+      <p:nvGrpSpPr>
+        <p:cNvPr id="1" name=""/>
+        <p:cNvGrpSpPr/>
+        <p:nvPr/>
+      </p:nvGrpSpPr>
+      <p:grpSpPr>
+        <a:xfrm>
+          <a:off x="0" y="0"/>
+          <a:ext cx="0" cy="0"/>
+          <a:chOff x="0" y="0"/>
+          <a:chExt cx="0" cy="0"/>
+        </a:xfrm>
+      </p:grpSpPr>
+      <p:sp>
+        <p:nvSpPr>
+          <p:cNvPr id="2" name="Titel 1">
+            <a:extLst>
+              <a:ext uri="{FF2B5EF4-FFF2-40B4-BE49-F238E27FC236}">
                 <a16:creationId xmlns:a16="http://schemas.microsoft.com/office/drawing/2014/main" id="{E598A848-6A90-634E-F347-3421E1503D22}"/>
               </a:ext>
             </a:extLst>
@@ -4587,7 +5244,17 @@
           <a:bodyPr/>
           <a:lstStyle/>
           <a:p>
-            <a:endParaRPr lang="de-AT"/>
+            <a:r>
+              <a:rPr lang="de-DE" dirty="0">
+                <a:hlinkClick r:id="rId2"/>
+              </a:rPr>
+              <a:t>clara.himmelbauer@wu.ac.at</a:t>
+            </a:r>
+            <a:r>
+              <a:rPr lang="de-DE" dirty="0"/>
+              <a:t> </a:t>
+            </a:r>
+            <a:endParaRPr lang="de-AT" dirty="0"/>
           </a:p>
         </p:txBody>
       </p:sp>

</xml_diff>

<commit_message>
präsi etwas weiter. aber so viel ists eh noch incht
</commit_message>
<xml_diff>
--- a/report/presentation.pptx
+++ b/report/presentation.pptx
@@ -2,26 +2,28 @@
 <file path=ppt/presentation.xml><?xml version="1.0" encoding="utf-8"?>
 <p:presentation xmlns:a="http://schemas.openxmlformats.org/drawingml/2006/main" xmlns:r="http://schemas.openxmlformats.org/officeDocument/2006/relationships" xmlns:p="http://schemas.openxmlformats.org/presentationml/2006/main" saveSubsetFonts="1">
   <p:sldMasterIdLst>
-    <p:sldMasterId id="2147483648" r:id="rId1"/>
+    <p:sldMasterId id="2147483714" r:id="rId1"/>
   </p:sldMasterIdLst>
   <p:sldIdLst>
     <p:sldId id="256" r:id="rId2"/>
     <p:sldId id="259" r:id="rId3"/>
-    <p:sldId id="260" r:id="rId4"/>
-    <p:sldId id="261" r:id="rId5"/>
-    <p:sldId id="264" r:id="rId6"/>
-    <p:sldId id="262" r:id="rId7"/>
-    <p:sldId id="257" r:id="rId8"/>
-    <p:sldId id="263" r:id="rId9"/>
-    <p:sldId id="258" r:id="rId10"/>
+    <p:sldId id="265" r:id="rId4"/>
+    <p:sldId id="267" r:id="rId5"/>
+    <p:sldId id="260" r:id="rId6"/>
+    <p:sldId id="261" r:id="rId7"/>
+    <p:sldId id="264" r:id="rId8"/>
+    <p:sldId id="262" r:id="rId9"/>
+    <p:sldId id="257" r:id="rId10"/>
+    <p:sldId id="263" r:id="rId11"/>
+    <p:sldId id="258" r:id="rId12"/>
   </p:sldIdLst>
   <p:sldSz cx="12192000" cy="6858000"/>
   <p:notesSz cx="6858000" cy="9144000"/>
   <p:defaultTextStyle>
     <a:defPPr>
-      <a:defRPr lang="de-DE"/>
+      <a:defRPr lang="en-US"/>
     </a:defPPr>
-    <a:lvl1pPr marL="0" algn="l" defTabSz="914400" rtl="0" eaLnBrk="1" latinLnBrk="0" hangingPunct="1">
+    <a:lvl1pPr marL="0" algn="l" defTabSz="457200" rtl="0" eaLnBrk="1" latinLnBrk="0" hangingPunct="1">
       <a:defRPr sz="1800" kern="1200">
         <a:solidFill>
           <a:schemeClr val="tx1"/>
@@ -31,7 +33,7 @@
         <a:cs typeface="+mn-cs"/>
       </a:defRPr>
     </a:lvl1pPr>
-    <a:lvl2pPr marL="457200" algn="l" defTabSz="914400" rtl="0" eaLnBrk="1" latinLnBrk="0" hangingPunct="1">
+    <a:lvl2pPr marL="457200" algn="l" defTabSz="457200" rtl="0" eaLnBrk="1" latinLnBrk="0" hangingPunct="1">
       <a:defRPr sz="1800" kern="1200">
         <a:solidFill>
           <a:schemeClr val="tx1"/>
@@ -41,7 +43,7 @@
         <a:cs typeface="+mn-cs"/>
       </a:defRPr>
     </a:lvl2pPr>
-    <a:lvl3pPr marL="914400" algn="l" defTabSz="914400" rtl="0" eaLnBrk="1" latinLnBrk="0" hangingPunct="1">
+    <a:lvl3pPr marL="914400" algn="l" defTabSz="457200" rtl="0" eaLnBrk="1" latinLnBrk="0" hangingPunct="1">
       <a:defRPr sz="1800" kern="1200">
         <a:solidFill>
           <a:schemeClr val="tx1"/>
@@ -51,7 +53,7 @@
         <a:cs typeface="+mn-cs"/>
       </a:defRPr>
     </a:lvl3pPr>
-    <a:lvl4pPr marL="1371600" algn="l" defTabSz="914400" rtl="0" eaLnBrk="1" latinLnBrk="0" hangingPunct="1">
+    <a:lvl4pPr marL="1371600" algn="l" defTabSz="457200" rtl="0" eaLnBrk="1" latinLnBrk="0" hangingPunct="1">
       <a:defRPr sz="1800" kern="1200">
         <a:solidFill>
           <a:schemeClr val="tx1"/>
@@ -61,7 +63,7 @@
         <a:cs typeface="+mn-cs"/>
       </a:defRPr>
     </a:lvl4pPr>
-    <a:lvl5pPr marL="1828800" algn="l" defTabSz="914400" rtl="0" eaLnBrk="1" latinLnBrk="0" hangingPunct="1">
+    <a:lvl5pPr marL="1828800" algn="l" defTabSz="457200" rtl="0" eaLnBrk="1" latinLnBrk="0" hangingPunct="1">
       <a:defRPr sz="1800" kern="1200">
         <a:solidFill>
           <a:schemeClr val="tx1"/>
@@ -71,7 +73,7 @@
         <a:cs typeface="+mn-cs"/>
       </a:defRPr>
     </a:lvl5pPr>
-    <a:lvl6pPr marL="2286000" algn="l" defTabSz="914400" rtl="0" eaLnBrk="1" latinLnBrk="0" hangingPunct="1">
+    <a:lvl6pPr marL="2286000" algn="l" defTabSz="457200" rtl="0" eaLnBrk="1" latinLnBrk="0" hangingPunct="1">
       <a:defRPr sz="1800" kern="1200">
         <a:solidFill>
           <a:schemeClr val="tx1"/>
@@ -81,7 +83,7 @@
         <a:cs typeface="+mn-cs"/>
       </a:defRPr>
     </a:lvl6pPr>
-    <a:lvl7pPr marL="2743200" algn="l" defTabSz="914400" rtl="0" eaLnBrk="1" latinLnBrk="0" hangingPunct="1">
+    <a:lvl7pPr marL="2743200" algn="l" defTabSz="457200" rtl="0" eaLnBrk="1" latinLnBrk="0" hangingPunct="1">
       <a:defRPr sz="1800" kern="1200">
         <a:solidFill>
           <a:schemeClr val="tx1"/>
@@ -91,7 +93,7 @@
         <a:cs typeface="+mn-cs"/>
       </a:defRPr>
     </a:lvl7pPr>
-    <a:lvl8pPr marL="3200400" algn="l" defTabSz="914400" rtl="0" eaLnBrk="1" latinLnBrk="0" hangingPunct="1">
+    <a:lvl8pPr marL="3200400" algn="l" defTabSz="457200" rtl="0" eaLnBrk="1" latinLnBrk="0" hangingPunct="1">
       <a:defRPr sz="1800" kern="1200">
         <a:solidFill>
           <a:schemeClr val="tx1"/>
@@ -101,7 +103,7 @@
         <a:cs typeface="+mn-cs"/>
       </a:defRPr>
     </a:lvl8pPr>
-    <a:lvl9pPr marL="3657600" algn="l" defTabSz="914400" rtl="0" eaLnBrk="1" latinLnBrk="0" hangingPunct="1">
+    <a:lvl9pPr marL="3657600" algn="l" defTabSz="457200" rtl="0" eaLnBrk="1" latinLnBrk="0" hangingPunct="1">
       <a:defRPr sz="1800" kern="1200">
         <a:solidFill>
           <a:schemeClr val="tx1"/>
@@ -123,7 +125,7 @@
 <file path=ppt/revisionInfo.xml><?xml version="1.0" encoding="utf-8"?>
 <p1510:revInfo xmlns:a="http://schemas.openxmlformats.org/drawingml/2006/main" xmlns:r="http://schemas.openxmlformats.org/officeDocument/2006/relationships" xmlns:p1510="http://schemas.microsoft.com/office/powerpoint/2015/10/main">
   <p1510:revLst>
-    <p1510:client id="{26A58844-2FB7-4F90-9501-5CC089926BE8}" v="8" dt="2025-01-27T10:36:05.771"/>
+    <p1510:client id="{26A58844-2FB7-4F90-9501-5CC089926BE8}" v="16" dt="2025-02-06T16:45:01.294"/>
   </p1510:revLst>
 </p1510:revInfo>
 </file>
@@ -132,19 +134,19 @@
 <pc:chgInfo xmlns:a="http://schemas.openxmlformats.org/drawingml/2006/main" xmlns:r="http://schemas.openxmlformats.org/officeDocument/2006/relationships" xmlns:ac="http://schemas.microsoft.com/office/drawing/2013/main/command" xmlns:pc="http://schemas.microsoft.com/office/powerpoint/2013/main/command">
   <pc:docChgLst>
     <pc:chgData name="Himmelbauer, Clara" userId="12d7e35a-e13e-4c49-b9be-a181bf83ad46" providerId="ADAL" clId="{26A58844-2FB7-4F90-9501-5CC089926BE8}"/>
-    <pc:docChg chg="custSel addSld modSld">
-      <pc:chgData name="Himmelbauer, Clara" userId="12d7e35a-e13e-4c49-b9be-a181bf83ad46" providerId="ADAL" clId="{26A58844-2FB7-4F90-9501-5CC089926BE8}" dt="2025-01-27T10:36:05.771" v="631" actId="5736"/>
+    <pc:docChg chg="undo custSel addSld delSld modSld sldOrd">
+      <pc:chgData name="Himmelbauer, Clara" userId="12d7e35a-e13e-4c49-b9be-a181bf83ad46" providerId="ADAL" clId="{26A58844-2FB7-4F90-9501-5CC089926BE8}" dt="2025-02-06T16:45:20.719" v="810" actId="1076"/>
       <pc:docMkLst>
         <pc:docMk/>
       </pc:docMkLst>
       <pc:sldChg chg="modSp new mod">
-        <pc:chgData name="Himmelbauer, Clara" userId="12d7e35a-e13e-4c49-b9be-a181bf83ad46" providerId="ADAL" clId="{26A58844-2FB7-4F90-9501-5CC089926BE8}" dt="2025-01-27T10:11:59.892" v="121" actId="20577"/>
+        <pc:chgData name="Himmelbauer, Clara" userId="12d7e35a-e13e-4c49-b9be-a181bf83ad46" providerId="ADAL" clId="{26A58844-2FB7-4F90-9501-5CC089926BE8}" dt="2025-02-06T16:42:27.676" v="686"/>
         <pc:sldMkLst>
           <pc:docMk/>
           <pc:sldMk cId="1587025369" sldId="256"/>
         </pc:sldMkLst>
         <pc:spChg chg="mod">
-          <ac:chgData name="Himmelbauer, Clara" userId="12d7e35a-e13e-4c49-b9be-a181bf83ad46" providerId="ADAL" clId="{26A58844-2FB7-4F90-9501-5CC089926BE8}" dt="2025-01-27T10:11:49.673" v="86" actId="20577"/>
+          <ac:chgData name="Himmelbauer, Clara" userId="12d7e35a-e13e-4c49-b9be-a181bf83ad46" providerId="ADAL" clId="{26A58844-2FB7-4F90-9501-5CC089926BE8}" dt="2025-02-06T16:42:27.676" v="686"/>
           <ac:spMkLst>
             <pc:docMk/>
             <pc:sldMk cId="1587025369" sldId="256"/>
@@ -152,7 +154,7 @@
           </ac:spMkLst>
         </pc:spChg>
         <pc:spChg chg="mod">
-          <ac:chgData name="Himmelbauer, Clara" userId="12d7e35a-e13e-4c49-b9be-a181bf83ad46" providerId="ADAL" clId="{26A58844-2FB7-4F90-9501-5CC089926BE8}" dt="2025-01-27T10:11:59.892" v="121" actId="20577"/>
+          <ac:chgData name="Himmelbauer, Clara" userId="12d7e35a-e13e-4c49-b9be-a181bf83ad46" providerId="ADAL" clId="{26A58844-2FB7-4F90-9501-5CC089926BE8}" dt="2025-02-06T16:42:27.676" v="686"/>
           <ac:spMkLst>
             <pc:docMk/>
             <pc:sldMk cId="1587025369" sldId="256"/>
@@ -161,37 +163,21 @@
         </pc:spChg>
       </pc:sldChg>
       <pc:sldChg chg="addSp delSp modSp new mod">
-        <pc:chgData name="Himmelbauer, Clara" userId="12d7e35a-e13e-4c49-b9be-a181bf83ad46" providerId="ADAL" clId="{26A58844-2FB7-4F90-9501-5CC089926BE8}" dt="2025-01-27T10:36:05.771" v="631" actId="5736"/>
+        <pc:chgData name="Himmelbauer, Clara" userId="12d7e35a-e13e-4c49-b9be-a181bf83ad46" providerId="ADAL" clId="{26A58844-2FB7-4F90-9501-5CC089926BE8}" dt="2025-02-06T16:42:27.676" v="686"/>
         <pc:sldMkLst>
           <pc:docMk/>
           <pc:sldMk cId="4171298435" sldId="257"/>
         </pc:sldMkLst>
         <pc:spChg chg="mod">
-          <ac:chgData name="Himmelbauer, Clara" userId="12d7e35a-e13e-4c49-b9be-a181bf83ad46" providerId="ADAL" clId="{26A58844-2FB7-4F90-9501-5CC089926BE8}" dt="2025-01-27T10:11:39.634" v="66" actId="20577"/>
+          <ac:chgData name="Himmelbauer, Clara" userId="12d7e35a-e13e-4c49-b9be-a181bf83ad46" providerId="ADAL" clId="{26A58844-2FB7-4F90-9501-5CC089926BE8}" dt="2025-02-06T16:42:27.676" v="686"/>
           <ac:spMkLst>
             <pc:docMk/>
             <pc:sldMk cId="4171298435" sldId="257"/>
             <ac:spMk id="2" creationId="{BB36368B-FAB8-C20B-35F4-757B95A5D4EF}"/>
           </ac:spMkLst>
         </pc:spChg>
-        <pc:spChg chg="add del">
-          <ac:chgData name="Himmelbauer, Clara" userId="12d7e35a-e13e-4c49-b9be-a181bf83ad46" providerId="ADAL" clId="{26A58844-2FB7-4F90-9501-5CC089926BE8}" dt="2025-01-27T10:11:24.273" v="36"/>
-          <ac:spMkLst>
-            <pc:docMk/>
-            <pc:sldMk cId="4171298435" sldId="257"/>
-            <ac:spMk id="3" creationId="{600EB50D-88EF-FE55-1E20-67D30407853E}"/>
-          </ac:spMkLst>
-        </pc:spChg>
         <pc:graphicFrameChg chg="add mod">
-          <ac:chgData name="Himmelbauer, Clara" userId="12d7e35a-e13e-4c49-b9be-a181bf83ad46" providerId="ADAL" clId="{26A58844-2FB7-4F90-9501-5CC089926BE8}" dt="2025-01-27T10:11:19.088" v="34"/>
-          <ac:graphicFrameMkLst>
-            <pc:docMk/>
-            <pc:sldMk cId="4171298435" sldId="257"/>
-            <ac:graphicFrameMk id="4" creationId="{0B7A5EA3-4E87-D48C-6EF1-E98D90806FEE}"/>
-          </ac:graphicFrameMkLst>
-        </pc:graphicFrameChg>
-        <pc:graphicFrameChg chg="add mod">
-          <ac:chgData name="Himmelbauer, Clara" userId="12d7e35a-e13e-4c49-b9be-a181bf83ad46" providerId="ADAL" clId="{26A58844-2FB7-4F90-9501-5CC089926BE8}" dt="2025-01-27T10:36:05.771" v="631" actId="5736"/>
+          <ac:chgData name="Himmelbauer, Clara" userId="12d7e35a-e13e-4c49-b9be-a181bf83ad46" providerId="ADAL" clId="{26A58844-2FB7-4F90-9501-5CC089926BE8}" dt="2025-02-06T16:42:27.676" v="686"/>
           <ac:graphicFrameMkLst>
             <pc:docMk/>
             <pc:sldMk cId="4171298435" sldId="257"/>
@@ -200,13 +186,13 @@
         </pc:graphicFrameChg>
       </pc:sldChg>
       <pc:sldChg chg="modSp new mod">
-        <pc:chgData name="Himmelbauer, Clara" userId="12d7e35a-e13e-4c49-b9be-a181bf83ad46" providerId="ADAL" clId="{26A58844-2FB7-4F90-9501-5CC089926BE8}" dt="2025-01-27T10:34:59.625" v="594" actId="20577"/>
+        <pc:chgData name="Himmelbauer, Clara" userId="12d7e35a-e13e-4c49-b9be-a181bf83ad46" providerId="ADAL" clId="{26A58844-2FB7-4F90-9501-5CC089926BE8}" dt="2025-02-06T16:42:27.676" v="686"/>
         <pc:sldMkLst>
           <pc:docMk/>
           <pc:sldMk cId="1720390971" sldId="258"/>
         </pc:sldMkLst>
         <pc:spChg chg="mod">
-          <ac:chgData name="Himmelbauer, Clara" userId="12d7e35a-e13e-4c49-b9be-a181bf83ad46" providerId="ADAL" clId="{26A58844-2FB7-4F90-9501-5CC089926BE8}" dt="2025-01-27T10:11:44.810" v="74" actId="20577"/>
+          <ac:chgData name="Himmelbauer, Clara" userId="12d7e35a-e13e-4c49-b9be-a181bf83ad46" providerId="ADAL" clId="{26A58844-2FB7-4F90-9501-5CC089926BE8}" dt="2025-02-06T16:42:27.676" v="686"/>
           <ac:spMkLst>
             <pc:docMk/>
             <pc:sldMk cId="1720390971" sldId="258"/>
@@ -214,7 +200,7 @@
           </ac:spMkLst>
         </pc:spChg>
         <pc:spChg chg="mod">
-          <ac:chgData name="Himmelbauer, Clara" userId="12d7e35a-e13e-4c49-b9be-a181bf83ad46" providerId="ADAL" clId="{26A58844-2FB7-4F90-9501-5CC089926BE8}" dt="2025-01-27T10:34:59.625" v="594" actId="20577"/>
+          <ac:chgData name="Himmelbauer, Clara" userId="12d7e35a-e13e-4c49-b9be-a181bf83ad46" providerId="ADAL" clId="{26A58844-2FB7-4F90-9501-5CC089926BE8}" dt="2025-02-06T16:42:27.676" v="686"/>
           <ac:spMkLst>
             <pc:docMk/>
             <pc:sldMk cId="1720390971" sldId="258"/>
@@ -223,73 +209,105 @@
         </pc:spChg>
       </pc:sldChg>
       <pc:sldChg chg="modSp new mod">
-        <pc:chgData name="Himmelbauer, Clara" userId="12d7e35a-e13e-4c49-b9be-a181bf83ad46" providerId="ADAL" clId="{26A58844-2FB7-4F90-9501-5CC089926BE8}" dt="2025-01-27T10:32:17.938" v="147" actId="20577"/>
+        <pc:chgData name="Himmelbauer, Clara" userId="12d7e35a-e13e-4c49-b9be-a181bf83ad46" providerId="ADAL" clId="{26A58844-2FB7-4F90-9501-5CC089926BE8}" dt="2025-02-06T16:42:27.676" v="686"/>
         <pc:sldMkLst>
           <pc:docMk/>
           <pc:sldMk cId="492563053" sldId="259"/>
         </pc:sldMkLst>
         <pc:spChg chg="mod">
-          <ac:chgData name="Himmelbauer, Clara" userId="12d7e35a-e13e-4c49-b9be-a181bf83ad46" providerId="ADAL" clId="{26A58844-2FB7-4F90-9501-5CC089926BE8}" dt="2025-01-27T10:32:17.938" v="147" actId="20577"/>
+          <ac:chgData name="Himmelbauer, Clara" userId="12d7e35a-e13e-4c49-b9be-a181bf83ad46" providerId="ADAL" clId="{26A58844-2FB7-4F90-9501-5CC089926BE8}" dt="2025-02-06T16:42:27.676" v="686"/>
           <ac:spMkLst>
             <pc:docMk/>
             <pc:sldMk cId="492563053" sldId="259"/>
             <ac:spMk id="2" creationId="{1E4605C5-5701-3037-3C04-C8942A8964E0}"/>
           </ac:spMkLst>
         </pc:spChg>
+        <pc:spChg chg="mod">
+          <ac:chgData name="Himmelbauer, Clara" userId="12d7e35a-e13e-4c49-b9be-a181bf83ad46" providerId="ADAL" clId="{26A58844-2FB7-4F90-9501-5CC089926BE8}" dt="2025-02-06T16:42:27.676" v="686"/>
+          <ac:spMkLst>
+            <pc:docMk/>
+            <pc:sldMk cId="492563053" sldId="259"/>
+            <ac:spMk id="3" creationId="{0226F2C6-85B6-6062-A2C7-E4F57EE7EB2C}"/>
+          </ac:spMkLst>
+        </pc:spChg>
       </pc:sldChg>
       <pc:sldChg chg="modSp new mod">
-        <pc:chgData name="Himmelbauer, Clara" userId="12d7e35a-e13e-4c49-b9be-a181bf83ad46" providerId="ADAL" clId="{26A58844-2FB7-4F90-9501-5CC089926BE8}" dt="2025-01-27T10:32:25.398" v="166" actId="20577"/>
+        <pc:chgData name="Himmelbauer, Clara" userId="12d7e35a-e13e-4c49-b9be-a181bf83ad46" providerId="ADAL" clId="{26A58844-2FB7-4F90-9501-5CC089926BE8}" dt="2025-02-06T16:42:27.676" v="686"/>
         <pc:sldMkLst>
           <pc:docMk/>
           <pc:sldMk cId="2475301093" sldId="260"/>
         </pc:sldMkLst>
         <pc:spChg chg="mod">
-          <ac:chgData name="Himmelbauer, Clara" userId="12d7e35a-e13e-4c49-b9be-a181bf83ad46" providerId="ADAL" clId="{26A58844-2FB7-4F90-9501-5CC089926BE8}" dt="2025-01-27T10:32:25.398" v="166" actId="20577"/>
+          <ac:chgData name="Himmelbauer, Clara" userId="12d7e35a-e13e-4c49-b9be-a181bf83ad46" providerId="ADAL" clId="{26A58844-2FB7-4F90-9501-5CC089926BE8}" dt="2025-02-06T16:42:27.676" v="686"/>
           <ac:spMkLst>
             <pc:docMk/>
             <pc:sldMk cId="2475301093" sldId="260"/>
             <ac:spMk id="2" creationId="{DFE68D6C-E9A8-08F2-72B8-C51F4075EB7A}"/>
           </ac:spMkLst>
         </pc:spChg>
+        <pc:spChg chg="mod">
+          <ac:chgData name="Himmelbauer, Clara" userId="12d7e35a-e13e-4c49-b9be-a181bf83ad46" providerId="ADAL" clId="{26A58844-2FB7-4F90-9501-5CC089926BE8}" dt="2025-02-06T16:42:27.676" v="686"/>
+          <ac:spMkLst>
+            <pc:docMk/>
+            <pc:sldMk cId="2475301093" sldId="260"/>
+            <ac:spMk id="3" creationId="{8B4F73BC-6221-7151-9E3D-A10E327370F1}"/>
+          </ac:spMkLst>
+        </pc:spChg>
       </pc:sldChg>
       <pc:sldChg chg="modSp new mod">
-        <pc:chgData name="Himmelbauer, Clara" userId="12d7e35a-e13e-4c49-b9be-a181bf83ad46" providerId="ADAL" clId="{26A58844-2FB7-4F90-9501-5CC089926BE8}" dt="2025-01-27T10:32:34.229" v="208" actId="20577"/>
+        <pc:chgData name="Himmelbauer, Clara" userId="12d7e35a-e13e-4c49-b9be-a181bf83ad46" providerId="ADAL" clId="{26A58844-2FB7-4F90-9501-5CC089926BE8}" dt="2025-02-06T16:42:27.676" v="686"/>
         <pc:sldMkLst>
           <pc:docMk/>
           <pc:sldMk cId="2183538183" sldId="261"/>
         </pc:sldMkLst>
         <pc:spChg chg="mod">
-          <ac:chgData name="Himmelbauer, Clara" userId="12d7e35a-e13e-4c49-b9be-a181bf83ad46" providerId="ADAL" clId="{26A58844-2FB7-4F90-9501-5CC089926BE8}" dt="2025-01-27T10:32:34.229" v="208" actId="20577"/>
+          <ac:chgData name="Himmelbauer, Clara" userId="12d7e35a-e13e-4c49-b9be-a181bf83ad46" providerId="ADAL" clId="{26A58844-2FB7-4F90-9501-5CC089926BE8}" dt="2025-02-06T16:42:27.676" v="686"/>
           <ac:spMkLst>
             <pc:docMk/>
             <pc:sldMk cId="2183538183" sldId="261"/>
             <ac:spMk id="2" creationId="{BA8B69C5-C240-88A4-BD48-850C48BE733B}"/>
           </ac:spMkLst>
         </pc:spChg>
+        <pc:spChg chg="mod">
+          <ac:chgData name="Himmelbauer, Clara" userId="12d7e35a-e13e-4c49-b9be-a181bf83ad46" providerId="ADAL" clId="{26A58844-2FB7-4F90-9501-5CC089926BE8}" dt="2025-02-06T16:42:27.676" v="686"/>
+          <ac:spMkLst>
+            <pc:docMk/>
+            <pc:sldMk cId="2183538183" sldId="261"/>
+            <ac:spMk id="3" creationId="{4C57A619-47FE-2F4B-4C80-DBFC185BAAF1}"/>
+          </ac:spMkLst>
+        </pc:spChg>
       </pc:sldChg>
       <pc:sldChg chg="modSp new mod">
-        <pc:chgData name="Himmelbauer, Clara" userId="12d7e35a-e13e-4c49-b9be-a181bf83ad46" providerId="ADAL" clId="{26A58844-2FB7-4F90-9501-5CC089926BE8}" dt="2025-01-27T10:33:02.685" v="254" actId="20577"/>
+        <pc:chgData name="Himmelbauer, Clara" userId="12d7e35a-e13e-4c49-b9be-a181bf83ad46" providerId="ADAL" clId="{26A58844-2FB7-4F90-9501-5CC089926BE8}" dt="2025-02-06T16:42:27.676" v="686"/>
         <pc:sldMkLst>
           <pc:docMk/>
           <pc:sldMk cId="4082787262" sldId="262"/>
         </pc:sldMkLst>
         <pc:spChg chg="mod">
-          <ac:chgData name="Himmelbauer, Clara" userId="12d7e35a-e13e-4c49-b9be-a181bf83ad46" providerId="ADAL" clId="{26A58844-2FB7-4F90-9501-5CC089926BE8}" dt="2025-01-27T10:33:02.685" v="254" actId="20577"/>
+          <ac:chgData name="Himmelbauer, Clara" userId="12d7e35a-e13e-4c49-b9be-a181bf83ad46" providerId="ADAL" clId="{26A58844-2FB7-4F90-9501-5CC089926BE8}" dt="2025-02-06T16:42:27.676" v="686"/>
           <ac:spMkLst>
             <pc:docMk/>
             <pc:sldMk cId="4082787262" sldId="262"/>
             <ac:spMk id="2" creationId="{AB4F34F2-FD1A-FC57-D53E-8A5C1321C35A}"/>
           </ac:spMkLst>
         </pc:spChg>
+        <pc:spChg chg="mod">
+          <ac:chgData name="Himmelbauer, Clara" userId="12d7e35a-e13e-4c49-b9be-a181bf83ad46" providerId="ADAL" clId="{26A58844-2FB7-4F90-9501-5CC089926BE8}" dt="2025-02-06T16:42:27.676" v="686"/>
+          <ac:spMkLst>
+            <pc:docMk/>
+            <pc:sldMk cId="4082787262" sldId="262"/>
+            <ac:spMk id="3" creationId="{6471F93C-8191-3241-8A23-E9A5E8781D29}"/>
+          </ac:spMkLst>
+        </pc:spChg>
       </pc:sldChg>
       <pc:sldChg chg="modSp new mod">
-        <pc:chgData name="Himmelbauer, Clara" userId="12d7e35a-e13e-4c49-b9be-a181bf83ad46" providerId="ADAL" clId="{26A58844-2FB7-4F90-9501-5CC089926BE8}" dt="2025-01-27T10:34:47.460" v="559" actId="20577"/>
+        <pc:chgData name="Himmelbauer, Clara" userId="12d7e35a-e13e-4c49-b9be-a181bf83ad46" providerId="ADAL" clId="{26A58844-2FB7-4F90-9501-5CC089926BE8}" dt="2025-02-06T16:42:27.676" v="686"/>
         <pc:sldMkLst>
           <pc:docMk/>
           <pc:sldMk cId="2842475990" sldId="263"/>
         </pc:sldMkLst>
         <pc:spChg chg="mod">
-          <ac:chgData name="Himmelbauer, Clara" userId="12d7e35a-e13e-4c49-b9be-a181bf83ad46" providerId="ADAL" clId="{26A58844-2FB7-4F90-9501-5CC089926BE8}" dt="2025-01-27T10:33:07.570" v="268" actId="20577"/>
+          <ac:chgData name="Himmelbauer, Clara" userId="12d7e35a-e13e-4c49-b9be-a181bf83ad46" providerId="ADAL" clId="{26A58844-2FB7-4F90-9501-5CC089926BE8}" dt="2025-02-06T16:42:27.676" v="686"/>
           <ac:spMkLst>
             <pc:docMk/>
             <pc:sldMk cId="2842475990" sldId="263"/>
@@ -297,7 +315,7 @@
           </ac:spMkLst>
         </pc:spChg>
         <pc:spChg chg="mod">
-          <ac:chgData name="Himmelbauer, Clara" userId="12d7e35a-e13e-4c49-b9be-a181bf83ad46" providerId="ADAL" clId="{26A58844-2FB7-4F90-9501-5CC089926BE8}" dt="2025-01-27T10:34:47.460" v="559" actId="20577"/>
+          <ac:chgData name="Himmelbauer, Clara" userId="12d7e35a-e13e-4c49-b9be-a181bf83ad46" providerId="ADAL" clId="{26A58844-2FB7-4F90-9501-5CC089926BE8}" dt="2025-02-06T16:42:27.676" v="686"/>
           <ac:spMkLst>
             <pc:docMk/>
             <pc:sldMk cId="2842475990" sldId="263"/>
@@ -306,19 +324,96 @@
         </pc:spChg>
       </pc:sldChg>
       <pc:sldChg chg="modSp new mod">
-        <pc:chgData name="Himmelbauer, Clara" userId="12d7e35a-e13e-4c49-b9be-a181bf83ad46" providerId="ADAL" clId="{26A58844-2FB7-4F90-9501-5CC089926BE8}" dt="2025-01-27T10:35:21.864" v="630" actId="20577"/>
+        <pc:chgData name="Himmelbauer, Clara" userId="12d7e35a-e13e-4c49-b9be-a181bf83ad46" providerId="ADAL" clId="{26A58844-2FB7-4F90-9501-5CC089926BE8}" dt="2025-02-06T16:42:27.676" v="686"/>
         <pc:sldMkLst>
           <pc:docMk/>
           <pc:sldMk cId="2130042208" sldId="264"/>
         </pc:sldMkLst>
         <pc:spChg chg="mod">
-          <ac:chgData name="Himmelbauer, Clara" userId="12d7e35a-e13e-4c49-b9be-a181bf83ad46" providerId="ADAL" clId="{26A58844-2FB7-4F90-9501-5CC089926BE8}" dt="2025-01-27T10:35:21.864" v="630" actId="20577"/>
+          <ac:chgData name="Himmelbauer, Clara" userId="12d7e35a-e13e-4c49-b9be-a181bf83ad46" providerId="ADAL" clId="{26A58844-2FB7-4F90-9501-5CC089926BE8}" dt="2025-02-06T16:42:27.676" v="686"/>
           <ac:spMkLst>
             <pc:docMk/>
             <pc:sldMk cId="2130042208" sldId="264"/>
             <ac:spMk id="2" creationId="{B0F12AB1-0276-235A-A78F-AC7C856D3ABB}"/>
           </ac:spMkLst>
         </pc:spChg>
+        <pc:spChg chg="mod">
+          <ac:chgData name="Himmelbauer, Clara" userId="12d7e35a-e13e-4c49-b9be-a181bf83ad46" providerId="ADAL" clId="{26A58844-2FB7-4F90-9501-5CC089926BE8}" dt="2025-02-06T16:42:27.676" v="686"/>
+          <ac:spMkLst>
+            <pc:docMk/>
+            <pc:sldMk cId="2130042208" sldId="264"/>
+            <ac:spMk id="3" creationId="{AC7F4988-7C23-A449-FACD-67CE41C01E74}"/>
+          </ac:spMkLst>
+        </pc:spChg>
+      </pc:sldChg>
+      <pc:sldChg chg="modSp new mod">
+        <pc:chgData name="Himmelbauer, Clara" userId="12d7e35a-e13e-4c49-b9be-a181bf83ad46" providerId="ADAL" clId="{26A58844-2FB7-4F90-9501-5CC089926BE8}" dt="2025-02-06T16:42:27.676" v="686"/>
+        <pc:sldMkLst>
+          <pc:docMk/>
+          <pc:sldMk cId="687750663" sldId="265"/>
+        </pc:sldMkLst>
+        <pc:spChg chg="mod">
+          <ac:chgData name="Himmelbauer, Clara" userId="12d7e35a-e13e-4c49-b9be-a181bf83ad46" providerId="ADAL" clId="{26A58844-2FB7-4F90-9501-5CC089926BE8}" dt="2025-02-06T16:42:27.676" v="686"/>
+          <ac:spMkLst>
+            <pc:docMk/>
+            <pc:sldMk cId="687750663" sldId="265"/>
+            <ac:spMk id="2" creationId="{395F23DD-25C9-9DC6-905F-79D710601BB1}"/>
+          </ac:spMkLst>
+        </pc:spChg>
+        <pc:spChg chg="mod">
+          <ac:chgData name="Himmelbauer, Clara" userId="12d7e35a-e13e-4c49-b9be-a181bf83ad46" providerId="ADAL" clId="{26A58844-2FB7-4F90-9501-5CC089926BE8}" dt="2025-02-06T16:42:27.676" v="686"/>
+          <ac:spMkLst>
+            <pc:docMk/>
+            <pc:sldMk cId="687750663" sldId="265"/>
+            <ac:spMk id="3" creationId="{71DD4476-5570-B562-B1EA-F3653F25F252}"/>
+          </ac:spMkLst>
+        </pc:spChg>
+      </pc:sldChg>
+      <pc:sldChg chg="new del ord">
+        <pc:chgData name="Himmelbauer, Clara" userId="12d7e35a-e13e-4c49-b9be-a181bf83ad46" providerId="ADAL" clId="{26A58844-2FB7-4F90-9501-5CC089926BE8}" dt="2025-02-06T16:43:06.451" v="693" actId="2696"/>
+        <pc:sldMkLst>
+          <pc:docMk/>
+          <pc:sldMk cId="1814066068" sldId="266"/>
+        </pc:sldMkLst>
+      </pc:sldChg>
+      <pc:sldChg chg="addSp delSp modSp new mod ord">
+        <pc:chgData name="Himmelbauer, Clara" userId="12d7e35a-e13e-4c49-b9be-a181bf83ad46" providerId="ADAL" clId="{26A58844-2FB7-4F90-9501-5CC089926BE8}" dt="2025-02-06T16:45:20.719" v="810" actId="1076"/>
+        <pc:sldMkLst>
+          <pc:docMk/>
+          <pc:sldMk cId="1368333132" sldId="267"/>
+        </pc:sldMkLst>
+        <pc:spChg chg="mod">
+          <ac:chgData name="Himmelbauer, Clara" userId="12d7e35a-e13e-4c49-b9be-a181bf83ad46" providerId="ADAL" clId="{26A58844-2FB7-4F90-9501-5CC089926BE8}" dt="2025-02-06T16:43:13.462" v="725" actId="20577"/>
+          <ac:spMkLst>
+            <pc:docMk/>
+            <pc:sldMk cId="1368333132" sldId="267"/>
+            <ac:spMk id="2" creationId="{2236A51D-002B-D99F-E2D1-2CA94C39C13E}"/>
+          </ac:spMkLst>
+        </pc:spChg>
+        <pc:spChg chg="add del mod">
+          <ac:chgData name="Himmelbauer, Clara" userId="12d7e35a-e13e-4c49-b9be-a181bf83ad46" providerId="ADAL" clId="{26A58844-2FB7-4F90-9501-5CC089926BE8}" dt="2025-02-06T16:43:29.524" v="729" actId="3680"/>
+          <ac:spMkLst>
+            <pc:docMk/>
+            <pc:sldMk cId="1368333132" sldId="267"/>
+            <ac:spMk id="3" creationId="{ECE2AD14-DACF-15B1-8FD1-8FD0EA9B2DDC}"/>
+          </ac:spMkLst>
+        </pc:spChg>
+        <pc:graphicFrameChg chg="add del mod ord modGraphic">
+          <ac:chgData name="Himmelbauer, Clara" userId="12d7e35a-e13e-4c49-b9be-a181bf83ad46" providerId="ADAL" clId="{26A58844-2FB7-4F90-9501-5CC089926BE8}" dt="2025-02-06T16:43:26.443" v="728" actId="3680"/>
+          <ac:graphicFrameMkLst>
+            <pc:docMk/>
+            <pc:sldMk cId="1368333132" sldId="267"/>
+            <ac:graphicFrameMk id="5" creationId="{AC264F7F-E13E-4185-00F9-E5E4665EE62F}"/>
+          </ac:graphicFrameMkLst>
+        </pc:graphicFrameChg>
+        <pc:graphicFrameChg chg="add mod ord modGraphic">
+          <ac:chgData name="Himmelbauer, Clara" userId="12d7e35a-e13e-4c49-b9be-a181bf83ad46" providerId="ADAL" clId="{26A58844-2FB7-4F90-9501-5CC089926BE8}" dt="2025-02-06T16:45:20.719" v="810" actId="1076"/>
+          <ac:graphicFrameMkLst>
+            <pc:docMk/>
+            <pc:sldMk cId="1368333132" sldId="267"/>
+            <ac:graphicFrameMk id="6" creationId="{EC52E802-E748-5410-3E3F-376F55A08763}"/>
+          </ac:graphicFrameMkLst>
+        </pc:graphicFrameChg>
       </pc:sldChg>
     </pc:docChg>
   </pc:docChgLst>
@@ -1242,8 +1337,18 @@
 </file>
 
 <file path=ppt/slideLayouts/slideLayout1.xml><?xml version="1.0" encoding="utf-8"?>
-<p:sldLayout xmlns:a="http://schemas.openxmlformats.org/drawingml/2006/main" xmlns:r="http://schemas.openxmlformats.org/officeDocument/2006/relationships" xmlns:p="http://schemas.openxmlformats.org/presentationml/2006/main" type="title" preserve="1">
+<p:sldLayout xmlns:a="http://schemas.openxmlformats.org/drawingml/2006/main" xmlns:r="http://schemas.openxmlformats.org/officeDocument/2006/relationships" xmlns:p="http://schemas.openxmlformats.org/presentationml/2006/main" showMasterSp="0" type="title" preserve="1">
   <p:cSld name="Titelfolie">
+    <p:bg>
+      <p:bgPr>
+        <a:solidFill>
+          <a:schemeClr val="bg2">
+            <a:lumMod val="75000"/>
+          </a:schemeClr>
+        </a:solidFill>
+        <a:effectLst/>
+      </p:bgPr>
+    </p:bg>
     <p:spTree>
       <p:nvGrpSpPr>
         <p:cNvPr id="1" name=""/>
@@ -1260,13 +1365,7 @@
       </p:grpSpPr>
       <p:sp>
         <p:nvSpPr>
-          <p:cNvPr id="2" name="Titel 1">
-            <a:extLst>
-              <a:ext uri="{FF2B5EF4-FFF2-40B4-BE49-F238E27FC236}">
-                <a16:creationId xmlns:a16="http://schemas.microsoft.com/office/drawing/2014/main" id="{0FF04F0A-7273-5C76-3EF0-25DE2CEE183A}"/>
-              </a:ext>
-            </a:extLst>
-          </p:cNvPr>
+          <p:cNvPr id="2" name="Title 1"/>
           <p:cNvSpPr>
             <a:spLocks noGrp="1"/>
           </p:cNvSpPr>
@@ -1276,15 +1375,24 @@
         </p:nvSpPr>
         <p:spPr>
           <a:xfrm>
-            <a:off x="1524000" y="1122363"/>
-            <a:ext cx="9144000" cy="2387600"/>
+            <a:off x="1261872" y="758952"/>
+            <a:ext cx="9418320" cy="4041648"/>
           </a:xfrm>
         </p:spPr>
         <p:txBody>
-          <a:bodyPr anchor="b"/>
+          <a:bodyPr anchor="b">
+            <a:normAutofit/>
+          </a:bodyPr>
           <a:lstStyle>
-            <a:lvl1pPr algn="ctr">
-              <a:defRPr sz="6000"/>
+            <a:lvl1pPr algn="l">
+              <a:lnSpc>
+                <a:spcPct val="85000"/>
+              </a:lnSpc>
+              <a:defRPr sz="7200" baseline="0">
+                <a:solidFill>
+                  <a:schemeClr val="tx1"/>
+                </a:solidFill>
+              </a:defRPr>
             </a:lvl1pPr>
           </a:lstStyle>
           <a:p>
@@ -1292,19 +1400,13 @@
               <a:rPr lang="de-DE"/>
               <a:t>Mastertitelformat bearbeiten</a:t>
             </a:r>
-            <a:endParaRPr lang="de-AT"/>
-          </a:p>
-        </p:txBody>
-      </p:sp>
-      <p:sp>
-        <p:nvSpPr>
-          <p:cNvPr id="3" name="Untertitel 2">
-            <a:extLst>
-              <a:ext uri="{FF2B5EF4-FFF2-40B4-BE49-F238E27FC236}">
-                <a16:creationId xmlns:a16="http://schemas.microsoft.com/office/drawing/2014/main" id="{D0A11E73-3E4F-FAF6-70D7-A5FBF7F8C548}"/>
-              </a:ext>
-            </a:extLst>
-          </p:cNvPr>
+            <a:endParaRPr lang="en-US" dirty="0"/>
+          </a:p>
+        </p:txBody>
+      </p:sp>
+      <p:sp>
+        <p:nvSpPr>
+          <p:cNvPr id="3" name="Subtitle 2"/>
           <p:cNvSpPr>
             <a:spLocks noGrp="1"/>
           </p:cNvSpPr>
@@ -1314,48 +1416,56 @@
         </p:nvSpPr>
         <p:spPr>
           <a:xfrm>
-            <a:off x="1524000" y="3602038"/>
-            <a:ext cx="9144000" cy="1655762"/>
+            <a:off x="1261872" y="4800600"/>
+            <a:ext cx="9418320" cy="1691640"/>
           </a:xfrm>
         </p:spPr>
         <p:txBody>
-          <a:bodyPr/>
+          <a:bodyPr>
+            <a:normAutofit/>
+          </a:bodyPr>
           <a:lstStyle>
-            <a:lvl1pPr marL="0" indent="0" algn="ctr">
+            <a:lvl1pPr marL="0" indent="0" algn="l">
               <a:buNone/>
-              <a:defRPr sz="2400"/>
+              <a:defRPr sz="2200" baseline="0">
+                <a:solidFill>
+                  <a:schemeClr val="tx1">
+                    <a:lumMod val="75000"/>
+                  </a:schemeClr>
+                </a:solidFill>
+              </a:defRPr>
             </a:lvl1pPr>
             <a:lvl2pPr marL="457200" indent="0" algn="ctr">
               <a:buNone/>
-              <a:defRPr sz="2000"/>
+              <a:defRPr sz="2200"/>
             </a:lvl2pPr>
             <a:lvl3pPr marL="914400" indent="0" algn="ctr">
               <a:buNone/>
-              <a:defRPr sz="1800"/>
+              <a:defRPr sz="2200"/>
             </a:lvl3pPr>
             <a:lvl4pPr marL="1371600" indent="0" algn="ctr">
               <a:buNone/>
-              <a:defRPr sz="1600"/>
+              <a:defRPr sz="2000"/>
             </a:lvl4pPr>
             <a:lvl5pPr marL="1828800" indent="0" algn="ctr">
               <a:buNone/>
-              <a:defRPr sz="1600"/>
+              <a:defRPr sz="2000"/>
             </a:lvl5pPr>
             <a:lvl6pPr marL="2286000" indent="0" algn="ctr">
               <a:buNone/>
-              <a:defRPr sz="1600"/>
+              <a:defRPr sz="2000"/>
             </a:lvl6pPr>
             <a:lvl7pPr marL="2743200" indent="0" algn="ctr">
               <a:buNone/>
-              <a:defRPr sz="1600"/>
+              <a:defRPr sz="2000"/>
             </a:lvl7pPr>
             <a:lvl8pPr marL="3200400" indent="0" algn="ctr">
               <a:buNone/>
-              <a:defRPr sz="1600"/>
+              <a:defRPr sz="2000"/>
             </a:lvl8pPr>
             <a:lvl9pPr marL="3657600" indent="0" algn="ctr">
               <a:buNone/>
-              <a:defRPr sz="1600"/>
+              <a:defRPr sz="2000"/>
             </a:lvl9pPr>
           </a:lstStyle>
           <a:p>
@@ -1363,19 +1473,13 @@
               <a:rPr lang="de-DE"/>
               <a:t>Master-Untertitelformat bearbeiten</a:t>
             </a:r>
-            <a:endParaRPr lang="de-AT"/>
-          </a:p>
-        </p:txBody>
-      </p:sp>
-      <p:sp>
-        <p:nvSpPr>
-          <p:cNvPr id="4" name="Datumsplatzhalter 3">
-            <a:extLst>
-              <a:ext uri="{FF2B5EF4-FFF2-40B4-BE49-F238E27FC236}">
-                <a16:creationId xmlns:a16="http://schemas.microsoft.com/office/drawing/2014/main" id="{40076F14-EF39-02A3-31D6-092B28A50EC5}"/>
-              </a:ext>
-            </a:extLst>
-          </p:cNvPr>
+            <a:endParaRPr lang="en-US" dirty="0"/>
+          </a:p>
+        </p:txBody>
+      </p:sp>
+      <p:sp>
+        <p:nvSpPr>
+          <p:cNvPr id="4" name="Date Placeholder 3"/>
           <p:cNvSpPr>
             <a:spLocks noGrp="1"/>
           </p:cNvSpPr>
@@ -1386,11 +1490,21 @@
         <p:spPr/>
         <p:txBody>
           <a:bodyPr/>
-          <a:lstStyle/>
+          <a:lstStyle>
+            <a:lvl1pPr>
+              <a:defRPr>
+                <a:solidFill>
+                  <a:schemeClr val="tx1">
+                    <a:lumMod val="50000"/>
+                  </a:schemeClr>
+                </a:solidFill>
+              </a:defRPr>
+            </a:lvl1pPr>
+          </a:lstStyle>
           <a:p>
             <a:fld id="{C7B5033B-E79C-4009-9C64-ABF7A52B63B5}" type="datetimeFigureOut">
               <a:rPr lang="de-AT" smtClean="0"/>
-              <a:t>27.01.2025</a:t>
+              <a:t>06.02.2025</a:t>
             </a:fld>
             <a:endParaRPr lang="de-AT"/>
           </a:p>
@@ -1398,13 +1512,7 @@
       </p:sp>
       <p:sp>
         <p:nvSpPr>
-          <p:cNvPr id="5" name="Fußzeilenplatzhalter 4">
-            <a:extLst>
-              <a:ext uri="{FF2B5EF4-FFF2-40B4-BE49-F238E27FC236}">
-                <a16:creationId xmlns:a16="http://schemas.microsoft.com/office/drawing/2014/main" id="{C22F2C99-35BA-4A33-4838-18087DDF864F}"/>
-              </a:ext>
-            </a:extLst>
-          </p:cNvPr>
+          <p:cNvPr id="5" name="Footer Placeholder 4"/>
           <p:cNvSpPr>
             <a:spLocks noGrp="1"/>
           </p:cNvSpPr>
@@ -1415,7 +1523,17 @@
         <p:spPr/>
         <p:txBody>
           <a:bodyPr/>
-          <a:lstStyle/>
+          <a:lstStyle>
+            <a:lvl1pPr>
+              <a:defRPr>
+                <a:solidFill>
+                  <a:schemeClr val="tx1">
+                    <a:lumMod val="65000"/>
+                  </a:schemeClr>
+                </a:solidFill>
+              </a:defRPr>
+            </a:lvl1pPr>
+          </a:lstStyle>
           <a:p>
             <a:endParaRPr lang="de-AT"/>
           </a:p>
@@ -1423,13 +1541,7 @@
       </p:sp>
       <p:sp>
         <p:nvSpPr>
-          <p:cNvPr id="6" name="Foliennummernplatzhalter 5">
-            <a:extLst>
-              <a:ext uri="{FF2B5EF4-FFF2-40B4-BE49-F238E27FC236}">
-                <a16:creationId xmlns:a16="http://schemas.microsoft.com/office/drawing/2014/main" id="{D7F376B2-AEE4-6E2E-FD98-7AA06CA6B55C}"/>
-              </a:ext>
-            </a:extLst>
-          </p:cNvPr>
+          <p:cNvPr id="6" name="Slide Number Placeholder 5"/>
           <p:cNvSpPr>
             <a:spLocks noGrp="1"/>
           </p:cNvSpPr>
@@ -1440,7 +1552,17 @@
         <p:spPr/>
         <p:txBody>
           <a:bodyPr/>
-          <a:lstStyle/>
+          <a:lstStyle>
+            <a:lvl1pPr>
+              <a:defRPr>
+                <a:solidFill>
+                  <a:schemeClr val="tx1">
+                    <a:lumMod val="65000"/>
+                  </a:schemeClr>
+                </a:solidFill>
+              </a:defRPr>
+            </a:lvl1pPr>
+          </a:lstStyle>
           <a:p>
             <a:fld id="{58087E24-FB43-451A-9D0B-7B980EC5ED81}" type="slidenum">
               <a:rPr lang="de-AT" smtClean="0"/>
@@ -1450,15 +1572,53 @@
           </a:p>
         </p:txBody>
       </p:sp>
+      <p:sp>
+        <p:nvSpPr>
+          <p:cNvPr id="7" name="Rectangle 6"/>
+          <p:cNvSpPr/>
+          <p:nvPr/>
+        </p:nvSpPr>
+        <p:spPr>
+          <a:xfrm>
+            <a:off x="0" y="0"/>
+            <a:ext cx="457200" cy="6858000"/>
+          </a:xfrm>
+          <a:prstGeom prst="rect">
+            <a:avLst/>
+          </a:prstGeom>
+          <a:solidFill>
+            <a:schemeClr val="accent1"/>
+          </a:solidFill>
+          <a:ln>
+            <a:noFill/>
+          </a:ln>
+        </p:spPr>
+        <p:style>
+          <a:lnRef idx="2">
+            <a:schemeClr val="accent1">
+              <a:shade val="50000"/>
+            </a:schemeClr>
+          </a:lnRef>
+          <a:fillRef idx="1">
+            <a:schemeClr val="accent1"/>
+          </a:fillRef>
+          <a:effectRef idx="0">
+            <a:schemeClr val="accent1"/>
+          </a:effectRef>
+          <a:fontRef idx="minor">
+            <a:schemeClr val="lt1"/>
+          </a:fontRef>
+        </p:style>
+      </p:sp>
     </p:spTree>
     <p:extLst>
       <p:ext uri="{BB962C8B-B14F-4D97-AF65-F5344CB8AC3E}">
-        <p14:creationId xmlns:p14="http://schemas.microsoft.com/office/powerpoint/2010/main" val="2378216249"/>
+        <p14:creationId xmlns:p14="http://schemas.microsoft.com/office/powerpoint/2010/main" val="1278097906"/>
       </p:ext>
     </p:extLst>
   </p:cSld>
   <p:clrMapOvr>
-    <a:masterClrMapping/>
+    <a:overrideClrMapping bg1="dk1" tx1="lt1" bg2="dk2" tx2="lt2" accent1="accent1" accent2="accent2" accent3="accent3" accent4="accent4" accent5="accent5" accent6="accent6" hlink="hlink" folHlink="folHlink"/>
   </p:clrMapOvr>
 </p:sldLayout>
 </file>
@@ -1482,13 +1642,7 @@
       </p:grpSpPr>
       <p:sp>
         <p:nvSpPr>
-          <p:cNvPr id="2" name="Titel 1">
-            <a:extLst>
-              <a:ext uri="{FF2B5EF4-FFF2-40B4-BE49-F238E27FC236}">
-                <a16:creationId xmlns:a16="http://schemas.microsoft.com/office/drawing/2014/main" id="{23976F70-A149-50D4-65A1-50C9FABB844B}"/>
-              </a:ext>
-            </a:extLst>
-          </p:cNvPr>
+          <p:cNvPr id="2" name="Title 1"/>
           <p:cNvSpPr>
             <a:spLocks noGrp="1"/>
           </p:cNvSpPr>
@@ -1505,19 +1659,13 @@
               <a:rPr lang="de-DE"/>
               <a:t>Mastertitelformat bearbeiten</a:t>
             </a:r>
-            <a:endParaRPr lang="de-AT"/>
-          </a:p>
-        </p:txBody>
-      </p:sp>
-      <p:sp>
-        <p:nvSpPr>
-          <p:cNvPr id="3" name="Vertikaler Textplatzhalter 2">
-            <a:extLst>
-              <a:ext uri="{FF2B5EF4-FFF2-40B4-BE49-F238E27FC236}">
-                <a16:creationId xmlns:a16="http://schemas.microsoft.com/office/drawing/2014/main" id="{9C0EB4F6-179A-D8CA-49F4-F236C8BC7955}"/>
-              </a:ext>
-            </a:extLst>
-          </p:cNvPr>
+            <a:endParaRPr lang="en-US" dirty="0"/>
+          </a:p>
+        </p:txBody>
+      </p:sp>
+      <p:sp>
+        <p:nvSpPr>
+          <p:cNvPr id="3" name="Vertical Text Placeholder 2"/>
           <p:cNvSpPr>
             <a:spLocks noGrp="1"/>
           </p:cNvSpPr>
@@ -1563,19 +1711,13 @@
               <a:rPr lang="de-DE"/>
               <a:t>Fünfte Ebene</a:t>
             </a:r>
-            <a:endParaRPr lang="de-AT"/>
-          </a:p>
-        </p:txBody>
-      </p:sp>
-      <p:sp>
-        <p:nvSpPr>
-          <p:cNvPr id="4" name="Datumsplatzhalter 3">
-            <a:extLst>
-              <a:ext uri="{FF2B5EF4-FFF2-40B4-BE49-F238E27FC236}">
-                <a16:creationId xmlns:a16="http://schemas.microsoft.com/office/drawing/2014/main" id="{83F5A41D-C1A2-EC1C-FE31-F02160178057}"/>
-              </a:ext>
-            </a:extLst>
-          </p:cNvPr>
+            <a:endParaRPr lang="en-US" dirty="0"/>
+          </a:p>
+        </p:txBody>
+      </p:sp>
+      <p:sp>
+        <p:nvSpPr>
+          <p:cNvPr id="4" name="Date Placeholder 3"/>
           <p:cNvSpPr>
             <a:spLocks noGrp="1"/>
           </p:cNvSpPr>
@@ -1590,7 +1732,7 @@
           <a:p>
             <a:fld id="{C7B5033B-E79C-4009-9C64-ABF7A52B63B5}" type="datetimeFigureOut">
               <a:rPr lang="de-AT" smtClean="0"/>
-              <a:t>27.01.2025</a:t>
+              <a:t>06.02.2025</a:t>
             </a:fld>
             <a:endParaRPr lang="de-AT"/>
           </a:p>
@@ -1598,13 +1740,7 @@
       </p:sp>
       <p:sp>
         <p:nvSpPr>
-          <p:cNvPr id="5" name="Fußzeilenplatzhalter 4">
-            <a:extLst>
-              <a:ext uri="{FF2B5EF4-FFF2-40B4-BE49-F238E27FC236}">
-                <a16:creationId xmlns:a16="http://schemas.microsoft.com/office/drawing/2014/main" id="{FA10E80F-E7FA-65FA-66AE-ADD1148CD08D}"/>
-              </a:ext>
-            </a:extLst>
-          </p:cNvPr>
+          <p:cNvPr id="5" name="Footer Placeholder 4"/>
           <p:cNvSpPr>
             <a:spLocks noGrp="1"/>
           </p:cNvSpPr>
@@ -1623,13 +1759,7 @@
       </p:sp>
       <p:sp>
         <p:nvSpPr>
-          <p:cNvPr id="6" name="Foliennummernplatzhalter 5">
-            <a:extLst>
-              <a:ext uri="{FF2B5EF4-FFF2-40B4-BE49-F238E27FC236}">
-                <a16:creationId xmlns:a16="http://schemas.microsoft.com/office/drawing/2014/main" id="{47664D1A-C3C1-2245-9D13-3B903672A6A6}"/>
-              </a:ext>
-            </a:extLst>
-          </p:cNvPr>
+          <p:cNvPr id="6" name="Slide Number Placeholder 5"/>
           <p:cNvSpPr>
             <a:spLocks noGrp="1"/>
           </p:cNvSpPr>
@@ -1653,7 +1783,7 @@
     </p:spTree>
     <p:extLst>
       <p:ext uri="{BB962C8B-B14F-4D97-AF65-F5344CB8AC3E}">
-        <p14:creationId xmlns:p14="http://schemas.microsoft.com/office/powerpoint/2010/main" val="110271739"/>
+        <p14:creationId xmlns:p14="http://schemas.microsoft.com/office/powerpoint/2010/main" val="2121069891"/>
       </p:ext>
     </p:extLst>
   </p:cSld>
@@ -1682,13 +1812,7 @@
       </p:grpSpPr>
       <p:sp>
         <p:nvSpPr>
-          <p:cNvPr id="2" name="Vertikaler Titel 1">
-            <a:extLst>
-              <a:ext uri="{FF2B5EF4-FFF2-40B4-BE49-F238E27FC236}">
-                <a16:creationId xmlns:a16="http://schemas.microsoft.com/office/drawing/2014/main" id="{C0AC0641-C7B4-9832-7DDD-DBEF8443CD44}"/>
-              </a:ext>
-            </a:extLst>
-          </p:cNvPr>
+          <p:cNvPr id="2" name="Vertical Title 1"/>
           <p:cNvSpPr>
             <a:spLocks noGrp="1"/>
           </p:cNvSpPr>
@@ -1698,8 +1822,8 @@
         </p:nvSpPr>
         <p:spPr>
           <a:xfrm>
-            <a:off x="8724900" y="365125"/>
-            <a:ext cx="2628900" cy="5811838"/>
+            <a:off x="8648700" y="381000"/>
+            <a:ext cx="2476500" cy="5897562"/>
           </a:xfrm>
         </p:spPr>
         <p:txBody>
@@ -1710,19 +1834,13 @@
               <a:rPr lang="de-DE"/>
               <a:t>Mastertitelformat bearbeiten</a:t>
             </a:r>
-            <a:endParaRPr lang="de-AT"/>
-          </a:p>
-        </p:txBody>
-      </p:sp>
-      <p:sp>
-        <p:nvSpPr>
-          <p:cNvPr id="3" name="Vertikaler Textplatzhalter 2">
-            <a:extLst>
-              <a:ext uri="{FF2B5EF4-FFF2-40B4-BE49-F238E27FC236}">
-                <a16:creationId xmlns:a16="http://schemas.microsoft.com/office/drawing/2014/main" id="{35965BEC-E9DC-54D0-69D3-3B18532B6948}"/>
-              </a:ext>
-            </a:extLst>
-          </p:cNvPr>
+            <a:endParaRPr lang="en-US" dirty="0"/>
+          </a:p>
+        </p:txBody>
+      </p:sp>
+      <p:sp>
+        <p:nvSpPr>
+          <p:cNvPr id="3" name="Vertical Text Placeholder 2"/>
           <p:cNvSpPr>
             <a:spLocks noGrp="1"/>
           </p:cNvSpPr>
@@ -1732,8 +1850,8 @@
         </p:nvSpPr>
         <p:spPr>
           <a:xfrm>
-            <a:off x="838200" y="365125"/>
-            <a:ext cx="7734300" cy="5811838"/>
+            <a:off x="762000" y="381000"/>
+            <a:ext cx="7734300" cy="5897562"/>
           </a:xfrm>
         </p:spPr>
         <p:txBody>
@@ -1773,19 +1891,13 @@
               <a:rPr lang="de-DE"/>
               <a:t>Fünfte Ebene</a:t>
             </a:r>
-            <a:endParaRPr lang="de-AT"/>
-          </a:p>
-        </p:txBody>
-      </p:sp>
-      <p:sp>
-        <p:nvSpPr>
-          <p:cNvPr id="4" name="Datumsplatzhalter 3">
-            <a:extLst>
-              <a:ext uri="{FF2B5EF4-FFF2-40B4-BE49-F238E27FC236}">
-                <a16:creationId xmlns:a16="http://schemas.microsoft.com/office/drawing/2014/main" id="{26E62068-F016-5370-A158-ABD420BE42E4}"/>
-              </a:ext>
-            </a:extLst>
-          </p:cNvPr>
+            <a:endParaRPr lang="en-US" dirty="0"/>
+          </a:p>
+        </p:txBody>
+      </p:sp>
+      <p:sp>
+        <p:nvSpPr>
+          <p:cNvPr id="4" name="Date Placeholder 3"/>
           <p:cNvSpPr>
             <a:spLocks noGrp="1"/>
           </p:cNvSpPr>
@@ -1800,7 +1912,7 @@
           <a:p>
             <a:fld id="{C7B5033B-E79C-4009-9C64-ABF7A52B63B5}" type="datetimeFigureOut">
               <a:rPr lang="de-AT" smtClean="0"/>
-              <a:t>27.01.2025</a:t>
+              <a:t>06.02.2025</a:t>
             </a:fld>
             <a:endParaRPr lang="de-AT"/>
           </a:p>
@@ -1808,13 +1920,7 @@
       </p:sp>
       <p:sp>
         <p:nvSpPr>
-          <p:cNvPr id="5" name="Fußzeilenplatzhalter 4">
-            <a:extLst>
-              <a:ext uri="{FF2B5EF4-FFF2-40B4-BE49-F238E27FC236}">
-                <a16:creationId xmlns:a16="http://schemas.microsoft.com/office/drawing/2014/main" id="{C5D33E99-44BB-9F20-7E04-EBEAF2B0BB3D}"/>
-              </a:ext>
-            </a:extLst>
-          </p:cNvPr>
+          <p:cNvPr id="5" name="Footer Placeholder 4"/>
           <p:cNvSpPr>
             <a:spLocks noGrp="1"/>
           </p:cNvSpPr>
@@ -1833,13 +1939,7 @@
       </p:sp>
       <p:sp>
         <p:nvSpPr>
-          <p:cNvPr id="6" name="Foliennummernplatzhalter 5">
-            <a:extLst>
-              <a:ext uri="{FF2B5EF4-FFF2-40B4-BE49-F238E27FC236}">
-                <a16:creationId xmlns:a16="http://schemas.microsoft.com/office/drawing/2014/main" id="{4EFD67EB-D07E-F35D-7023-AC171215F013}"/>
-              </a:ext>
-            </a:extLst>
-          </p:cNvPr>
+          <p:cNvPr id="6" name="Slide Number Placeholder 5"/>
           <p:cNvSpPr>
             <a:spLocks noGrp="1"/>
           </p:cNvSpPr>
@@ -1863,7 +1963,7 @@
     </p:spTree>
     <p:extLst>
       <p:ext uri="{BB962C8B-B14F-4D97-AF65-F5344CB8AC3E}">
-        <p14:creationId xmlns:p14="http://schemas.microsoft.com/office/powerpoint/2010/main" val="2982026960"/>
+        <p14:creationId xmlns:p14="http://schemas.microsoft.com/office/powerpoint/2010/main" val="929664761"/>
       </p:ext>
     </p:extLst>
   </p:cSld>
@@ -1892,13 +1992,7 @@
       </p:grpSpPr>
       <p:sp>
         <p:nvSpPr>
-          <p:cNvPr id="2" name="Titel 1">
-            <a:extLst>
-              <a:ext uri="{FF2B5EF4-FFF2-40B4-BE49-F238E27FC236}">
-                <a16:creationId xmlns:a16="http://schemas.microsoft.com/office/drawing/2014/main" id="{664BF323-DD8A-280D-7288-428A5557C44A}"/>
-              </a:ext>
-            </a:extLst>
-          </p:cNvPr>
+          <p:cNvPr id="2" name="Title 1"/>
           <p:cNvSpPr>
             <a:spLocks noGrp="1"/>
           </p:cNvSpPr>
@@ -1915,19 +2009,13 @@
               <a:rPr lang="de-DE"/>
               <a:t>Mastertitelformat bearbeiten</a:t>
             </a:r>
-            <a:endParaRPr lang="de-AT"/>
-          </a:p>
-        </p:txBody>
-      </p:sp>
-      <p:sp>
-        <p:nvSpPr>
-          <p:cNvPr id="3" name="Inhaltsplatzhalter 2">
-            <a:extLst>
-              <a:ext uri="{FF2B5EF4-FFF2-40B4-BE49-F238E27FC236}">
-                <a16:creationId xmlns:a16="http://schemas.microsoft.com/office/drawing/2014/main" id="{90EE550B-3A9F-1872-F0D3-00B70BE0E337}"/>
-              </a:ext>
-            </a:extLst>
-          </p:cNvPr>
+            <a:endParaRPr lang="en-US" dirty="0"/>
+          </a:p>
+        </p:txBody>
+      </p:sp>
+      <p:sp>
+        <p:nvSpPr>
+          <p:cNvPr id="3" name="Content Placeholder 2"/>
           <p:cNvSpPr>
             <a:spLocks noGrp="1"/>
           </p:cNvSpPr>
@@ -1973,19 +2061,13 @@
               <a:rPr lang="de-DE"/>
               <a:t>Fünfte Ebene</a:t>
             </a:r>
-            <a:endParaRPr lang="de-AT"/>
-          </a:p>
-        </p:txBody>
-      </p:sp>
-      <p:sp>
-        <p:nvSpPr>
-          <p:cNvPr id="4" name="Datumsplatzhalter 3">
-            <a:extLst>
-              <a:ext uri="{FF2B5EF4-FFF2-40B4-BE49-F238E27FC236}">
-                <a16:creationId xmlns:a16="http://schemas.microsoft.com/office/drawing/2014/main" id="{801F508E-78F0-623E-43BD-226E5287C30F}"/>
-              </a:ext>
-            </a:extLst>
-          </p:cNvPr>
+            <a:endParaRPr lang="en-US" dirty="0"/>
+          </a:p>
+        </p:txBody>
+      </p:sp>
+      <p:sp>
+        <p:nvSpPr>
+          <p:cNvPr id="4" name="Date Placeholder 3"/>
           <p:cNvSpPr>
             <a:spLocks noGrp="1"/>
           </p:cNvSpPr>
@@ -2000,7 +2082,7 @@
           <a:p>
             <a:fld id="{C7B5033B-E79C-4009-9C64-ABF7A52B63B5}" type="datetimeFigureOut">
               <a:rPr lang="de-AT" smtClean="0"/>
-              <a:t>27.01.2025</a:t>
+              <a:t>06.02.2025</a:t>
             </a:fld>
             <a:endParaRPr lang="de-AT"/>
           </a:p>
@@ -2008,13 +2090,7 @@
       </p:sp>
       <p:sp>
         <p:nvSpPr>
-          <p:cNvPr id="5" name="Fußzeilenplatzhalter 4">
-            <a:extLst>
-              <a:ext uri="{FF2B5EF4-FFF2-40B4-BE49-F238E27FC236}">
-                <a16:creationId xmlns:a16="http://schemas.microsoft.com/office/drawing/2014/main" id="{77B3B919-20C2-D66F-037E-059247B8BA7A}"/>
-              </a:ext>
-            </a:extLst>
-          </p:cNvPr>
+          <p:cNvPr id="5" name="Footer Placeholder 4"/>
           <p:cNvSpPr>
             <a:spLocks noGrp="1"/>
           </p:cNvSpPr>
@@ -2033,13 +2109,7 @@
       </p:sp>
       <p:sp>
         <p:nvSpPr>
-          <p:cNvPr id="6" name="Foliennummernplatzhalter 5">
-            <a:extLst>
-              <a:ext uri="{FF2B5EF4-FFF2-40B4-BE49-F238E27FC236}">
-                <a16:creationId xmlns:a16="http://schemas.microsoft.com/office/drawing/2014/main" id="{C97ED101-457D-9C24-A464-50DCCF16DF0A}"/>
-              </a:ext>
-            </a:extLst>
-          </p:cNvPr>
+          <p:cNvPr id="6" name="Slide Number Placeholder 5"/>
           <p:cNvSpPr>
             <a:spLocks noGrp="1"/>
           </p:cNvSpPr>
@@ -2063,7 +2133,7 @@
     </p:spTree>
     <p:extLst>
       <p:ext uri="{BB962C8B-B14F-4D97-AF65-F5344CB8AC3E}">
-        <p14:creationId xmlns:p14="http://schemas.microsoft.com/office/powerpoint/2010/main" val="808701151"/>
+        <p14:creationId xmlns:p14="http://schemas.microsoft.com/office/powerpoint/2010/main" val="290952966"/>
       </p:ext>
     </p:extLst>
   </p:cSld>
@@ -2092,13 +2162,7 @@
       </p:grpSpPr>
       <p:sp>
         <p:nvSpPr>
-          <p:cNvPr id="2" name="Titel 1">
-            <a:extLst>
-              <a:ext uri="{FF2B5EF4-FFF2-40B4-BE49-F238E27FC236}">
-                <a16:creationId xmlns:a16="http://schemas.microsoft.com/office/drawing/2014/main" id="{29A3236B-DB5E-627A-170B-D73019FAA5D0}"/>
-              </a:ext>
-            </a:extLst>
-          </p:cNvPr>
+          <p:cNvPr id="2" name="Title 1"/>
           <p:cNvSpPr>
             <a:spLocks noGrp="1"/>
           </p:cNvSpPr>
@@ -2108,15 +2172,20 @@
         </p:nvSpPr>
         <p:spPr>
           <a:xfrm>
-            <a:off x="831850" y="1709738"/>
-            <a:ext cx="10515600" cy="2852737"/>
+            <a:off x="1261872" y="758952"/>
+            <a:ext cx="9418320" cy="4041648"/>
           </a:xfrm>
         </p:spPr>
         <p:txBody>
-          <a:bodyPr anchor="b"/>
+          <a:bodyPr anchor="b">
+            <a:normAutofit/>
+          </a:bodyPr>
           <a:lstStyle>
             <a:lvl1pPr>
-              <a:defRPr sz="6000"/>
+              <a:lnSpc>
+                <a:spcPct val="85000"/>
+              </a:lnSpc>
+              <a:defRPr sz="7200" b="0"/>
             </a:lvl1pPr>
           </a:lstStyle>
           <a:p>
@@ -2124,19 +2193,13 @@
               <a:rPr lang="de-DE"/>
               <a:t>Mastertitelformat bearbeiten</a:t>
             </a:r>
-            <a:endParaRPr lang="de-AT"/>
-          </a:p>
-        </p:txBody>
-      </p:sp>
-      <p:sp>
-        <p:nvSpPr>
-          <p:cNvPr id="3" name="Textplatzhalter 2">
-            <a:extLst>
-              <a:ext uri="{FF2B5EF4-FFF2-40B4-BE49-F238E27FC236}">
-                <a16:creationId xmlns:a16="http://schemas.microsoft.com/office/drawing/2014/main" id="{CFE1E035-7275-BADA-ACB3-C668696983D1}"/>
-              </a:ext>
-            </a:extLst>
-          </p:cNvPr>
+            <a:endParaRPr lang="en-US" dirty="0"/>
+          </a:p>
+        </p:txBody>
+      </p:sp>
+      <p:sp>
+        <p:nvSpPr>
+          <p:cNvPr id="3" name="Text Placeholder 2"/>
           <p:cNvSpPr>
             <a:spLocks noGrp="1"/>
           </p:cNvSpPr>
@@ -2146,99 +2209,102 @@
         </p:nvSpPr>
         <p:spPr>
           <a:xfrm>
-            <a:off x="831850" y="4589463"/>
-            <a:ext cx="10515600" cy="1500187"/>
+            <a:off x="1261872" y="4800600"/>
+            <a:ext cx="9418320" cy="1691640"/>
           </a:xfrm>
         </p:spPr>
         <p:txBody>
-          <a:bodyPr/>
+          <a:bodyPr anchor="t">
+            <a:normAutofit/>
+          </a:bodyPr>
           <a:lstStyle>
             <a:lvl1pPr marL="0" indent="0">
               <a:buNone/>
-              <a:defRPr sz="2400">
+              <a:defRPr sz="2200">
                 <a:solidFill>
                   <a:schemeClr val="tx1">
-                    <a:tint val="82000"/>
+                    <a:lumMod val="65000"/>
+                    <a:lumOff val="35000"/>
                   </a:schemeClr>
                 </a:solidFill>
               </a:defRPr>
             </a:lvl1pPr>
             <a:lvl2pPr marL="457200" indent="0">
               <a:buNone/>
-              <a:defRPr sz="2000">
+              <a:defRPr sz="1800">
                 <a:solidFill>
                   <a:schemeClr val="tx1">
-                    <a:tint val="82000"/>
+                    <a:tint val="75000"/>
                   </a:schemeClr>
                 </a:solidFill>
               </a:defRPr>
             </a:lvl2pPr>
             <a:lvl3pPr marL="914400" indent="0">
               <a:buNone/>
-              <a:defRPr sz="1800">
+              <a:defRPr sz="1600">
                 <a:solidFill>
                   <a:schemeClr val="tx1">
-                    <a:tint val="82000"/>
+                    <a:tint val="75000"/>
                   </a:schemeClr>
                 </a:solidFill>
               </a:defRPr>
             </a:lvl3pPr>
             <a:lvl4pPr marL="1371600" indent="0">
               <a:buNone/>
-              <a:defRPr sz="1600">
+              <a:defRPr sz="1400">
                 <a:solidFill>
                   <a:schemeClr val="tx1">
-                    <a:tint val="82000"/>
+                    <a:tint val="75000"/>
                   </a:schemeClr>
                 </a:solidFill>
               </a:defRPr>
             </a:lvl4pPr>
             <a:lvl5pPr marL="1828800" indent="0">
               <a:buNone/>
-              <a:defRPr sz="1600">
+              <a:defRPr sz="1400">
                 <a:solidFill>
                   <a:schemeClr val="tx1">
-                    <a:tint val="82000"/>
+                    <a:tint val="75000"/>
                   </a:schemeClr>
                 </a:solidFill>
               </a:defRPr>
             </a:lvl5pPr>
             <a:lvl6pPr marL="2286000" indent="0">
               <a:buNone/>
-              <a:defRPr sz="1600">
+              <a:defRPr sz="1400">
                 <a:solidFill>
                   <a:schemeClr val="tx1">
-                    <a:tint val="82000"/>
+                    <a:tint val="75000"/>
                   </a:schemeClr>
                 </a:solidFill>
               </a:defRPr>
             </a:lvl6pPr>
             <a:lvl7pPr marL="2743200" indent="0">
               <a:buNone/>
-              <a:defRPr sz="1600">
+              <a:defRPr sz="1400">
                 <a:solidFill>
                   <a:schemeClr val="tx1">
-                    <a:tint val="82000"/>
+                    <a:tint val="75000"/>
                   </a:schemeClr>
                 </a:solidFill>
               </a:defRPr>
             </a:lvl7pPr>
             <a:lvl8pPr marL="3200400" indent="0">
               <a:buNone/>
-              <a:defRPr sz="1600">
+              <a:defRPr sz="1400">
                 <a:solidFill>
                   <a:schemeClr val="tx1">
-                    <a:tint val="82000"/>
+                    <a:tint val="75000"/>
                   </a:schemeClr>
                 </a:solidFill>
               </a:defRPr>
             </a:lvl8pPr>
             <a:lvl9pPr marL="3657600" indent="0">
               <a:buNone/>
-              <a:defRPr sz="1600">
+              <a:defRPr sz="1400">
                 <a:solidFill>
                   <a:schemeClr val="tx1">
-                    <a:tint val="82000"/>
+                    <a:tint val="75000"/>
                   </a:schemeClr>
                 </a:solidFill>
               </a:defRPr>
@@ -2255,13 +2321,7 @@
       </p:sp>
       <p:sp>
         <p:nvSpPr>
-          <p:cNvPr id="4" name="Datumsplatzhalter 3">
-            <a:extLst>
-              <a:ext uri="{FF2B5EF4-FFF2-40B4-BE49-F238E27FC236}">
-                <a16:creationId xmlns:a16="http://schemas.microsoft.com/office/drawing/2014/main" id="{081D3B3F-B1DF-18F5-613C-4E10B973D82A}"/>
-              </a:ext>
-            </a:extLst>
-          </p:cNvPr>
+          <p:cNvPr id="4" name="Date Placeholder 3"/>
           <p:cNvSpPr>
             <a:spLocks noGrp="1"/>
           </p:cNvSpPr>
@@ -2276,7 +2336,7 @@
           <a:p>
             <a:fld id="{C7B5033B-E79C-4009-9C64-ABF7A52B63B5}" type="datetimeFigureOut">
               <a:rPr lang="de-AT" smtClean="0"/>
-              <a:t>27.01.2025</a:t>
+              <a:t>06.02.2025</a:t>
             </a:fld>
             <a:endParaRPr lang="de-AT"/>
           </a:p>
@@ -2284,13 +2344,7 @@
       </p:sp>
       <p:sp>
         <p:nvSpPr>
-          <p:cNvPr id="5" name="Fußzeilenplatzhalter 4">
-            <a:extLst>
-              <a:ext uri="{FF2B5EF4-FFF2-40B4-BE49-F238E27FC236}">
-                <a16:creationId xmlns:a16="http://schemas.microsoft.com/office/drawing/2014/main" id="{38C4AD0E-24D5-1F36-3AA3-DCD4CF168779}"/>
-              </a:ext>
-            </a:extLst>
-          </p:cNvPr>
+          <p:cNvPr id="5" name="Footer Placeholder 4"/>
           <p:cNvSpPr>
             <a:spLocks noGrp="1"/>
           </p:cNvSpPr>
@@ -2309,13 +2363,7 @@
       </p:sp>
       <p:sp>
         <p:nvSpPr>
-          <p:cNvPr id="6" name="Foliennummernplatzhalter 5">
-            <a:extLst>
-              <a:ext uri="{FF2B5EF4-FFF2-40B4-BE49-F238E27FC236}">
-                <a16:creationId xmlns:a16="http://schemas.microsoft.com/office/drawing/2014/main" id="{AF16F103-D9FC-FAAA-3AFF-8B222BEA5E2F}"/>
-              </a:ext>
-            </a:extLst>
-          </p:cNvPr>
+          <p:cNvPr id="6" name="Slide Number Placeholder 5"/>
           <p:cNvSpPr>
             <a:spLocks noGrp="1"/>
           </p:cNvSpPr>
@@ -2336,10 +2384,48 @@
           </a:p>
         </p:txBody>
       </p:sp>
+      <p:sp>
+        <p:nvSpPr>
+          <p:cNvPr id="7" name="Rectangle 6"/>
+          <p:cNvSpPr/>
+          <p:nvPr/>
+        </p:nvSpPr>
+        <p:spPr>
+          <a:xfrm>
+            <a:off x="0" y="0"/>
+            <a:ext cx="457200" cy="6858000"/>
+          </a:xfrm>
+          <a:prstGeom prst="rect">
+            <a:avLst/>
+          </a:prstGeom>
+          <a:solidFill>
+            <a:schemeClr val="accent1"/>
+          </a:solidFill>
+          <a:ln>
+            <a:noFill/>
+          </a:ln>
+        </p:spPr>
+        <p:style>
+          <a:lnRef idx="2">
+            <a:schemeClr val="accent1">
+              <a:shade val="50000"/>
+            </a:schemeClr>
+          </a:lnRef>
+          <a:fillRef idx="1">
+            <a:schemeClr val="accent1"/>
+          </a:fillRef>
+          <a:effectRef idx="0">
+            <a:schemeClr val="accent1"/>
+          </a:effectRef>
+          <a:fontRef idx="minor">
+            <a:schemeClr val="lt1"/>
+          </a:fontRef>
+        </p:style>
+      </p:sp>
     </p:spTree>
     <p:extLst>
       <p:ext uri="{BB962C8B-B14F-4D97-AF65-F5344CB8AC3E}">
-        <p14:creationId xmlns:p14="http://schemas.microsoft.com/office/powerpoint/2010/main" val="1934134644"/>
+        <p14:creationId xmlns:p14="http://schemas.microsoft.com/office/powerpoint/2010/main" val="4258150913"/>
       </p:ext>
     </p:extLst>
   </p:cSld>
@@ -2368,13 +2454,7 @@
       </p:grpSpPr>
       <p:sp>
         <p:nvSpPr>
-          <p:cNvPr id="2" name="Titel 1">
-            <a:extLst>
-              <a:ext uri="{FF2B5EF4-FFF2-40B4-BE49-F238E27FC236}">
-                <a16:creationId xmlns:a16="http://schemas.microsoft.com/office/drawing/2014/main" id="{840C2104-E8AE-3ED7-E2DD-4D6FE49583E7}"/>
-              </a:ext>
-            </a:extLst>
-          </p:cNvPr>
+          <p:cNvPr id="2" name="Title 1"/>
           <p:cNvSpPr>
             <a:spLocks noGrp="1"/>
           </p:cNvSpPr>
@@ -2391,19 +2471,13 @@
               <a:rPr lang="de-DE"/>
               <a:t>Mastertitelformat bearbeiten</a:t>
             </a:r>
-            <a:endParaRPr lang="de-AT"/>
-          </a:p>
-        </p:txBody>
-      </p:sp>
-      <p:sp>
-        <p:nvSpPr>
-          <p:cNvPr id="3" name="Inhaltsplatzhalter 2">
-            <a:extLst>
-              <a:ext uri="{FF2B5EF4-FFF2-40B4-BE49-F238E27FC236}">
-                <a16:creationId xmlns:a16="http://schemas.microsoft.com/office/drawing/2014/main" id="{9B563CDF-FF63-7E6D-4390-C57495B7B3E8}"/>
-              </a:ext>
-            </a:extLst>
-          </p:cNvPr>
+            <a:endParaRPr lang="en-US" dirty="0"/>
+          </a:p>
+        </p:txBody>
+      </p:sp>
+      <p:sp>
+        <p:nvSpPr>
+          <p:cNvPr id="3" name="Content Placeholder 2"/>
           <p:cNvSpPr>
             <a:spLocks noGrp="1"/>
           </p:cNvSpPr>
@@ -2413,13 +2487,41 @@
         </p:nvSpPr>
         <p:spPr>
           <a:xfrm>
-            <a:off x="838200" y="1825625"/>
-            <a:ext cx="5181600" cy="4351338"/>
+            <a:off x="1261872" y="1828800"/>
+            <a:ext cx="4480560" cy="4351337"/>
           </a:xfrm>
         </p:spPr>
         <p:txBody>
           <a:bodyPr/>
-          <a:lstStyle/>
+          <a:lstStyle>
+            <a:lvl1pPr>
+              <a:defRPr sz="1800"/>
+            </a:lvl1pPr>
+            <a:lvl2pPr>
+              <a:defRPr sz="1600"/>
+            </a:lvl2pPr>
+            <a:lvl3pPr>
+              <a:defRPr sz="1400"/>
+            </a:lvl3pPr>
+            <a:lvl4pPr>
+              <a:defRPr sz="1400"/>
+            </a:lvl4pPr>
+            <a:lvl5pPr>
+              <a:defRPr sz="1400"/>
+            </a:lvl5pPr>
+            <a:lvl6pPr>
+              <a:defRPr sz="1400"/>
+            </a:lvl6pPr>
+            <a:lvl7pPr>
+              <a:defRPr sz="1400"/>
+            </a:lvl7pPr>
+            <a:lvl8pPr>
+              <a:defRPr sz="1400"/>
+            </a:lvl8pPr>
+            <a:lvl9pPr>
+              <a:defRPr sz="1400"/>
+            </a:lvl9pPr>
+          </a:lstStyle>
           <a:p>
             <a:pPr lvl="0"/>
             <a:r>
@@ -2454,19 +2556,13 @@
               <a:rPr lang="de-DE"/>
               <a:t>Fünfte Ebene</a:t>
             </a:r>
-            <a:endParaRPr lang="de-AT"/>
-          </a:p>
-        </p:txBody>
-      </p:sp>
-      <p:sp>
-        <p:nvSpPr>
-          <p:cNvPr id="4" name="Inhaltsplatzhalter 3">
-            <a:extLst>
-              <a:ext uri="{FF2B5EF4-FFF2-40B4-BE49-F238E27FC236}">
-                <a16:creationId xmlns:a16="http://schemas.microsoft.com/office/drawing/2014/main" id="{BE4C48B9-0ED0-24C6-DD9C-77CED1A9DBC2}"/>
-              </a:ext>
-            </a:extLst>
-          </p:cNvPr>
+            <a:endParaRPr lang="en-US" dirty="0"/>
+          </a:p>
+        </p:txBody>
+      </p:sp>
+      <p:sp>
+        <p:nvSpPr>
+          <p:cNvPr id="4" name="Content Placeholder 3"/>
           <p:cNvSpPr>
             <a:spLocks noGrp="1"/>
           </p:cNvSpPr>
@@ -2476,13 +2572,41 @@
         </p:nvSpPr>
         <p:spPr>
           <a:xfrm>
-            <a:off x="6172200" y="1825625"/>
-            <a:ext cx="5181600" cy="4351338"/>
+            <a:off x="6126480" y="1828800"/>
+            <a:ext cx="4480560" cy="4351337"/>
           </a:xfrm>
         </p:spPr>
         <p:txBody>
           <a:bodyPr/>
-          <a:lstStyle/>
+          <a:lstStyle>
+            <a:lvl1pPr>
+              <a:defRPr sz="1800"/>
+            </a:lvl1pPr>
+            <a:lvl2pPr>
+              <a:defRPr sz="1600"/>
+            </a:lvl2pPr>
+            <a:lvl3pPr>
+              <a:defRPr sz="1400"/>
+            </a:lvl3pPr>
+            <a:lvl4pPr>
+              <a:defRPr sz="1400"/>
+            </a:lvl4pPr>
+            <a:lvl5pPr>
+              <a:defRPr sz="1400"/>
+            </a:lvl5pPr>
+            <a:lvl6pPr>
+              <a:defRPr sz="1400"/>
+            </a:lvl6pPr>
+            <a:lvl7pPr>
+              <a:defRPr sz="1400"/>
+            </a:lvl7pPr>
+            <a:lvl8pPr>
+              <a:defRPr sz="1400"/>
+            </a:lvl8pPr>
+            <a:lvl9pPr>
+              <a:defRPr sz="1400"/>
+            </a:lvl9pPr>
+          </a:lstStyle>
           <a:p>
             <a:pPr lvl="0"/>
             <a:r>
@@ -2517,19 +2641,13 @@
               <a:rPr lang="de-DE"/>
               <a:t>Fünfte Ebene</a:t>
             </a:r>
-            <a:endParaRPr lang="de-AT"/>
-          </a:p>
-        </p:txBody>
-      </p:sp>
-      <p:sp>
-        <p:nvSpPr>
-          <p:cNvPr id="5" name="Datumsplatzhalter 4">
-            <a:extLst>
-              <a:ext uri="{FF2B5EF4-FFF2-40B4-BE49-F238E27FC236}">
-                <a16:creationId xmlns:a16="http://schemas.microsoft.com/office/drawing/2014/main" id="{D68BF7BD-9573-E5F2-9F80-951EAACB0DE2}"/>
-              </a:ext>
-            </a:extLst>
-          </p:cNvPr>
+            <a:endParaRPr lang="en-US" dirty="0"/>
+          </a:p>
+        </p:txBody>
+      </p:sp>
+      <p:sp>
+        <p:nvSpPr>
+          <p:cNvPr id="5" name="Date Placeholder 4"/>
           <p:cNvSpPr>
             <a:spLocks noGrp="1"/>
           </p:cNvSpPr>
@@ -2544,7 +2662,7 @@
           <a:p>
             <a:fld id="{C7B5033B-E79C-4009-9C64-ABF7A52B63B5}" type="datetimeFigureOut">
               <a:rPr lang="de-AT" smtClean="0"/>
-              <a:t>27.01.2025</a:t>
+              <a:t>06.02.2025</a:t>
             </a:fld>
             <a:endParaRPr lang="de-AT"/>
           </a:p>
@@ -2552,13 +2670,7 @@
       </p:sp>
       <p:sp>
         <p:nvSpPr>
-          <p:cNvPr id="6" name="Fußzeilenplatzhalter 5">
-            <a:extLst>
-              <a:ext uri="{FF2B5EF4-FFF2-40B4-BE49-F238E27FC236}">
-                <a16:creationId xmlns:a16="http://schemas.microsoft.com/office/drawing/2014/main" id="{E4AAF85D-2527-9179-305D-B8E9CB3EFD92}"/>
-              </a:ext>
-            </a:extLst>
-          </p:cNvPr>
+          <p:cNvPr id="6" name="Footer Placeholder 5"/>
           <p:cNvSpPr>
             <a:spLocks noGrp="1"/>
           </p:cNvSpPr>
@@ -2577,13 +2689,7 @@
       </p:sp>
       <p:sp>
         <p:nvSpPr>
-          <p:cNvPr id="7" name="Foliennummernplatzhalter 6">
-            <a:extLst>
-              <a:ext uri="{FF2B5EF4-FFF2-40B4-BE49-F238E27FC236}">
-                <a16:creationId xmlns:a16="http://schemas.microsoft.com/office/drawing/2014/main" id="{D666357C-4801-721C-262A-61409A474855}"/>
-              </a:ext>
-            </a:extLst>
-          </p:cNvPr>
+          <p:cNvPr id="7" name="Slide Number Placeholder 6"/>
           <p:cNvSpPr>
             <a:spLocks noGrp="1"/>
           </p:cNvSpPr>
@@ -2607,7 +2713,7 @@
     </p:spTree>
     <p:extLst>
       <p:ext uri="{BB962C8B-B14F-4D97-AF65-F5344CB8AC3E}">
-        <p14:creationId xmlns:p14="http://schemas.microsoft.com/office/powerpoint/2010/main" val="3568542187"/>
+        <p14:creationId xmlns:p14="http://schemas.microsoft.com/office/powerpoint/2010/main" val="1144512035"/>
       </p:ext>
     </p:extLst>
   </p:cSld>
@@ -2636,66 +2742,58 @@
       </p:grpSpPr>
       <p:sp>
         <p:nvSpPr>
-          <p:cNvPr id="2" name="Titel 1">
-            <a:extLst>
-              <a:ext uri="{FF2B5EF4-FFF2-40B4-BE49-F238E27FC236}">
-                <a16:creationId xmlns:a16="http://schemas.microsoft.com/office/drawing/2014/main" id="{CEDC0801-74B2-965D-1F19-9BD6E2DA29D2}"/>
-              </a:ext>
-            </a:extLst>
-          </p:cNvPr>
+          <p:cNvPr id="10" name="Title 9"/>
           <p:cNvSpPr>
             <a:spLocks noGrp="1"/>
           </p:cNvSpPr>
           <p:nvPr>
             <p:ph type="title"/>
+          </p:nvPr>
+        </p:nvSpPr>
+        <p:spPr/>
+        <p:txBody>
+          <a:bodyPr/>
+          <a:lstStyle/>
+          <a:p>
+            <a:r>
+              <a:rPr lang="de-DE"/>
+              <a:t>Mastertitelformat bearbeiten</a:t>
+            </a:r>
+            <a:endParaRPr lang="en-US" dirty="0"/>
+          </a:p>
+        </p:txBody>
+      </p:sp>
+      <p:sp>
+        <p:nvSpPr>
+          <p:cNvPr id="3" name="Text Placeholder 2"/>
+          <p:cNvSpPr>
+            <a:spLocks noGrp="1"/>
+          </p:cNvSpPr>
+          <p:nvPr>
+            <p:ph type="body" idx="1"/>
           </p:nvPr>
         </p:nvSpPr>
         <p:spPr>
           <a:xfrm>
-            <a:off x="839788" y="365125"/>
-            <a:ext cx="10515600" cy="1325563"/>
+            <a:off x="1261872" y="1713655"/>
+            <a:ext cx="4480560" cy="731520"/>
           </a:xfrm>
         </p:spPr>
         <p:txBody>
-          <a:bodyPr/>
-          <a:lstStyle/>
-          <a:p>
-            <a:r>
-              <a:rPr lang="de-DE"/>
-              <a:t>Mastertitelformat bearbeiten</a:t>
-            </a:r>
-            <a:endParaRPr lang="de-AT"/>
-          </a:p>
-        </p:txBody>
-      </p:sp>
-      <p:sp>
-        <p:nvSpPr>
-          <p:cNvPr id="3" name="Textplatzhalter 2">
-            <a:extLst>
-              <a:ext uri="{FF2B5EF4-FFF2-40B4-BE49-F238E27FC236}">
-                <a16:creationId xmlns:a16="http://schemas.microsoft.com/office/drawing/2014/main" id="{281ABA0B-A669-B54D-DBDA-C14E2C2FC7B9}"/>
-              </a:ext>
-            </a:extLst>
-          </p:cNvPr>
-          <p:cNvSpPr>
-            <a:spLocks noGrp="1"/>
-          </p:cNvSpPr>
-          <p:nvPr>
-            <p:ph type="body" idx="1"/>
-          </p:nvPr>
-        </p:nvSpPr>
-        <p:spPr>
-          <a:xfrm>
-            <a:off x="839788" y="1681163"/>
-            <a:ext cx="5157787" cy="823912"/>
-          </a:xfrm>
-        </p:spPr>
-        <p:txBody>
-          <a:bodyPr anchor="b"/>
+          <a:bodyPr anchor="b">
+            <a:normAutofit/>
+          </a:bodyPr>
           <a:lstStyle>
             <a:lvl1pPr marL="0" indent="0">
+              <a:spcBef>
+                <a:spcPts val="0"/>
+              </a:spcBef>
               <a:buNone/>
-              <a:defRPr sz="2400" b="1"/>
+              <a:defRPr sz="2000" b="0">
+                <a:solidFill>
+                  <a:schemeClr val="tx2"/>
+                </a:solidFill>
+              </a:defRPr>
             </a:lvl1pPr>
             <a:lvl2pPr marL="457200" indent="0">
               <a:buNone/>
@@ -2741,13 +2839,7 @@
       </p:sp>
       <p:sp>
         <p:nvSpPr>
-          <p:cNvPr id="4" name="Inhaltsplatzhalter 3">
-            <a:extLst>
-              <a:ext uri="{FF2B5EF4-FFF2-40B4-BE49-F238E27FC236}">
-                <a16:creationId xmlns:a16="http://schemas.microsoft.com/office/drawing/2014/main" id="{BE191D70-4D36-9425-8C1C-7B889349453C}"/>
-              </a:ext>
-            </a:extLst>
-          </p:cNvPr>
+          <p:cNvPr id="4" name="Content Placeholder 3"/>
           <p:cNvSpPr>
             <a:spLocks noGrp="1"/>
           </p:cNvSpPr>
@@ -2757,13 +2849,41 @@
         </p:nvSpPr>
         <p:spPr>
           <a:xfrm>
-            <a:off x="839788" y="2505075"/>
-            <a:ext cx="5157787" cy="3684588"/>
+            <a:off x="1261872" y="2507550"/>
+            <a:ext cx="4480560" cy="3664650"/>
           </a:xfrm>
         </p:spPr>
         <p:txBody>
           <a:bodyPr/>
-          <a:lstStyle/>
+          <a:lstStyle>
+            <a:lvl1pPr>
+              <a:defRPr sz="1800"/>
+            </a:lvl1pPr>
+            <a:lvl2pPr>
+              <a:defRPr sz="1600"/>
+            </a:lvl2pPr>
+            <a:lvl3pPr>
+              <a:defRPr sz="1400"/>
+            </a:lvl3pPr>
+            <a:lvl4pPr>
+              <a:defRPr sz="1400"/>
+            </a:lvl4pPr>
+            <a:lvl5pPr>
+              <a:defRPr sz="1400"/>
+            </a:lvl5pPr>
+            <a:lvl6pPr>
+              <a:defRPr sz="1400"/>
+            </a:lvl6pPr>
+            <a:lvl7pPr>
+              <a:defRPr sz="1400"/>
+            </a:lvl7pPr>
+            <a:lvl8pPr>
+              <a:defRPr sz="1400"/>
+            </a:lvl8pPr>
+            <a:lvl9pPr>
+              <a:defRPr sz="1400"/>
+            </a:lvl9pPr>
+          </a:lstStyle>
           <a:p>
             <a:pPr lvl="0"/>
             <a:r>
@@ -2798,19 +2918,13 @@
               <a:rPr lang="de-DE"/>
               <a:t>Fünfte Ebene</a:t>
             </a:r>
-            <a:endParaRPr lang="de-AT"/>
-          </a:p>
-        </p:txBody>
-      </p:sp>
-      <p:sp>
-        <p:nvSpPr>
-          <p:cNvPr id="5" name="Textplatzhalter 4">
-            <a:extLst>
-              <a:ext uri="{FF2B5EF4-FFF2-40B4-BE49-F238E27FC236}">
-                <a16:creationId xmlns:a16="http://schemas.microsoft.com/office/drawing/2014/main" id="{1BABAE2F-8849-9C70-8C7C-F6BC5876D270}"/>
-              </a:ext>
-            </a:extLst>
-          </p:cNvPr>
+            <a:endParaRPr lang="en-US" dirty="0"/>
+          </a:p>
+        </p:txBody>
+      </p:sp>
+      <p:sp>
+        <p:nvSpPr>
+          <p:cNvPr id="5" name="Text Placeholder 4"/>
           <p:cNvSpPr>
             <a:spLocks noGrp="1"/>
           </p:cNvSpPr>
@@ -2820,16 +2934,31 @@
         </p:nvSpPr>
         <p:spPr>
           <a:xfrm>
-            <a:off x="6172200" y="1681163"/>
-            <a:ext cx="5183188" cy="823912"/>
+            <a:off x="6126480" y="1713655"/>
+            <a:ext cx="4480560" cy="731520"/>
           </a:xfrm>
         </p:spPr>
         <p:txBody>
-          <a:bodyPr anchor="b"/>
+          <a:bodyPr anchor="b">
+            <a:normAutofit/>
+          </a:bodyPr>
           <a:lstStyle>
             <a:lvl1pPr marL="0" indent="0">
+              <a:lnSpc>
+                <a:spcPct val="95000"/>
+              </a:lnSpc>
+              <a:spcBef>
+                <a:spcPts val="0"/>
+              </a:spcBef>
               <a:buNone/>
-              <a:defRPr sz="2400" b="1"/>
+              <a:defRPr lang="en-US" sz="2000" b="0" kern="1200" dirty="0">
+                <a:solidFill>
+                  <a:schemeClr val="tx2"/>
+                </a:solidFill>
+                <a:latin typeface="+mn-lt"/>
+                <a:ea typeface="+mn-ea"/>
+                <a:cs typeface="+mn-cs"/>
+              </a:defRPr>
             </a:lvl1pPr>
             <a:lvl2pPr marL="457200" indent="0">
               <a:buNone/>
@@ -2865,7 +2994,16 @@
             </a:lvl9pPr>
           </a:lstStyle>
           <a:p>
-            <a:pPr lvl="0"/>
+            <a:pPr marL="0" lvl="0" indent="0" algn="l" defTabSz="914400" rtl="0" eaLnBrk="1" latinLnBrk="0" hangingPunct="1">
+              <a:lnSpc>
+                <a:spcPct val="90000"/>
+              </a:lnSpc>
+              <a:spcBef>
+                <a:spcPts val="2000"/>
+              </a:spcBef>
+              <a:buFontTx/>
+              <a:buNone/>
+            </a:pPr>
             <a:r>
               <a:rPr lang="de-DE"/>
               <a:t>Mastertextformat bearbeiten</a:t>
@@ -2875,13 +3013,7 @@
       </p:sp>
       <p:sp>
         <p:nvSpPr>
-          <p:cNvPr id="6" name="Inhaltsplatzhalter 5">
-            <a:extLst>
-              <a:ext uri="{FF2B5EF4-FFF2-40B4-BE49-F238E27FC236}">
-                <a16:creationId xmlns:a16="http://schemas.microsoft.com/office/drawing/2014/main" id="{B889F023-EA6E-7096-CEDF-CDB414C873A2}"/>
-              </a:ext>
-            </a:extLst>
-          </p:cNvPr>
+          <p:cNvPr id="6" name="Content Placeholder 5"/>
           <p:cNvSpPr>
             <a:spLocks noGrp="1"/>
           </p:cNvSpPr>
@@ -2891,13 +3023,41 @@
         </p:nvSpPr>
         <p:spPr>
           <a:xfrm>
-            <a:off x="6172200" y="2505075"/>
-            <a:ext cx="5183188" cy="3684588"/>
+            <a:off x="6126480" y="2507550"/>
+            <a:ext cx="4480560" cy="3664650"/>
           </a:xfrm>
         </p:spPr>
         <p:txBody>
           <a:bodyPr/>
-          <a:lstStyle/>
+          <a:lstStyle>
+            <a:lvl1pPr>
+              <a:defRPr sz="1800"/>
+            </a:lvl1pPr>
+            <a:lvl2pPr>
+              <a:defRPr sz="1600"/>
+            </a:lvl2pPr>
+            <a:lvl3pPr>
+              <a:defRPr sz="1400"/>
+            </a:lvl3pPr>
+            <a:lvl4pPr>
+              <a:defRPr sz="1400"/>
+            </a:lvl4pPr>
+            <a:lvl5pPr>
+              <a:defRPr sz="1400"/>
+            </a:lvl5pPr>
+            <a:lvl6pPr>
+              <a:defRPr sz="1400"/>
+            </a:lvl6pPr>
+            <a:lvl7pPr>
+              <a:defRPr sz="1400"/>
+            </a:lvl7pPr>
+            <a:lvl8pPr>
+              <a:defRPr sz="1400"/>
+            </a:lvl8pPr>
+            <a:lvl9pPr>
+              <a:defRPr sz="1400"/>
+            </a:lvl9pPr>
+          </a:lstStyle>
           <a:p>
             <a:pPr lvl="0"/>
             <a:r>
@@ -2932,19 +3092,13 @@
               <a:rPr lang="de-DE"/>
               <a:t>Fünfte Ebene</a:t>
             </a:r>
-            <a:endParaRPr lang="de-AT"/>
-          </a:p>
-        </p:txBody>
-      </p:sp>
-      <p:sp>
-        <p:nvSpPr>
-          <p:cNvPr id="7" name="Datumsplatzhalter 6">
-            <a:extLst>
-              <a:ext uri="{FF2B5EF4-FFF2-40B4-BE49-F238E27FC236}">
-                <a16:creationId xmlns:a16="http://schemas.microsoft.com/office/drawing/2014/main" id="{8C4517F3-FEFF-8EE9-D930-A711095B3EB5}"/>
-              </a:ext>
-            </a:extLst>
-          </p:cNvPr>
+            <a:endParaRPr lang="en-US" dirty="0"/>
+          </a:p>
+        </p:txBody>
+      </p:sp>
+      <p:sp>
+        <p:nvSpPr>
+          <p:cNvPr id="7" name="Date Placeholder 6"/>
           <p:cNvSpPr>
             <a:spLocks noGrp="1"/>
           </p:cNvSpPr>
@@ -2959,7 +3113,7 @@
           <a:p>
             <a:fld id="{C7B5033B-E79C-4009-9C64-ABF7A52B63B5}" type="datetimeFigureOut">
               <a:rPr lang="de-AT" smtClean="0"/>
-              <a:t>27.01.2025</a:t>
+              <a:t>06.02.2025</a:t>
             </a:fld>
             <a:endParaRPr lang="de-AT"/>
           </a:p>
@@ -2967,13 +3121,7 @@
       </p:sp>
       <p:sp>
         <p:nvSpPr>
-          <p:cNvPr id="8" name="Fußzeilenplatzhalter 7">
-            <a:extLst>
-              <a:ext uri="{FF2B5EF4-FFF2-40B4-BE49-F238E27FC236}">
-                <a16:creationId xmlns:a16="http://schemas.microsoft.com/office/drawing/2014/main" id="{152DE8F8-B303-4708-AABA-8AF7F23EB99A}"/>
-              </a:ext>
-            </a:extLst>
-          </p:cNvPr>
+          <p:cNvPr id="8" name="Footer Placeholder 7"/>
           <p:cNvSpPr>
             <a:spLocks noGrp="1"/>
           </p:cNvSpPr>
@@ -2992,13 +3140,7 @@
       </p:sp>
       <p:sp>
         <p:nvSpPr>
-          <p:cNvPr id="9" name="Foliennummernplatzhalter 8">
-            <a:extLst>
-              <a:ext uri="{FF2B5EF4-FFF2-40B4-BE49-F238E27FC236}">
-                <a16:creationId xmlns:a16="http://schemas.microsoft.com/office/drawing/2014/main" id="{925FF062-000F-1F0A-539E-3D55B5F2B109}"/>
-              </a:ext>
-            </a:extLst>
-          </p:cNvPr>
+          <p:cNvPr id="9" name="Slide Number Placeholder 8"/>
           <p:cNvSpPr>
             <a:spLocks noGrp="1"/>
           </p:cNvSpPr>
@@ -3022,7 +3164,7 @@
     </p:spTree>
     <p:extLst>
       <p:ext uri="{BB962C8B-B14F-4D97-AF65-F5344CB8AC3E}">
-        <p14:creationId xmlns:p14="http://schemas.microsoft.com/office/powerpoint/2010/main" val="3772052715"/>
+        <p14:creationId xmlns:p14="http://schemas.microsoft.com/office/powerpoint/2010/main" val="2449433955"/>
       </p:ext>
     </p:extLst>
   </p:cSld>
@@ -3051,13 +3193,7 @@
       </p:grpSpPr>
       <p:sp>
         <p:nvSpPr>
-          <p:cNvPr id="2" name="Titel 1">
-            <a:extLst>
-              <a:ext uri="{FF2B5EF4-FFF2-40B4-BE49-F238E27FC236}">
-                <a16:creationId xmlns:a16="http://schemas.microsoft.com/office/drawing/2014/main" id="{9AC28909-3D5D-FEE8-61A6-39FCE0D5981E}"/>
-              </a:ext>
-            </a:extLst>
-          </p:cNvPr>
+          <p:cNvPr id="6" name="Title 5"/>
           <p:cNvSpPr>
             <a:spLocks noGrp="1"/>
           </p:cNvSpPr>
@@ -3074,19 +3210,13 @@
               <a:rPr lang="de-DE"/>
               <a:t>Mastertitelformat bearbeiten</a:t>
             </a:r>
-            <a:endParaRPr lang="de-AT"/>
-          </a:p>
-        </p:txBody>
-      </p:sp>
-      <p:sp>
-        <p:nvSpPr>
-          <p:cNvPr id="3" name="Datumsplatzhalter 2">
-            <a:extLst>
-              <a:ext uri="{FF2B5EF4-FFF2-40B4-BE49-F238E27FC236}">
-                <a16:creationId xmlns:a16="http://schemas.microsoft.com/office/drawing/2014/main" id="{941544D0-400A-14AC-9BEF-D63507631F88}"/>
-              </a:ext>
-            </a:extLst>
-          </p:cNvPr>
+            <a:endParaRPr lang="en-US" dirty="0"/>
+          </a:p>
+        </p:txBody>
+      </p:sp>
+      <p:sp>
+        <p:nvSpPr>
+          <p:cNvPr id="3" name="Date Placeholder 2"/>
           <p:cNvSpPr>
             <a:spLocks noGrp="1"/>
           </p:cNvSpPr>
@@ -3101,7 +3231,7 @@
           <a:p>
             <a:fld id="{C7B5033B-E79C-4009-9C64-ABF7A52B63B5}" type="datetimeFigureOut">
               <a:rPr lang="de-AT" smtClean="0"/>
-              <a:t>27.01.2025</a:t>
+              <a:t>06.02.2025</a:t>
             </a:fld>
             <a:endParaRPr lang="de-AT"/>
           </a:p>
@@ -3109,13 +3239,7 @@
       </p:sp>
       <p:sp>
         <p:nvSpPr>
-          <p:cNvPr id="4" name="Fußzeilenplatzhalter 3">
-            <a:extLst>
-              <a:ext uri="{FF2B5EF4-FFF2-40B4-BE49-F238E27FC236}">
-                <a16:creationId xmlns:a16="http://schemas.microsoft.com/office/drawing/2014/main" id="{09179BFD-3068-3906-0EC7-B77B69248775}"/>
-              </a:ext>
-            </a:extLst>
-          </p:cNvPr>
+          <p:cNvPr id="4" name="Footer Placeholder 3"/>
           <p:cNvSpPr>
             <a:spLocks noGrp="1"/>
           </p:cNvSpPr>
@@ -3134,13 +3258,7 @@
       </p:sp>
       <p:sp>
         <p:nvSpPr>
-          <p:cNvPr id="5" name="Foliennummernplatzhalter 4">
-            <a:extLst>
-              <a:ext uri="{FF2B5EF4-FFF2-40B4-BE49-F238E27FC236}">
-                <a16:creationId xmlns:a16="http://schemas.microsoft.com/office/drawing/2014/main" id="{8D384409-3E55-1AFD-A4A8-2A6C89A6238A}"/>
-              </a:ext>
-            </a:extLst>
-          </p:cNvPr>
+          <p:cNvPr id="5" name="Slide Number Placeholder 4"/>
           <p:cNvSpPr>
             <a:spLocks noGrp="1"/>
           </p:cNvSpPr>
@@ -3164,7 +3282,7 @@
     </p:spTree>
     <p:extLst>
       <p:ext uri="{BB962C8B-B14F-4D97-AF65-F5344CB8AC3E}">
-        <p14:creationId xmlns:p14="http://schemas.microsoft.com/office/powerpoint/2010/main" val="2634290447"/>
+        <p14:creationId xmlns:p14="http://schemas.microsoft.com/office/powerpoint/2010/main" val="1644750812"/>
       </p:ext>
     </p:extLst>
   </p:cSld>
@@ -3193,13 +3311,7 @@
       </p:grpSpPr>
       <p:sp>
         <p:nvSpPr>
-          <p:cNvPr id="2" name="Datumsplatzhalter 1">
-            <a:extLst>
-              <a:ext uri="{FF2B5EF4-FFF2-40B4-BE49-F238E27FC236}">
-                <a16:creationId xmlns:a16="http://schemas.microsoft.com/office/drawing/2014/main" id="{C33C508A-8F31-BCB5-5427-443319492C7C}"/>
-              </a:ext>
-            </a:extLst>
-          </p:cNvPr>
+          <p:cNvPr id="2" name="Date Placeholder 1"/>
           <p:cNvSpPr>
             <a:spLocks noGrp="1"/>
           </p:cNvSpPr>
@@ -3214,7 +3326,7 @@
           <a:p>
             <a:fld id="{C7B5033B-E79C-4009-9C64-ABF7A52B63B5}" type="datetimeFigureOut">
               <a:rPr lang="de-AT" smtClean="0"/>
-              <a:t>27.01.2025</a:t>
+              <a:t>06.02.2025</a:t>
             </a:fld>
             <a:endParaRPr lang="de-AT"/>
           </a:p>
@@ -3222,13 +3334,7 @@
       </p:sp>
       <p:sp>
         <p:nvSpPr>
-          <p:cNvPr id="3" name="Fußzeilenplatzhalter 2">
-            <a:extLst>
-              <a:ext uri="{FF2B5EF4-FFF2-40B4-BE49-F238E27FC236}">
-                <a16:creationId xmlns:a16="http://schemas.microsoft.com/office/drawing/2014/main" id="{E055509A-67D5-23B7-69EA-520609464A4F}"/>
-              </a:ext>
-            </a:extLst>
-          </p:cNvPr>
+          <p:cNvPr id="3" name="Footer Placeholder 2"/>
           <p:cNvSpPr>
             <a:spLocks noGrp="1"/>
           </p:cNvSpPr>
@@ -3247,13 +3353,7 @@
       </p:sp>
       <p:sp>
         <p:nvSpPr>
-          <p:cNvPr id="4" name="Foliennummernplatzhalter 3">
-            <a:extLst>
-              <a:ext uri="{FF2B5EF4-FFF2-40B4-BE49-F238E27FC236}">
-                <a16:creationId xmlns:a16="http://schemas.microsoft.com/office/drawing/2014/main" id="{014B011D-ECAF-DAED-B73A-327FCB90F52F}"/>
-              </a:ext>
-            </a:extLst>
-          </p:cNvPr>
+          <p:cNvPr id="4" name="Slide Number Placeholder 3"/>
           <p:cNvSpPr>
             <a:spLocks noGrp="1"/>
           </p:cNvSpPr>
@@ -3277,7 +3377,7 @@
     </p:spTree>
     <p:extLst>
       <p:ext uri="{BB962C8B-B14F-4D97-AF65-F5344CB8AC3E}">
-        <p14:creationId xmlns:p14="http://schemas.microsoft.com/office/powerpoint/2010/main" val="4123823173"/>
+        <p14:creationId xmlns:p14="http://schemas.microsoft.com/office/powerpoint/2010/main" val="253270363"/>
       </p:ext>
     </p:extLst>
   </p:cSld>
@@ -3306,13 +3406,7 @@
       </p:grpSpPr>
       <p:sp>
         <p:nvSpPr>
-          <p:cNvPr id="2" name="Titel 1">
-            <a:extLst>
-              <a:ext uri="{FF2B5EF4-FFF2-40B4-BE49-F238E27FC236}">
-                <a16:creationId xmlns:a16="http://schemas.microsoft.com/office/drawing/2014/main" id="{BBDC91E6-8814-1EEB-79A6-2E05532C7B53}"/>
-              </a:ext>
-            </a:extLst>
-          </p:cNvPr>
+          <p:cNvPr id="2" name="Title 1"/>
           <p:cNvSpPr>
             <a:spLocks noGrp="1"/>
           </p:cNvSpPr>
@@ -3322,15 +3416,17 @@
         </p:nvSpPr>
         <p:spPr>
           <a:xfrm>
-            <a:off x="839788" y="457200"/>
-            <a:ext cx="3932237" cy="1600200"/>
+            <a:off x="841248" y="457200"/>
+            <a:ext cx="3200400" cy="1600197"/>
           </a:xfrm>
         </p:spPr>
         <p:txBody>
-          <a:bodyPr anchor="b"/>
+          <a:bodyPr anchor="b">
+            <a:normAutofit/>
+          </a:bodyPr>
           <a:lstStyle>
             <a:lvl1pPr>
-              <a:defRPr sz="3200"/>
+              <a:defRPr sz="3200" b="0" baseline="0"/>
             </a:lvl1pPr>
           </a:lstStyle>
           <a:p>
@@ -3338,19 +3434,13 @@
               <a:rPr lang="de-DE"/>
               <a:t>Mastertitelformat bearbeiten</a:t>
             </a:r>
-            <a:endParaRPr lang="de-AT"/>
-          </a:p>
-        </p:txBody>
-      </p:sp>
-      <p:sp>
-        <p:nvSpPr>
-          <p:cNvPr id="3" name="Inhaltsplatzhalter 2">
-            <a:extLst>
-              <a:ext uri="{FF2B5EF4-FFF2-40B4-BE49-F238E27FC236}">
-                <a16:creationId xmlns:a16="http://schemas.microsoft.com/office/drawing/2014/main" id="{19C8B631-A6F5-3F25-1963-250416818051}"/>
-              </a:ext>
-            </a:extLst>
-          </p:cNvPr>
+            <a:endParaRPr lang="en-US" dirty="0"/>
+          </a:p>
+        </p:txBody>
+      </p:sp>
+      <p:sp>
+        <p:nvSpPr>
+          <p:cNvPr id="3" name="Content Placeholder 2"/>
           <p:cNvSpPr>
             <a:spLocks noGrp="1"/>
           </p:cNvSpPr>
@@ -3360,39 +3450,39 @@
         </p:nvSpPr>
         <p:spPr>
           <a:xfrm>
-            <a:off x="5183188" y="987425"/>
-            <a:ext cx="6172200" cy="4873625"/>
+            <a:off x="4504267" y="685800"/>
+            <a:ext cx="6079066" cy="5486400"/>
           </a:xfrm>
         </p:spPr>
         <p:txBody>
           <a:bodyPr/>
           <a:lstStyle>
             <a:lvl1pPr>
-              <a:defRPr sz="3200"/>
+              <a:defRPr sz="2000"/>
             </a:lvl1pPr>
             <a:lvl2pPr>
-              <a:defRPr sz="2800"/>
+              <a:defRPr sz="1800"/>
             </a:lvl2pPr>
             <a:lvl3pPr>
-              <a:defRPr sz="2400"/>
+              <a:defRPr sz="1600"/>
             </a:lvl3pPr>
             <a:lvl4pPr>
-              <a:defRPr sz="2000"/>
+              <a:defRPr sz="1400"/>
             </a:lvl4pPr>
             <a:lvl5pPr>
-              <a:defRPr sz="2000"/>
+              <a:defRPr sz="1400"/>
             </a:lvl5pPr>
             <a:lvl6pPr>
-              <a:defRPr sz="2000"/>
+              <a:defRPr sz="1400"/>
             </a:lvl6pPr>
             <a:lvl7pPr>
-              <a:defRPr sz="2000"/>
+              <a:defRPr sz="1400"/>
             </a:lvl7pPr>
             <a:lvl8pPr>
-              <a:defRPr sz="2000"/>
+              <a:defRPr sz="1400"/>
             </a:lvl8pPr>
             <a:lvl9pPr>
-              <a:defRPr sz="2000"/>
+              <a:defRPr sz="1400"/>
             </a:lvl9pPr>
           </a:lstStyle>
           <a:p>
@@ -3429,19 +3519,13 @@
               <a:rPr lang="de-DE"/>
               <a:t>Fünfte Ebene</a:t>
             </a:r>
-            <a:endParaRPr lang="de-AT"/>
-          </a:p>
-        </p:txBody>
-      </p:sp>
-      <p:sp>
-        <p:nvSpPr>
-          <p:cNvPr id="4" name="Textplatzhalter 3">
-            <a:extLst>
-              <a:ext uri="{FF2B5EF4-FFF2-40B4-BE49-F238E27FC236}">
-                <a16:creationId xmlns:a16="http://schemas.microsoft.com/office/drawing/2014/main" id="{CE433DEF-D167-312B-5CA5-75ABF2A0115D}"/>
-              </a:ext>
-            </a:extLst>
-          </p:cNvPr>
+            <a:endParaRPr lang="en-US" dirty="0"/>
+          </a:p>
+        </p:txBody>
+      </p:sp>
+      <p:sp>
+        <p:nvSpPr>
+          <p:cNvPr id="4" name="Text Placeholder 3"/>
           <p:cNvSpPr>
             <a:spLocks noGrp="1"/>
           </p:cNvSpPr>
@@ -3451,48 +3535,56 @@
         </p:nvSpPr>
         <p:spPr>
           <a:xfrm>
-            <a:off x="839788" y="2057400"/>
-            <a:ext cx="3932237" cy="3811588"/>
+            <a:off x="841248" y="2099734"/>
+            <a:ext cx="3200400" cy="3810001"/>
           </a:xfrm>
         </p:spPr>
         <p:txBody>
-          <a:bodyPr/>
+          <a:bodyPr>
+            <a:normAutofit/>
+          </a:bodyPr>
           <a:lstStyle>
             <a:lvl1pPr marL="0" indent="0">
+              <a:lnSpc>
+                <a:spcPct val="114000"/>
+              </a:lnSpc>
+              <a:spcBef>
+                <a:spcPts val="800"/>
+              </a:spcBef>
               <a:buNone/>
-              <a:defRPr sz="1600"/>
+              <a:defRPr sz="1300"/>
             </a:lvl1pPr>
             <a:lvl2pPr marL="457200" indent="0">
               <a:buNone/>
-              <a:defRPr sz="1400"/>
+              <a:defRPr sz="1200"/>
             </a:lvl2pPr>
             <a:lvl3pPr marL="914400" indent="0">
               <a:buNone/>
-              <a:defRPr sz="1200"/>
+              <a:defRPr sz="1000"/>
             </a:lvl3pPr>
             <a:lvl4pPr marL="1371600" indent="0">
               <a:buNone/>
-              <a:defRPr sz="1000"/>
+              <a:defRPr sz="900"/>
             </a:lvl4pPr>
             <a:lvl5pPr marL="1828800" indent="0">
               <a:buNone/>
-              <a:defRPr sz="1000"/>
+              <a:defRPr sz="900"/>
             </a:lvl5pPr>
             <a:lvl6pPr marL="2286000" indent="0">
               <a:buNone/>
-              <a:defRPr sz="1000"/>
+              <a:defRPr sz="900"/>
             </a:lvl6pPr>
             <a:lvl7pPr marL="2743200" indent="0">
               <a:buNone/>
-              <a:defRPr sz="1000"/>
+              <a:defRPr sz="900"/>
             </a:lvl7pPr>
             <a:lvl8pPr marL="3200400" indent="0">
               <a:buNone/>
-              <a:defRPr sz="1000"/>
+              <a:defRPr sz="900"/>
             </a:lvl8pPr>
             <a:lvl9pPr marL="3657600" indent="0">
               <a:buNone/>
-              <a:defRPr sz="1000"/>
+              <a:defRPr sz="900"/>
             </a:lvl9pPr>
           </a:lstStyle>
           <a:p>
@@ -3506,13 +3598,7 @@
       </p:sp>
       <p:sp>
         <p:nvSpPr>
-          <p:cNvPr id="5" name="Datumsplatzhalter 4">
-            <a:extLst>
-              <a:ext uri="{FF2B5EF4-FFF2-40B4-BE49-F238E27FC236}">
-                <a16:creationId xmlns:a16="http://schemas.microsoft.com/office/drawing/2014/main" id="{CF94805E-319C-6387-F293-B8F258CAFDFD}"/>
-              </a:ext>
-            </a:extLst>
-          </p:cNvPr>
+          <p:cNvPr id="5" name="Date Placeholder 4"/>
           <p:cNvSpPr>
             <a:spLocks noGrp="1"/>
           </p:cNvSpPr>
@@ -3527,7 +3613,7 @@
           <a:p>
             <a:fld id="{C7B5033B-E79C-4009-9C64-ABF7A52B63B5}" type="datetimeFigureOut">
               <a:rPr lang="de-AT" smtClean="0"/>
-              <a:t>27.01.2025</a:t>
+              <a:t>06.02.2025</a:t>
             </a:fld>
             <a:endParaRPr lang="de-AT"/>
           </a:p>
@@ -3535,13 +3621,7 @@
       </p:sp>
       <p:sp>
         <p:nvSpPr>
-          <p:cNvPr id="6" name="Fußzeilenplatzhalter 5">
-            <a:extLst>
-              <a:ext uri="{FF2B5EF4-FFF2-40B4-BE49-F238E27FC236}">
-                <a16:creationId xmlns:a16="http://schemas.microsoft.com/office/drawing/2014/main" id="{8D4DDAB3-7F46-5A7B-37D3-12C0C02FC1D5}"/>
-              </a:ext>
-            </a:extLst>
-          </p:cNvPr>
+          <p:cNvPr id="6" name="Footer Placeholder 5"/>
           <p:cNvSpPr>
             <a:spLocks noGrp="1"/>
           </p:cNvSpPr>
@@ -3560,13 +3640,7 @@
       </p:sp>
       <p:sp>
         <p:nvSpPr>
-          <p:cNvPr id="7" name="Foliennummernplatzhalter 6">
-            <a:extLst>
-              <a:ext uri="{FF2B5EF4-FFF2-40B4-BE49-F238E27FC236}">
-                <a16:creationId xmlns:a16="http://schemas.microsoft.com/office/drawing/2014/main" id="{EFCC9ECC-F55D-D5FA-DA26-D85A3AFF067E}"/>
-              </a:ext>
-            </a:extLst>
-          </p:cNvPr>
+          <p:cNvPr id="7" name="Slide Number Placeholder 6"/>
           <p:cNvSpPr>
             <a:spLocks noGrp="1"/>
           </p:cNvSpPr>
@@ -3590,7 +3664,7 @@
     </p:spTree>
     <p:extLst>
       <p:ext uri="{BB962C8B-B14F-4D97-AF65-F5344CB8AC3E}">
-        <p14:creationId xmlns:p14="http://schemas.microsoft.com/office/powerpoint/2010/main" val="3645450255"/>
+        <p14:creationId xmlns:p14="http://schemas.microsoft.com/office/powerpoint/2010/main" val="449034470"/>
       </p:ext>
     </p:extLst>
   </p:cSld>
@@ -3619,31 +3693,69 @@
       </p:grpSpPr>
       <p:sp>
         <p:nvSpPr>
-          <p:cNvPr id="2" name="Titel 1">
-            <a:extLst>
-              <a:ext uri="{FF2B5EF4-FFF2-40B4-BE49-F238E27FC236}">
-                <a16:creationId xmlns:a16="http://schemas.microsoft.com/office/drawing/2014/main" id="{CD59BEAC-FE36-676A-1423-95C3FC21735E}"/>
-              </a:ext>
-            </a:extLst>
-          </p:cNvPr>
-          <p:cNvSpPr>
-            <a:spLocks noGrp="1"/>
-          </p:cNvSpPr>
-          <p:nvPr>
-            <p:ph type="title"/>
-          </p:nvPr>
+          <p:cNvPr id="8" name="Rectangle 7"/>
+          <p:cNvSpPr/>
+          <p:nvPr/>
         </p:nvSpPr>
         <p:spPr>
           <a:xfrm>
-            <a:off x="839788" y="457200"/>
-            <a:ext cx="3932237" cy="1600200"/>
+            <a:off x="0" y="5105400"/>
+            <a:ext cx="11292840" cy="1752600"/>
+          </a:xfrm>
+          <a:prstGeom prst="rect">
+            <a:avLst/>
+          </a:prstGeom>
+          <a:solidFill>
+            <a:srgbClr val="000000"/>
+          </a:solidFill>
+          <a:ln>
+            <a:noFill/>
+          </a:ln>
+        </p:spPr>
+        <p:style>
+          <a:lnRef idx="2">
+            <a:schemeClr val="accent1">
+              <a:shade val="50000"/>
+            </a:schemeClr>
+          </a:lnRef>
+          <a:fillRef idx="1">
+            <a:schemeClr val="accent1"/>
+          </a:fillRef>
+          <a:effectRef idx="0">
+            <a:schemeClr val="accent1"/>
+          </a:effectRef>
+          <a:fontRef idx="minor">
+            <a:schemeClr val="lt1"/>
+          </a:fontRef>
+        </p:style>
+      </p:sp>
+      <p:sp>
+        <p:nvSpPr>
+          <p:cNvPr id="2" name="Title 1"/>
+          <p:cNvSpPr>
+            <a:spLocks noGrp="1"/>
+          </p:cNvSpPr>
+          <p:nvPr>
+            <p:ph type="title"/>
+          </p:nvPr>
+        </p:nvSpPr>
+        <p:spPr>
+          <a:xfrm>
+            <a:off x="914400" y="5257800"/>
+            <a:ext cx="9982200" cy="914400"/>
           </a:xfrm>
         </p:spPr>
         <p:txBody>
-          <a:bodyPr anchor="b"/>
+          <a:bodyPr anchor="b">
+            <a:normAutofit/>
+          </a:bodyPr>
           <a:lstStyle>
             <a:lvl1pPr>
-              <a:defRPr sz="3200"/>
+              <a:defRPr sz="2800" b="0">
+                <a:solidFill>
+                  <a:schemeClr val="bg1"/>
+                </a:solidFill>
+              </a:defRPr>
             </a:lvl1pPr>
           </a:lstStyle>
           <a:p>
@@ -3651,21 +3763,15 @@
               <a:rPr lang="de-DE"/>
               <a:t>Mastertitelformat bearbeiten</a:t>
             </a:r>
-            <a:endParaRPr lang="de-AT"/>
-          </a:p>
-        </p:txBody>
-      </p:sp>
-      <p:sp>
-        <p:nvSpPr>
-          <p:cNvPr id="3" name="Bildplatzhalter 2">
-            <a:extLst>
-              <a:ext uri="{FF2B5EF4-FFF2-40B4-BE49-F238E27FC236}">
-                <a16:creationId xmlns:a16="http://schemas.microsoft.com/office/drawing/2014/main" id="{FCD2B80B-F2B2-4B8D-F9DC-96EDD74992A9}"/>
-              </a:ext>
-            </a:extLst>
-          </p:cNvPr>
-          <p:cNvSpPr>
-            <a:spLocks noGrp="1"/>
+            <a:endParaRPr lang="en-US" dirty="0"/>
+          </a:p>
+        </p:txBody>
+      </p:sp>
+      <p:sp>
+        <p:nvSpPr>
+          <p:cNvPr id="3" name="Picture Placeholder 2"/>
+          <p:cNvSpPr>
+            <a:spLocks noGrp="1" noChangeAspect="1"/>
           </p:cNvSpPr>
           <p:nvPr>
             <p:ph type="pic" idx="1"/>
@@ -3673,16 +3779,23 @@
         </p:nvSpPr>
         <p:spPr>
           <a:xfrm>
-            <a:off x="5183188" y="987425"/>
-            <a:ext cx="6172200" cy="4873625"/>
+            <a:off x="0" y="0"/>
+            <a:ext cx="11292840" cy="5128923"/>
           </a:xfrm>
+          <a:solidFill>
+            <a:schemeClr val="accent1"/>
+          </a:solidFill>
         </p:spPr>
         <p:txBody>
-          <a:bodyPr/>
+          <a:bodyPr anchor="t"/>
           <a:lstStyle>
             <a:lvl1pPr marL="0" indent="0">
               <a:buNone/>
-              <a:defRPr sz="3200"/>
+              <a:defRPr sz="3200">
+                <a:solidFill>
+                  <a:schemeClr val="bg1"/>
+                </a:solidFill>
+              </a:defRPr>
             </a:lvl1pPr>
             <a:lvl2pPr marL="457200" indent="0">
               <a:buNone/>
@@ -3718,19 +3831,17 @@
             </a:lvl9pPr>
           </a:lstStyle>
           <a:p>
-            <a:endParaRPr lang="de-AT"/>
-          </a:p>
-        </p:txBody>
-      </p:sp>
-      <p:sp>
-        <p:nvSpPr>
-          <p:cNvPr id="4" name="Textplatzhalter 3">
-            <a:extLst>
-              <a:ext uri="{FF2B5EF4-FFF2-40B4-BE49-F238E27FC236}">
-                <a16:creationId xmlns:a16="http://schemas.microsoft.com/office/drawing/2014/main" id="{C9996EC5-035B-E774-4EEF-9FFC821F2318}"/>
-              </a:ext>
-            </a:extLst>
-          </p:cNvPr>
+            <a:r>
+              <a:rPr lang="de-DE"/>
+              <a:t>Bild durch Klicken auf Symbol hinzufügen</a:t>
+            </a:r>
+            <a:endParaRPr lang="en-US" dirty="0"/>
+          </a:p>
+        </p:txBody>
+      </p:sp>
+      <p:sp>
+        <p:nvSpPr>
+          <p:cNvPr id="4" name="Text Placeholder 3"/>
           <p:cNvSpPr>
             <a:spLocks noGrp="1"/>
           </p:cNvSpPr>
@@ -3740,48 +3851,62 @@
         </p:nvSpPr>
         <p:spPr>
           <a:xfrm>
-            <a:off x="839788" y="2057400"/>
-            <a:ext cx="3932237" cy="3811588"/>
+            <a:off x="914400" y="6108589"/>
+            <a:ext cx="9982200" cy="597011"/>
           </a:xfrm>
         </p:spPr>
         <p:txBody>
-          <a:bodyPr/>
+          <a:bodyPr>
+            <a:normAutofit/>
+          </a:bodyPr>
           <a:lstStyle>
             <a:lvl1pPr marL="0" indent="0">
+              <a:lnSpc>
+                <a:spcPct val="100000"/>
+              </a:lnSpc>
+              <a:spcBef>
+                <a:spcPts val="800"/>
+              </a:spcBef>
               <a:buNone/>
-              <a:defRPr sz="1600"/>
+              <a:defRPr sz="1300">
+                <a:solidFill>
+                  <a:schemeClr val="bg1">
+                    <a:lumMod val="85000"/>
+                  </a:schemeClr>
+                </a:solidFill>
+              </a:defRPr>
             </a:lvl1pPr>
             <a:lvl2pPr marL="457200" indent="0">
               <a:buNone/>
-              <a:defRPr sz="1400"/>
+              <a:defRPr sz="1200"/>
             </a:lvl2pPr>
             <a:lvl3pPr marL="914400" indent="0">
               <a:buNone/>
-              <a:defRPr sz="1200"/>
+              <a:defRPr sz="1000"/>
             </a:lvl3pPr>
             <a:lvl4pPr marL="1371600" indent="0">
               <a:buNone/>
-              <a:defRPr sz="1000"/>
+              <a:defRPr sz="900"/>
             </a:lvl4pPr>
             <a:lvl5pPr marL="1828800" indent="0">
               <a:buNone/>
-              <a:defRPr sz="1000"/>
+              <a:defRPr sz="900"/>
             </a:lvl5pPr>
             <a:lvl6pPr marL="2286000" indent="0">
               <a:buNone/>
-              <a:defRPr sz="1000"/>
+              <a:defRPr sz="900"/>
             </a:lvl6pPr>
             <a:lvl7pPr marL="2743200" indent="0">
               <a:buNone/>
-              <a:defRPr sz="1000"/>
+              <a:defRPr sz="900"/>
             </a:lvl7pPr>
             <a:lvl8pPr marL="3200400" indent="0">
               <a:buNone/>
-              <a:defRPr sz="1000"/>
+              <a:defRPr sz="900"/>
             </a:lvl8pPr>
             <a:lvl9pPr marL="3657600" indent="0">
               <a:buNone/>
-              <a:defRPr sz="1000"/>
+              <a:defRPr sz="900"/>
             </a:lvl9pPr>
           </a:lstStyle>
           <a:p>
@@ -3795,13 +3920,7 @@
       </p:sp>
       <p:sp>
         <p:nvSpPr>
-          <p:cNvPr id="5" name="Datumsplatzhalter 4">
-            <a:extLst>
-              <a:ext uri="{FF2B5EF4-FFF2-40B4-BE49-F238E27FC236}">
-                <a16:creationId xmlns:a16="http://schemas.microsoft.com/office/drawing/2014/main" id="{89FCF8BB-06C8-DF0B-9021-E0BCF1CDDED5}"/>
-              </a:ext>
-            </a:extLst>
-          </p:cNvPr>
+          <p:cNvPr id="5" name="Date Placeholder 4"/>
           <p:cNvSpPr>
             <a:spLocks noGrp="1"/>
           </p:cNvSpPr>
@@ -3816,7 +3935,7 @@
           <a:p>
             <a:fld id="{C7B5033B-E79C-4009-9C64-ABF7A52B63B5}" type="datetimeFigureOut">
               <a:rPr lang="de-AT" smtClean="0"/>
-              <a:t>27.01.2025</a:t>
+              <a:t>06.02.2025</a:t>
             </a:fld>
             <a:endParaRPr lang="de-AT"/>
           </a:p>
@@ -3824,13 +3943,7 @@
       </p:sp>
       <p:sp>
         <p:nvSpPr>
-          <p:cNvPr id="6" name="Fußzeilenplatzhalter 5">
-            <a:extLst>
-              <a:ext uri="{FF2B5EF4-FFF2-40B4-BE49-F238E27FC236}">
-                <a16:creationId xmlns:a16="http://schemas.microsoft.com/office/drawing/2014/main" id="{47715FDD-43D1-E70E-D5B8-ABC87682E8A9}"/>
-              </a:ext>
-            </a:extLst>
-          </p:cNvPr>
+          <p:cNvPr id="6" name="Footer Placeholder 5"/>
           <p:cNvSpPr>
             <a:spLocks noGrp="1"/>
           </p:cNvSpPr>
@@ -3849,13 +3962,7 @@
       </p:sp>
       <p:sp>
         <p:nvSpPr>
-          <p:cNvPr id="7" name="Foliennummernplatzhalter 6">
-            <a:extLst>
-              <a:ext uri="{FF2B5EF4-FFF2-40B4-BE49-F238E27FC236}">
-                <a16:creationId xmlns:a16="http://schemas.microsoft.com/office/drawing/2014/main" id="{585BB8EF-603C-4D01-6549-AC7001706EAA}"/>
-              </a:ext>
-            </a:extLst>
-          </p:cNvPr>
+          <p:cNvPr id="7" name="Slide Number Placeholder 6"/>
           <p:cNvSpPr>
             <a:spLocks noGrp="1"/>
           </p:cNvSpPr>
@@ -3879,7 +3986,7 @@
     </p:spTree>
     <p:extLst>
       <p:ext uri="{BB962C8B-B14F-4D97-AF65-F5344CB8AC3E}">
-        <p14:creationId xmlns:p14="http://schemas.microsoft.com/office/powerpoint/2010/main" val="2432531748"/>
+        <p14:creationId xmlns:p14="http://schemas.microsoft.com/office/powerpoint/2010/main" val="248325774"/>
       </p:ext>
     </p:extLst>
   </p:cSld>
@@ -3913,31 +4020,65 @@
       </p:grpSpPr>
       <p:sp>
         <p:nvSpPr>
-          <p:cNvPr id="2" name="Titelplatzhalter 1">
-            <a:extLst>
-              <a:ext uri="{FF2B5EF4-FFF2-40B4-BE49-F238E27FC236}">
-                <a16:creationId xmlns:a16="http://schemas.microsoft.com/office/drawing/2014/main" id="{2A62193D-1FF1-3FE8-2E4F-B1268D59F0D3}"/>
-              </a:ext>
-            </a:extLst>
-          </p:cNvPr>
-          <p:cNvSpPr>
-            <a:spLocks noGrp="1"/>
-          </p:cNvSpPr>
-          <p:nvPr>
-            <p:ph type="title"/>
-          </p:nvPr>
+          <p:cNvPr id="7" name="Rectangle 6"/>
+          <p:cNvSpPr/>
+          <p:nvPr/>
         </p:nvSpPr>
         <p:spPr>
           <a:xfrm>
-            <a:off x="838200" y="365125"/>
-            <a:ext cx="10515600" cy="1325563"/>
+            <a:off x="11292840" y="0"/>
+            <a:ext cx="914400" cy="6858000"/>
+          </a:xfrm>
+          <a:prstGeom prst="rect">
+            <a:avLst/>
+          </a:prstGeom>
+          <a:solidFill>
+            <a:schemeClr val="tx2">
+              <a:lumMod val="75000"/>
+            </a:schemeClr>
+          </a:solidFill>
+          <a:ln>
+            <a:noFill/>
+          </a:ln>
+        </p:spPr>
+        <p:style>
+          <a:lnRef idx="2">
+            <a:schemeClr val="accent1">
+              <a:shade val="50000"/>
+            </a:schemeClr>
+          </a:lnRef>
+          <a:fillRef idx="1">
+            <a:schemeClr val="accent1"/>
+          </a:fillRef>
+          <a:effectRef idx="0">
+            <a:schemeClr val="accent1"/>
+          </a:effectRef>
+          <a:fontRef idx="minor">
+            <a:schemeClr val="lt1"/>
+          </a:fontRef>
+        </p:style>
+      </p:sp>
+      <p:sp>
+        <p:nvSpPr>
+          <p:cNvPr id="2" name="Title Placeholder 1"/>
+          <p:cNvSpPr>
+            <a:spLocks noGrp="1"/>
+          </p:cNvSpPr>
+          <p:nvPr>
+            <p:ph type="title"/>
+          </p:nvPr>
+        </p:nvSpPr>
+        <p:spPr>
+          <a:xfrm>
+            <a:off x="1261872" y="365760"/>
+            <a:ext cx="9692640" cy="1325562"/>
           </a:xfrm>
           <a:prstGeom prst="rect">
             <a:avLst/>
           </a:prstGeom>
         </p:spPr>
         <p:txBody>
-          <a:bodyPr vert="horz" lIns="91440" tIns="45720" rIns="91440" bIns="45720" rtlCol="0" anchor="ctr">
+          <a:bodyPr vert="horz" lIns="91440" tIns="45720" rIns="91440" bIns="45720" rtlCol="0" anchor="b">
             <a:normAutofit/>
           </a:bodyPr>
           <a:lstStyle/>
@@ -3946,19 +4087,13 @@
               <a:rPr lang="de-DE"/>
               <a:t>Mastertitelformat bearbeiten</a:t>
             </a:r>
-            <a:endParaRPr lang="de-AT"/>
-          </a:p>
-        </p:txBody>
-      </p:sp>
-      <p:sp>
-        <p:nvSpPr>
-          <p:cNvPr id="3" name="Textplatzhalter 2">
-            <a:extLst>
-              <a:ext uri="{FF2B5EF4-FFF2-40B4-BE49-F238E27FC236}">
-                <a16:creationId xmlns:a16="http://schemas.microsoft.com/office/drawing/2014/main" id="{8FBC27A0-9C04-E5EC-FD19-E589DB57F05C}"/>
-              </a:ext>
-            </a:extLst>
-          </p:cNvPr>
+            <a:endParaRPr lang="en-US" dirty="0"/>
+          </a:p>
+        </p:txBody>
+      </p:sp>
+      <p:sp>
+        <p:nvSpPr>
+          <p:cNvPr id="3" name="Text Placeholder 2"/>
           <p:cNvSpPr>
             <a:spLocks noGrp="1"/>
           </p:cNvSpPr>
@@ -3968,8 +4103,8 @@
         </p:nvSpPr>
         <p:spPr>
           <a:xfrm>
-            <a:off x="838200" y="1825625"/>
-            <a:ext cx="10515600" cy="4351338"/>
+            <a:off x="1261872" y="1828800"/>
+            <a:ext cx="8595360" cy="4351337"/>
           </a:xfrm>
           <a:prstGeom prst="rect">
             <a:avLst/>
@@ -4014,19 +4149,13 @@
               <a:rPr lang="de-DE"/>
               <a:t>Fünfte Ebene</a:t>
             </a:r>
-            <a:endParaRPr lang="de-AT"/>
-          </a:p>
-        </p:txBody>
-      </p:sp>
-      <p:sp>
-        <p:nvSpPr>
-          <p:cNvPr id="4" name="Datumsplatzhalter 3">
-            <a:extLst>
-              <a:ext uri="{FF2B5EF4-FFF2-40B4-BE49-F238E27FC236}">
-                <a16:creationId xmlns:a16="http://schemas.microsoft.com/office/drawing/2014/main" id="{E773E597-BAEF-2AD0-C8A1-5EEF72861C2A}"/>
-              </a:ext>
-            </a:extLst>
-          </p:cNvPr>
+            <a:endParaRPr lang="en-US" dirty="0"/>
+          </a:p>
+        </p:txBody>
+      </p:sp>
+      <p:sp>
+        <p:nvSpPr>
+          <p:cNvPr id="4" name="Date Placeholder 3"/>
           <p:cNvSpPr>
             <a:spLocks noGrp="1"/>
           </p:cNvSpPr>
@@ -4035,9 +4164,9 @@
           </p:nvPr>
         </p:nvSpPr>
         <p:spPr>
-          <a:xfrm>
-            <a:off x="838200" y="6356350"/>
-            <a:ext cx="2743200" cy="365125"/>
+          <a:xfrm rot="16200000">
+            <a:off x="10797542" y="998537"/>
+            <a:ext cx="1904999" cy="365125"/>
           </a:xfrm>
           <a:prstGeom prst="rect">
             <a:avLst/>
@@ -4046,11 +4175,12 @@
         <p:txBody>
           <a:bodyPr vert="horz" lIns="91440" tIns="45720" rIns="91440" bIns="45720" rtlCol="0" anchor="ctr"/>
           <a:lstStyle>
-            <a:lvl1pPr algn="l">
-              <a:defRPr sz="1200">
+            <a:lvl1pPr algn="r">
+              <a:defRPr sz="1050" b="0">
                 <a:solidFill>
-                  <a:schemeClr val="tx1">
-                    <a:tint val="82000"/>
+                  <a:schemeClr val="tx2">
+                    <a:lumMod val="20000"/>
+                    <a:lumOff val="80000"/>
                   </a:schemeClr>
                 </a:solidFill>
               </a:defRPr>
@@ -4059,7 +4189,7 @@
           <a:p>
             <a:fld id="{C7B5033B-E79C-4009-9C64-ABF7A52B63B5}" type="datetimeFigureOut">
               <a:rPr lang="de-AT" smtClean="0"/>
-              <a:t>27.01.2025</a:t>
+              <a:t>06.02.2025</a:t>
             </a:fld>
             <a:endParaRPr lang="de-AT"/>
           </a:p>
@@ -4067,13 +4197,7 @@
       </p:sp>
       <p:sp>
         <p:nvSpPr>
-          <p:cNvPr id="5" name="Fußzeilenplatzhalter 4">
-            <a:extLst>
-              <a:ext uri="{FF2B5EF4-FFF2-40B4-BE49-F238E27FC236}">
-                <a16:creationId xmlns:a16="http://schemas.microsoft.com/office/drawing/2014/main" id="{33204456-692E-57B0-DB86-3A0D63A94915}"/>
-              </a:ext>
-            </a:extLst>
-          </p:cNvPr>
+          <p:cNvPr id="5" name="Footer Placeholder 4"/>
           <p:cNvSpPr>
             <a:spLocks noGrp="1"/>
           </p:cNvSpPr>
@@ -4082,9 +4206,9 @@
           </p:nvPr>
         </p:nvSpPr>
         <p:spPr>
-          <a:xfrm>
-            <a:off x="4038600" y="6356350"/>
-            <a:ext cx="4114800" cy="365125"/>
+          <a:xfrm rot="16200000">
+            <a:off x="9959341" y="4046537"/>
+            <a:ext cx="3581400" cy="365125"/>
           </a:xfrm>
           <a:prstGeom prst="rect">
             <a:avLst/>
@@ -4093,11 +4217,12 @@
         <p:txBody>
           <a:bodyPr vert="horz" lIns="91440" tIns="45720" rIns="91440" bIns="45720" rtlCol="0" anchor="ctr"/>
           <a:lstStyle>
-            <a:lvl1pPr algn="ctr">
-              <a:defRPr sz="1200">
+            <a:lvl1pPr algn="l">
+              <a:defRPr sz="1050">
                 <a:solidFill>
-                  <a:schemeClr val="tx1">
-                    <a:tint val="82000"/>
+                  <a:schemeClr val="tx2">
+                    <a:lumMod val="20000"/>
+                    <a:lumOff val="80000"/>
                   </a:schemeClr>
                 </a:solidFill>
               </a:defRPr>
@@ -4110,13 +4235,7 @@
       </p:sp>
       <p:sp>
         <p:nvSpPr>
-          <p:cNvPr id="6" name="Foliennummernplatzhalter 5">
-            <a:extLst>
-              <a:ext uri="{FF2B5EF4-FFF2-40B4-BE49-F238E27FC236}">
-                <a16:creationId xmlns:a16="http://schemas.microsoft.com/office/drawing/2014/main" id="{4208C995-D6DD-F5E7-99CC-70B88F6386DD}"/>
-              </a:ext>
-            </a:extLst>
-          </p:cNvPr>
+          <p:cNvPr id="6" name="Slide Number Placeholder 5"/>
           <p:cNvSpPr>
             <a:spLocks noGrp="1"/>
           </p:cNvSpPr>
@@ -4126,21 +4245,24 @@
         </p:nvSpPr>
         <p:spPr>
           <a:xfrm>
-            <a:off x="8610600" y="6356350"/>
-            <a:ext cx="2743200" cy="365125"/>
+            <a:off x="11292840" y="6172200"/>
+            <a:ext cx="914400" cy="593725"/>
           </a:xfrm>
           <a:prstGeom prst="rect">
             <a:avLst/>
           </a:prstGeom>
         </p:spPr>
         <p:txBody>
-          <a:bodyPr vert="horz" lIns="91440" tIns="45720" rIns="91440" bIns="45720" rtlCol="0" anchor="ctr"/>
+          <a:bodyPr vert="horz" lIns="45720" tIns="45720" rIns="45720" bIns="45720" rtlCol="0" anchor="ctr">
+            <a:normAutofit/>
+          </a:bodyPr>
           <a:lstStyle>
-            <a:lvl1pPr algn="r">
-              <a:defRPr sz="1200">
+            <a:lvl1pPr algn="ctr">
+              <a:defRPr sz="3600">
                 <a:solidFill>
-                  <a:schemeClr val="tx1">
-                    <a:tint val="82000"/>
+                  <a:schemeClr val="tx2">
+                    <a:lumMod val="60000"/>
+                    <a:lumOff val="40000"/>
                   </a:schemeClr>
                 </a:solidFill>
               </a:defRPr>
@@ -4158,23 +4280,23 @@
     </p:spTree>
     <p:extLst>
       <p:ext uri="{BB962C8B-B14F-4D97-AF65-F5344CB8AC3E}">
-        <p14:creationId xmlns:p14="http://schemas.microsoft.com/office/powerpoint/2010/main" val="2253170878"/>
+        <p14:creationId xmlns:p14="http://schemas.microsoft.com/office/powerpoint/2010/main" val="1735365149"/>
       </p:ext>
     </p:extLst>
   </p:cSld>
   <p:clrMap bg1="lt1" tx1="dk1" bg2="lt2" tx2="dk2" accent1="accent1" accent2="accent2" accent3="accent3" accent4="accent4" accent5="accent5" accent6="accent6" hlink="hlink" folHlink="folHlink"/>
   <p:sldLayoutIdLst>
-    <p:sldLayoutId id="2147483649" r:id="rId1"/>
-    <p:sldLayoutId id="2147483650" r:id="rId2"/>
-    <p:sldLayoutId id="2147483651" r:id="rId3"/>
-    <p:sldLayoutId id="2147483652" r:id="rId4"/>
-    <p:sldLayoutId id="2147483653" r:id="rId5"/>
-    <p:sldLayoutId id="2147483654" r:id="rId6"/>
-    <p:sldLayoutId id="2147483655" r:id="rId7"/>
-    <p:sldLayoutId id="2147483656" r:id="rId8"/>
-    <p:sldLayoutId id="2147483657" r:id="rId9"/>
-    <p:sldLayoutId id="2147483658" r:id="rId10"/>
-    <p:sldLayoutId id="2147483659" r:id="rId11"/>
+    <p:sldLayoutId id="2147483715" r:id="rId1"/>
+    <p:sldLayoutId id="2147483716" r:id="rId2"/>
+    <p:sldLayoutId id="2147483717" r:id="rId3"/>
+    <p:sldLayoutId id="2147483718" r:id="rId4"/>
+    <p:sldLayoutId id="2147483719" r:id="rId5"/>
+    <p:sldLayoutId id="2147483720" r:id="rId6"/>
+    <p:sldLayoutId id="2147483721" r:id="rId7"/>
+    <p:sldLayoutId id="2147483722" r:id="rId8"/>
+    <p:sldLayoutId id="2147483723" r:id="rId9"/>
+    <p:sldLayoutId id="2147483724" r:id="rId10"/>
+    <p:sldLayoutId id="2147483725" r:id="rId11"/>
   </p:sldLayoutIdLst>
   <p:txStyles>
     <p:titleStyle>
@@ -4186,7 +4308,7 @@
           <a:spcPct val="0"/>
         </a:spcBef>
         <a:buNone/>
-        <a:defRPr sz="4400" kern="1200">
+        <a:defRPr sz="4400" kern="1200" spc="-50" baseline="0">
           <a:solidFill>
             <a:schemeClr val="tx1"/>
           </a:solidFill>
@@ -4197,16 +4319,23 @@
       </a:lvl1pPr>
     </p:titleStyle>
     <p:bodyStyle>
-      <a:lvl1pPr marL="228600" indent="-228600" algn="l" defTabSz="914400" rtl="0" eaLnBrk="1" latinLnBrk="0" hangingPunct="1">
+      <a:lvl1pPr marL="182880" indent="-182880" algn="l" defTabSz="914400" rtl="0" eaLnBrk="1" latinLnBrk="0" hangingPunct="1">
         <a:lnSpc>
-          <a:spcPct val="90000"/>
+          <a:spcPct val="95000"/>
         </a:lnSpc>
         <a:spcBef>
-          <a:spcPts val="1000"/>
+          <a:spcPts val="1400"/>
         </a:spcBef>
-        <a:buFont typeface="Arial" panose="020B0604020202020204" pitchFamily="34" charset="0"/>
+        <a:spcAft>
+          <a:spcPts val="200"/>
+        </a:spcAft>
+        <a:buClr>
+          <a:schemeClr val="accent1"/>
+        </a:buClr>
+        <a:buSzPct val="80000"/>
+        <a:buFont typeface="Arial" pitchFamily="34" charset="0"/>
         <a:buChar char="•"/>
-        <a:defRPr sz="2800" kern="1200">
+        <a:defRPr sz="1800" kern="1200" spc="10" baseline="0">
           <a:solidFill>
             <a:schemeClr val="tx1"/>
           </a:solidFill>
@@ -4215,144 +4344,216 @@
           <a:cs typeface="+mn-cs"/>
         </a:defRPr>
       </a:lvl1pPr>
-      <a:lvl2pPr marL="685800" indent="-228600" algn="l" defTabSz="914400" rtl="0" eaLnBrk="1" latinLnBrk="0" hangingPunct="1">
+      <a:lvl2pPr marL="457200" indent="-182880" algn="l" defTabSz="914400" rtl="0" eaLnBrk="1" latinLnBrk="0" hangingPunct="1">
         <a:lnSpc>
           <a:spcPct val="90000"/>
         </a:lnSpc>
         <a:spcBef>
-          <a:spcPts val="500"/>
+          <a:spcPts val="300"/>
         </a:spcBef>
-        <a:buFont typeface="Arial" panose="020B0604020202020204" pitchFamily="34" charset="0"/>
-        <a:buChar char="•"/>
-        <a:defRPr sz="2400" kern="1200">
+        <a:spcAft>
+          <a:spcPts val="300"/>
+        </a:spcAft>
+        <a:buClr>
+          <a:schemeClr val="accent1"/>
+        </a:buClr>
+        <a:buFont typeface="Wingdings 2" pitchFamily="18" charset="2"/>
+        <a:buChar char=""/>
+        <a:defRPr sz="1600" kern="1200">
           <a:solidFill>
-            <a:schemeClr val="tx1"/>
+            <a:schemeClr val="tx1">
+              <a:lumMod val="85000"/>
+              <a:lumOff val="15000"/>
+            </a:schemeClr>
           </a:solidFill>
           <a:latin typeface="+mn-lt"/>
           <a:ea typeface="+mn-ea"/>
           <a:cs typeface="+mn-cs"/>
         </a:defRPr>
       </a:lvl2pPr>
-      <a:lvl3pPr marL="1143000" indent="-228600" algn="l" defTabSz="914400" rtl="0" eaLnBrk="1" latinLnBrk="0" hangingPunct="1">
+      <a:lvl3pPr marL="731520" indent="-182880" algn="l" defTabSz="914400" rtl="0" eaLnBrk="1" latinLnBrk="0" hangingPunct="1">
         <a:lnSpc>
           <a:spcPct val="90000"/>
         </a:lnSpc>
         <a:spcBef>
-          <a:spcPts val="500"/>
+          <a:spcPts val="300"/>
         </a:spcBef>
-        <a:buFont typeface="Arial" panose="020B0604020202020204" pitchFamily="34" charset="0"/>
-        <a:buChar char="•"/>
-        <a:defRPr sz="2000" kern="1200">
+        <a:spcAft>
+          <a:spcPts val="300"/>
+        </a:spcAft>
+        <a:buClr>
+          <a:schemeClr val="accent1"/>
+        </a:buClr>
+        <a:buFont typeface="Wingdings 2" pitchFamily="18" charset="2"/>
+        <a:buChar char=""/>
+        <a:defRPr sz="1400" kern="1200">
           <a:solidFill>
-            <a:schemeClr val="tx1"/>
+            <a:schemeClr val="tx1">
+              <a:lumMod val="85000"/>
+              <a:lumOff val="15000"/>
+            </a:schemeClr>
           </a:solidFill>
           <a:latin typeface="+mn-lt"/>
           <a:ea typeface="+mn-ea"/>
           <a:cs typeface="+mn-cs"/>
         </a:defRPr>
       </a:lvl3pPr>
-      <a:lvl4pPr marL="1600200" indent="-228600" algn="l" defTabSz="914400" rtl="0" eaLnBrk="1" latinLnBrk="0" hangingPunct="1">
+      <a:lvl4pPr marL="1005840" indent="-182880" algn="l" defTabSz="914400" rtl="0" eaLnBrk="1" latinLnBrk="0" hangingPunct="1">
         <a:lnSpc>
           <a:spcPct val="90000"/>
         </a:lnSpc>
         <a:spcBef>
-          <a:spcPts val="500"/>
+          <a:spcPts val="300"/>
         </a:spcBef>
-        <a:buFont typeface="Arial" panose="020B0604020202020204" pitchFamily="34" charset="0"/>
-        <a:buChar char="•"/>
-        <a:defRPr sz="1800" kern="1200">
+        <a:spcAft>
+          <a:spcPts val="300"/>
+        </a:spcAft>
+        <a:buClr>
+          <a:schemeClr val="accent1"/>
+        </a:buClr>
+        <a:buFont typeface="Wingdings 2" pitchFamily="18" charset="2"/>
+        <a:buChar char=""/>
+        <a:defRPr sz="1400" kern="1200">
           <a:solidFill>
-            <a:schemeClr val="tx1"/>
+            <a:schemeClr val="tx1">
+              <a:lumMod val="85000"/>
+              <a:lumOff val="15000"/>
+            </a:schemeClr>
           </a:solidFill>
           <a:latin typeface="+mn-lt"/>
           <a:ea typeface="+mn-ea"/>
           <a:cs typeface="+mn-cs"/>
         </a:defRPr>
       </a:lvl4pPr>
-      <a:lvl5pPr marL="2057400" indent="-228600" algn="l" defTabSz="914400" rtl="0" eaLnBrk="1" latinLnBrk="0" hangingPunct="1">
+      <a:lvl5pPr marL="1280160" indent="-182880" algn="l" defTabSz="914400" rtl="0" eaLnBrk="1" latinLnBrk="0" hangingPunct="1">
         <a:lnSpc>
           <a:spcPct val="90000"/>
         </a:lnSpc>
         <a:spcBef>
-          <a:spcPts val="500"/>
+          <a:spcPts val="300"/>
         </a:spcBef>
-        <a:buFont typeface="Arial" panose="020B0604020202020204" pitchFamily="34" charset="0"/>
-        <a:buChar char="•"/>
-        <a:defRPr sz="1800" kern="1200">
+        <a:spcAft>
+          <a:spcPts val="300"/>
+        </a:spcAft>
+        <a:buClr>
+          <a:schemeClr val="accent1"/>
+        </a:buClr>
+        <a:buFont typeface="Wingdings 2" pitchFamily="18" charset="2"/>
+        <a:buChar char=""/>
+        <a:defRPr sz="1400" kern="1200">
           <a:solidFill>
-            <a:schemeClr val="tx1"/>
+            <a:schemeClr val="tx1">
+              <a:lumMod val="85000"/>
+              <a:lumOff val="15000"/>
+            </a:schemeClr>
           </a:solidFill>
           <a:latin typeface="+mn-lt"/>
           <a:ea typeface="+mn-ea"/>
           <a:cs typeface="+mn-cs"/>
         </a:defRPr>
       </a:lvl5pPr>
-      <a:lvl6pPr marL="2514600" indent="-228600" algn="l" defTabSz="914400" rtl="0" eaLnBrk="1" latinLnBrk="0" hangingPunct="1">
+      <a:lvl6pPr marL="1600000" indent="-228600" algn="l" defTabSz="914400" rtl="0" eaLnBrk="1" latinLnBrk="0" hangingPunct="1">
         <a:lnSpc>
           <a:spcPct val="90000"/>
         </a:lnSpc>
         <a:spcBef>
-          <a:spcPts val="500"/>
+          <a:spcPts val="300"/>
         </a:spcBef>
-        <a:buFont typeface="Arial" panose="020B0604020202020204" pitchFamily="34" charset="0"/>
-        <a:buChar char="•"/>
-        <a:defRPr sz="1800" kern="1200">
+        <a:spcAft>
+          <a:spcPts val="300"/>
+        </a:spcAft>
+        <a:buClr>
+          <a:schemeClr val="accent1"/>
+        </a:buClr>
+        <a:buFont typeface="Wingdings 2" pitchFamily="18" charset="2"/>
+        <a:buChar char=""/>
+        <a:defRPr sz="1400" kern="1200">
           <a:solidFill>
-            <a:schemeClr val="tx1"/>
+            <a:schemeClr val="tx1">
+              <a:lumMod val="85000"/>
+              <a:lumOff val="15000"/>
+            </a:schemeClr>
           </a:solidFill>
           <a:latin typeface="+mn-lt"/>
           <a:ea typeface="+mn-ea"/>
           <a:cs typeface="+mn-cs"/>
         </a:defRPr>
       </a:lvl6pPr>
-      <a:lvl7pPr marL="2971800" indent="-228600" algn="l" defTabSz="914400" rtl="0" eaLnBrk="1" latinLnBrk="0" hangingPunct="1">
+      <a:lvl7pPr marL="1900000" indent="-228600" algn="l" defTabSz="914400" rtl="0" eaLnBrk="1" latinLnBrk="0" hangingPunct="1">
         <a:lnSpc>
           <a:spcPct val="90000"/>
         </a:lnSpc>
         <a:spcBef>
-          <a:spcPts val="500"/>
+          <a:spcPts val="300"/>
         </a:spcBef>
-        <a:buFont typeface="Arial" panose="020B0604020202020204" pitchFamily="34" charset="0"/>
-        <a:buChar char="•"/>
-        <a:defRPr sz="1800" kern="1200">
+        <a:spcAft>
+          <a:spcPts val="300"/>
+        </a:spcAft>
+        <a:buClr>
+          <a:schemeClr val="accent1"/>
+        </a:buClr>
+        <a:buFont typeface="Wingdings 2" pitchFamily="18" charset="2"/>
+        <a:buChar char=""/>
+        <a:defRPr sz="1400" kern="1200">
           <a:solidFill>
-            <a:schemeClr val="tx1"/>
+            <a:schemeClr val="tx1">
+              <a:lumMod val="85000"/>
+              <a:lumOff val="15000"/>
+            </a:schemeClr>
           </a:solidFill>
           <a:latin typeface="+mn-lt"/>
           <a:ea typeface="+mn-ea"/>
           <a:cs typeface="+mn-cs"/>
         </a:defRPr>
       </a:lvl7pPr>
-      <a:lvl8pPr marL="3429000" indent="-228600" algn="l" defTabSz="914400" rtl="0" eaLnBrk="1" latinLnBrk="0" hangingPunct="1">
+      <a:lvl8pPr marL="2200000" indent="-228600" algn="l" defTabSz="914400" rtl="0" eaLnBrk="1" latinLnBrk="0" hangingPunct="1">
         <a:lnSpc>
           <a:spcPct val="90000"/>
         </a:lnSpc>
         <a:spcBef>
-          <a:spcPts val="500"/>
+          <a:spcPts val="300"/>
         </a:spcBef>
-        <a:buFont typeface="Arial" panose="020B0604020202020204" pitchFamily="34" charset="0"/>
-        <a:buChar char="•"/>
-        <a:defRPr sz="1800" kern="1200">
+        <a:spcAft>
+          <a:spcPts val="300"/>
+        </a:spcAft>
+        <a:buClr>
+          <a:schemeClr val="accent1"/>
+        </a:buClr>
+        <a:buFont typeface="Wingdings 2" pitchFamily="18" charset="2"/>
+        <a:buChar char=""/>
+        <a:defRPr sz="1400" kern="1200">
           <a:solidFill>
-            <a:schemeClr val="tx1"/>
+            <a:schemeClr val="tx1">
+              <a:lumMod val="85000"/>
+              <a:lumOff val="15000"/>
+            </a:schemeClr>
           </a:solidFill>
           <a:latin typeface="+mn-lt"/>
           <a:ea typeface="+mn-ea"/>
           <a:cs typeface="+mn-cs"/>
         </a:defRPr>
       </a:lvl8pPr>
-      <a:lvl9pPr marL="3886200" indent="-228600" algn="l" defTabSz="914400" rtl="0" eaLnBrk="1" latinLnBrk="0" hangingPunct="1">
+      <a:lvl9pPr marL="2500000" indent="-228600" algn="l" defTabSz="914400" rtl="0" eaLnBrk="1" latinLnBrk="0" hangingPunct="1">
         <a:lnSpc>
           <a:spcPct val="90000"/>
         </a:lnSpc>
         <a:spcBef>
-          <a:spcPts val="500"/>
+          <a:spcPts val="300"/>
         </a:spcBef>
-        <a:buFont typeface="Arial" panose="020B0604020202020204" pitchFamily="34" charset="0"/>
-        <a:buChar char="•"/>
-        <a:defRPr sz="1800" kern="1200">
+        <a:spcAft>
+          <a:spcPts val="300"/>
+        </a:spcAft>
+        <a:buClr>
+          <a:schemeClr val="accent1"/>
+        </a:buClr>
+        <a:buFont typeface="Wingdings 2" pitchFamily="18" charset="2"/>
+        <a:buChar char=""/>
+        <a:defRPr sz="1400" kern="1200">
           <a:solidFill>
-            <a:schemeClr val="tx1"/>
+            <a:schemeClr val="tx1">
+              <a:lumMod val="85000"/>
+              <a:lumOff val="15000"/>
+            </a:schemeClr>
           </a:solidFill>
           <a:latin typeface="+mn-lt"/>
           <a:ea typeface="+mn-ea"/>
@@ -4362,7 +4563,7 @@
     </p:bodyStyle>
     <p:otherStyle>
       <a:defPPr>
-        <a:defRPr lang="de-DE"/>
+        <a:defRPr lang="en-US"/>
       </a:defPPr>
       <a:lvl1pPr marL="0" algn="l" defTabSz="914400" rtl="0" eaLnBrk="1" latinLnBrk="0" hangingPunct="1">
         <a:defRPr sz="1800" kern="1200">
@@ -4456,6 +4657,11 @@
       </a:lvl9pPr>
     </p:otherStyle>
   </p:txStyles>
+  <p:extLst>
+    <p:ext uri="{27BBF7A9-308A-43DC-89C8-2F10F3537804}">
+      <p15:sldGuideLst xmlns:p15="http://schemas.microsoft.com/office/powerpoint/2012/main"/>
+    </p:ext>
+  </p:extLst>
 </p:sldMaster>
 </file>
 
@@ -4538,6 +4744,220 @@
     <p:extLst>
       <p:ext uri="{BB962C8B-B14F-4D97-AF65-F5344CB8AC3E}">
         <p14:creationId xmlns:p14="http://schemas.microsoft.com/office/powerpoint/2010/main" val="1587025369"/>
+      </p:ext>
+    </p:extLst>
+  </p:cSld>
+  <p:clrMapOvr>
+    <a:masterClrMapping/>
+  </p:clrMapOvr>
+</p:sld>
+</file>
+
+<file path=ppt/slides/slide10.xml><?xml version="1.0" encoding="utf-8"?>
+<p:sld xmlns:a="http://schemas.openxmlformats.org/drawingml/2006/main" xmlns:r="http://schemas.openxmlformats.org/officeDocument/2006/relationships" xmlns:p="http://schemas.openxmlformats.org/presentationml/2006/main">
+  <p:cSld>
+    <p:spTree>
+      <p:nvGrpSpPr>
+        <p:cNvPr id="1" name=""/>
+        <p:cNvGrpSpPr/>
+        <p:nvPr/>
+      </p:nvGrpSpPr>
+      <p:grpSpPr>
+        <a:xfrm>
+          <a:off x="0" y="0"/>
+          <a:ext cx="0" cy="0"/>
+          <a:chOff x="0" y="0"/>
+          <a:chExt cx="0" cy="0"/>
+        </a:xfrm>
+      </p:grpSpPr>
+      <p:sp>
+        <p:nvSpPr>
+          <p:cNvPr id="2" name="Titel 1">
+            <a:extLst>
+              <a:ext uri="{FF2B5EF4-FFF2-40B4-BE49-F238E27FC236}">
+                <a16:creationId xmlns:a16="http://schemas.microsoft.com/office/drawing/2014/main" id="{332DC837-2141-5975-411F-A47B8BE2D2C2}"/>
+              </a:ext>
+            </a:extLst>
+          </p:cNvPr>
+          <p:cNvSpPr>
+            <a:spLocks noGrp="1"/>
+          </p:cNvSpPr>
+          <p:nvPr>
+            <p:ph type="title"/>
+          </p:nvPr>
+        </p:nvSpPr>
+        <p:spPr/>
+        <p:txBody>
+          <a:bodyPr/>
+          <a:lstStyle/>
+          <a:p>
+            <a:r>
+              <a:rPr lang="de-DE" dirty="0"/>
+              <a:t>Datenstruktur</a:t>
+            </a:r>
+            <a:endParaRPr lang="de-AT" dirty="0"/>
+          </a:p>
+        </p:txBody>
+      </p:sp>
+      <p:sp>
+        <p:nvSpPr>
+          <p:cNvPr id="3" name="Inhaltsplatzhalter 2">
+            <a:extLst>
+              <a:ext uri="{FF2B5EF4-FFF2-40B4-BE49-F238E27FC236}">
+                <a16:creationId xmlns:a16="http://schemas.microsoft.com/office/drawing/2014/main" id="{84B95D0F-A849-7CA7-C56E-8B67EAE5CCEA}"/>
+              </a:ext>
+            </a:extLst>
+          </p:cNvPr>
+          <p:cNvSpPr>
+            <a:spLocks noGrp="1"/>
+          </p:cNvSpPr>
+          <p:nvPr>
+            <p:ph idx="1"/>
+          </p:nvPr>
+        </p:nvSpPr>
+        <p:spPr/>
+        <p:txBody>
+          <a:bodyPr/>
+          <a:lstStyle/>
+          <a:p>
+            <a:r>
+              <a:rPr lang="de-DE" dirty="0"/>
+              <a:t>GKZ = Gemeindekennziffer</a:t>
+            </a:r>
+          </a:p>
+          <a:p>
+            <a:pPr lvl="1"/>
+            <a:r>
+              <a:rPr lang="de-DE" dirty="0"/>
+              <a:t>1. Stelle: Bundesland</a:t>
+            </a:r>
+          </a:p>
+          <a:p>
+            <a:pPr lvl="1"/>
+            <a:r>
+              <a:rPr lang="de-DE" dirty="0"/>
+              <a:t>1.-3. Stelle: Bezirkskennziffer BKZ</a:t>
+            </a:r>
+          </a:p>
+          <a:p>
+            <a:pPr lvl="1"/>
+            <a:r>
+              <a:rPr lang="de-AT" dirty="0"/>
+              <a:t>1.-5. Stelle: GKZ</a:t>
+            </a:r>
+          </a:p>
+          <a:p>
+            <a:r>
+              <a:rPr lang="de-DE" dirty="0"/>
+              <a:t>Wahlberechtigte, Abgegebene, Ungültige, Gültige Stimmen</a:t>
+            </a:r>
+          </a:p>
+          <a:p>
+            <a:r>
+              <a:rPr lang="de-DE" dirty="0"/>
+              <a:t>Parteienergebnisse: ÖVP, SPÖ, FPÖ, Grüne, NEOS, Sonstige</a:t>
+            </a:r>
+          </a:p>
+        </p:txBody>
+      </p:sp>
+    </p:spTree>
+    <p:extLst>
+      <p:ext uri="{BB962C8B-B14F-4D97-AF65-F5344CB8AC3E}">
+        <p14:creationId xmlns:p14="http://schemas.microsoft.com/office/powerpoint/2010/main" val="2842475990"/>
+      </p:ext>
+    </p:extLst>
+  </p:cSld>
+  <p:clrMapOvr>
+    <a:masterClrMapping/>
+  </p:clrMapOvr>
+</p:sld>
+</file>
+
+<file path=ppt/slides/slide11.xml><?xml version="1.0" encoding="utf-8"?>
+<p:sld xmlns:a="http://schemas.openxmlformats.org/drawingml/2006/main" xmlns:r="http://schemas.openxmlformats.org/officeDocument/2006/relationships" xmlns:p="http://schemas.openxmlformats.org/presentationml/2006/main">
+  <p:cSld>
+    <p:spTree>
+      <p:nvGrpSpPr>
+        <p:cNvPr id="1" name=""/>
+        <p:cNvGrpSpPr/>
+        <p:nvPr/>
+      </p:nvGrpSpPr>
+      <p:grpSpPr>
+        <a:xfrm>
+          <a:off x="0" y="0"/>
+          <a:ext cx="0" cy="0"/>
+          <a:chOff x="0" y="0"/>
+          <a:chExt cx="0" cy="0"/>
+        </a:xfrm>
+      </p:grpSpPr>
+      <p:sp>
+        <p:nvSpPr>
+          <p:cNvPr id="2" name="Titel 1">
+            <a:extLst>
+              <a:ext uri="{FF2B5EF4-FFF2-40B4-BE49-F238E27FC236}">
+                <a16:creationId xmlns:a16="http://schemas.microsoft.com/office/drawing/2014/main" id="{E598A848-6A90-634E-F347-3421E1503D22}"/>
+              </a:ext>
+            </a:extLst>
+          </p:cNvPr>
+          <p:cNvSpPr>
+            <a:spLocks noGrp="1"/>
+          </p:cNvSpPr>
+          <p:nvPr>
+            <p:ph type="title"/>
+          </p:nvPr>
+        </p:nvSpPr>
+        <p:spPr/>
+        <p:txBody>
+          <a:bodyPr/>
+          <a:lstStyle/>
+          <a:p>
+            <a:r>
+              <a:rPr lang="de-DE" dirty="0"/>
+              <a:t>Kontakt</a:t>
+            </a:r>
+            <a:endParaRPr lang="de-AT" dirty="0"/>
+          </a:p>
+        </p:txBody>
+      </p:sp>
+      <p:sp>
+        <p:nvSpPr>
+          <p:cNvPr id="3" name="Inhaltsplatzhalter 2">
+            <a:extLst>
+              <a:ext uri="{FF2B5EF4-FFF2-40B4-BE49-F238E27FC236}">
+                <a16:creationId xmlns:a16="http://schemas.microsoft.com/office/drawing/2014/main" id="{1FA04347-D704-73DD-249E-ACCB8AB8D9EB}"/>
+              </a:ext>
+            </a:extLst>
+          </p:cNvPr>
+          <p:cNvSpPr>
+            <a:spLocks noGrp="1"/>
+          </p:cNvSpPr>
+          <p:nvPr>
+            <p:ph idx="1"/>
+          </p:nvPr>
+        </p:nvSpPr>
+        <p:spPr/>
+        <p:txBody>
+          <a:bodyPr/>
+          <a:lstStyle/>
+          <a:p>
+            <a:r>
+              <a:rPr lang="de-DE" dirty="0">
+                <a:hlinkClick r:id="rId2"/>
+              </a:rPr>
+              <a:t>clara.himmelbauer@wu.ac.at</a:t>
+            </a:r>
+            <a:r>
+              <a:rPr lang="de-DE" dirty="0"/>
+              <a:t> </a:t>
+            </a:r>
+            <a:endParaRPr lang="de-AT" dirty="0"/>
+          </a:p>
+        </p:txBody>
+      </p:sp>
+    </p:spTree>
+    <p:extLst>
+      <p:ext uri="{BB962C8B-B14F-4D97-AF65-F5344CB8AC3E}">
+        <p14:creationId xmlns:p14="http://schemas.microsoft.com/office/powerpoint/2010/main" val="1720390971"/>
       </p:ext>
     </p:extLst>
   </p:cSld>
@@ -4653,7 +5073,7 @@
           <p:cNvPr id="2" name="Titel 1">
             <a:extLst>
               <a:ext uri="{FF2B5EF4-FFF2-40B4-BE49-F238E27FC236}">
-                <a16:creationId xmlns:a16="http://schemas.microsoft.com/office/drawing/2014/main" id="{DFE68D6C-E9A8-08F2-72B8-C51F4075EB7A}"/>
+                <a16:creationId xmlns:a16="http://schemas.microsoft.com/office/drawing/2014/main" id="{395F23DD-25C9-9DC6-905F-79D710601BB1}"/>
               </a:ext>
             </a:extLst>
           </p:cNvPr>
@@ -4661,7 +5081,7 @@
             <a:spLocks noGrp="1"/>
           </p:cNvSpPr>
           <p:nvPr>
-            <p:ph type="title"/>
+            <p:ph type="ctrTitle"/>
           </p:nvPr>
         </p:nvSpPr>
         <p:spPr/>
@@ -4671,7 +5091,7 @@
           <a:p>
             <a:r>
               <a:rPr lang="de-DE" dirty="0"/>
-              <a:t>Lineare Funktionen</a:t>
+              <a:t>Mathematische Grundlagen</a:t>
             </a:r>
             <a:endParaRPr lang="de-AT" dirty="0"/>
           </a:p>
@@ -4679,10 +5099,10 @@
       </p:sp>
       <p:sp>
         <p:nvSpPr>
-          <p:cNvPr id="3" name="Inhaltsplatzhalter 2">
+          <p:cNvPr id="3" name="Untertitel 2">
             <a:extLst>
               <a:ext uri="{FF2B5EF4-FFF2-40B4-BE49-F238E27FC236}">
-                <a16:creationId xmlns:a16="http://schemas.microsoft.com/office/drawing/2014/main" id="{8B4F73BC-6221-7151-9E3D-A10E327370F1}"/>
+                <a16:creationId xmlns:a16="http://schemas.microsoft.com/office/drawing/2014/main" id="{71DD4476-5570-B562-B1EA-F3653F25F252}"/>
               </a:ext>
             </a:extLst>
           </p:cNvPr>
@@ -4690,7 +5110,7 @@
             <a:spLocks noGrp="1"/>
           </p:cNvSpPr>
           <p:nvPr>
-            <p:ph idx="1"/>
+            <p:ph type="subTitle" idx="1"/>
           </p:nvPr>
         </p:nvSpPr>
         <p:spPr/>
@@ -4705,7 +5125,7 @@
     </p:spTree>
     <p:extLst>
       <p:ext uri="{BB962C8B-B14F-4D97-AF65-F5344CB8AC3E}">
-        <p14:creationId xmlns:p14="http://schemas.microsoft.com/office/powerpoint/2010/main" val="2475301093"/>
+        <p14:creationId xmlns:p14="http://schemas.microsoft.com/office/powerpoint/2010/main" val="687750663"/>
       </p:ext>
     </p:extLst>
   </p:cSld>
@@ -4737,7 +5157,7 @@
           <p:cNvPr id="2" name="Titel 1">
             <a:extLst>
               <a:ext uri="{FF2B5EF4-FFF2-40B4-BE49-F238E27FC236}">
-                <a16:creationId xmlns:a16="http://schemas.microsoft.com/office/drawing/2014/main" id="{BA8B69C5-C240-88A4-BD48-850C48BE733B}"/>
+                <a16:creationId xmlns:a16="http://schemas.microsoft.com/office/drawing/2014/main" id="{2236A51D-002B-D99F-E2D1-2CA94C39C13E}"/>
               </a:ext>
             </a:extLst>
           </p:cNvPr>
@@ -4755,26 +5175,235 @@
           <a:p>
             <a:r>
               <a:rPr lang="de-DE" dirty="0"/>
-              <a:t>Multivariate lineare Regression</a:t>
+              <a:t>Lineare Funktion</a:t>
             </a:r>
             <a:endParaRPr lang="de-AT" dirty="0"/>
           </a:p>
         </p:txBody>
       </p:sp>
-      <p:sp>
-        <p:nvSpPr>
-          <p:cNvPr id="3" name="Inhaltsplatzhalter 2">
+      <p:graphicFrame>
+        <p:nvGraphicFramePr>
+          <p:cNvPr id="6" name="Inhaltsplatzhalter 5">
             <a:extLst>
               <a:ext uri="{FF2B5EF4-FFF2-40B4-BE49-F238E27FC236}">
-                <a16:creationId xmlns:a16="http://schemas.microsoft.com/office/drawing/2014/main" id="{4C57A619-47FE-2F4B-4C80-DBFC185BAAF1}"/>
+                <a16:creationId xmlns:a16="http://schemas.microsoft.com/office/drawing/2014/main" id="{EC52E802-E748-5410-3E3F-376F55A08763}"/>
               </a:ext>
             </a:extLst>
           </p:cNvPr>
-          <p:cNvSpPr>
-            <a:spLocks noGrp="1"/>
-          </p:cNvSpPr>
-          <p:nvPr>
-            <p:ph idx="1"/>
+          <p:cNvGraphicFramePr>
+            <a:graphicFrameLocks noGrp="1"/>
+          </p:cNvGraphicFramePr>
+          <p:nvPr>
+            <p:ph sz="half" idx="1"/>
+            <p:extLst>
+              <p:ext uri="{D42A27DB-BD31-4B8C-83A1-F6EECF244321}">
+                <p14:modId xmlns:p14="http://schemas.microsoft.com/office/powerpoint/2010/main" val="2499011975"/>
+              </p:ext>
+            </p:extLst>
+          </p:nvPr>
+        </p:nvGraphicFramePr>
+        <p:xfrm>
+          <a:off x="1262063" y="1828800"/>
+          <a:ext cx="4479926" cy="1381760"/>
+        </p:xfrm>
+        <a:graphic>
+          <a:graphicData uri="http://schemas.openxmlformats.org/drawingml/2006/table">
+            <a:tbl>
+              <a:tblPr firstRow="1" bandRow="1">
+                <a:tableStyleId>{5C22544A-7EE6-4342-B048-85BDC9FD1C3A}</a:tableStyleId>
+              </a:tblPr>
+              <a:tblGrid>
+                <a:gridCol w="2172900">
+                  <a:extLst>
+                    <a:ext uri="{9D8B030D-6E8A-4147-A177-3AD203B41FA5}">
+                      <a16:colId xmlns:a16="http://schemas.microsoft.com/office/drawing/2014/main" val="3782367989"/>
+                    </a:ext>
+                  </a:extLst>
+                </a:gridCol>
+                <a:gridCol w="1153513">
+                  <a:extLst>
+                    <a:ext uri="{9D8B030D-6E8A-4147-A177-3AD203B41FA5}">
+                      <a16:colId xmlns:a16="http://schemas.microsoft.com/office/drawing/2014/main" val="970933377"/>
+                    </a:ext>
+                  </a:extLst>
+                </a:gridCol>
+                <a:gridCol w="1153513">
+                  <a:extLst>
+                    <a:ext uri="{9D8B030D-6E8A-4147-A177-3AD203B41FA5}">
+                      <a16:colId xmlns:a16="http://schemas.microsoft.com/office/drawing/2014/main" val="4069194008"/>
+                    </a:ext>
+                  </a:extLst>
+                </a:gridCol>
+              </a:tblGrid>
+              <a:tr h="370840">
+                <a:tc>
+                  <a:txBody>
+                    <a:bodyPr/>
+                    <a:lstStyle/>
+                    <a:p>
+                      <a:r>
+                        <a:rPr lang="de-DE" dirty="0"/>
+                        <a:t>Gemeinde</a:t>
+                      </a:r>
+                      <a:endParaRPr lang="de-AT" dirty="0"/>
+                    </a:p>
+                  </a:txBody>
+                  <a:tcPr/>
+                </a:tc>
+                <a:tc>
+                  <a:txBody>
+                    <a:bodyPr/>
+                    <a:lstStyle/>
+                    <a:p>
+                      <a:r>
+                        <a:rPr lang="de-DE" dirty="0"/>
+                        <a:t>ÖVP 2019</a:t>
+                      </a:r>
+                      <a:endParaRPr lang="de-AT" dirty="0"/>
+                    </a:p>
+                  </a:txBody>
+                  <a:tcPr/>
+                </a:tc>
+                <a:tc>
+                  <a:txBody>
+                    <a:bodyPr/>
+                    <a:lstStyle/>
+                    <a:p>
+                      <a:r>
+                        <a:rPr lang="de-DE" dirty="0"/>
+                        <a:t>ÖVP 2024</a:t>
+                      </a:r>
+                      <a:endParaRPr lang="de-AT" dirty="0"/>
+                    </a:p>
+                  </a:txBody>
+                  <a:tcPr/>
+                </a:tc>
+                <a:extLst>
+                  <a:ext uri="{0D108BD9-81ED-4DB2-BD59-A6C34878D82A}">
+                    <a16:rowId xmlns:a16="http://schemas.microsoft.com/office/drawing/2014/main" val="813830686"/>
+                  </a:ext>
+                </a:extLst>
+              </a:tr>
+              <a:tr h="370840">
+                <a:tc>
+                  <a:txBody>
+                    <a:bodyPr/>
+                    <a:lstStyle/>
+                    <a:p>
+                      <a:r>
+                        <a:rPr lang="de-DE" sz="1600" dirty="0" err="1"/>
+                        <a:t>Hintertupfing</a:t>
+                      </a:r>
+                      <a:endParaRPr lang="de-AT" sz="1600" dirty="0"/>
+                    </a:p>
+                  </a:txBody>
+                  <a:tcPr/>
+                </a:tc>
+                <a:tc>
+                  <a:txBody>
+                    <a:bodyPr/>
+                    <a:lstStyle/>
+                    <a:p>
+                      <a:pPr algn="r"/>
+                      <a:r>
+                        <a:rPr lang="de-DE" sz="1600" dirty="0"/>
+                        <a:t>30%</a:t>
+                      </a:r>
+                      <a:endParaRPr lang="de-AT" sz="1600" dirty="0"/>
+                    </a:p>
+                  </a:txBody>
+                  <a:tcPr/>
+                </a:tc>
+                <a:tc>
+                  <a:txBody>
+                    <a:bodyPr/>
+                    <a:lstStyle/>
+                    <a:p>
+                      <a:pPr algn="r"/>
+                      <a:r>
+                        <a:rPr lang="de-DE" sz="1600" dirty="0"/>
+                        <a:t>20%</a:t>
+                      </a:r>
+                      <a:endParaRPr lang="de-AT" sz="1600" dirty="0"/>
+                    </a:p>
+                  </a:txBody>
+                  <a:tcPr/>
+                </a:tc>
+                <a:extLst>
+                  <a:ext uri="{0D108BD9-81ED-4DB2-BD59-A6C34878D82A}">
+                    <a16:rowId xmlns:a16="http://schemas.microsoft.com/office/drawing/2014/main" val="1591309596"/>
+                  </a:ext>
+                </a:extLst>
+              </a:tr>
+              <a:tr h="370840">
+                <a:tc>
+                  <a:txBody>
+                    <a:bodyPr/>
+                    <a:lstStyle/>
+                    <a:p>
+                      <a:r>
+                        <a:rPr lang="de-DE" sz="1600" dirty="0" err="1"/>
+                        <a:t>Unterstinkenbrunn</a:t>
+                      </a:r>
+                      <a:endParaRPr lang="de-AT" sz="1600" dirty="0"/>
+                    </a:p>
+                  </a:txBody>
+                  <a:tcPr/>
+                </a:tc>
+                <a:tc>
+                  <a:txBody>
+                    <a:bodyPr/>
+                    <a:lstStyle/>
+                    <a:p>
+                      <a:pPr algn="r"/>
+                      <a:r>
+                        <a:rPr lang="de-DE" sz="1600" dirty="0"/>
+                        <a:t>50%</a:t>
+                      </a:r>
+                      <a:endParaRPr lang="de-AT" sz="1600" dirty="0"/>
+                    </a:p>
+                  </a:txBody>
+                  <a:tcPr/>
+                </a:tc>
+                <a:tc>
+                  <a:txBody>
+                    <a:bodyPr/>
+                    <a:lstStyle/>
+                    <a:p>
+                      <a:pPr algn="r"/>
+                      <a:r>
+                        <a:rPr lang="de-DE" sz="1600" dirty="0"/>
+                        <a:t>45%</a:t>
+                      </a:r>
+                      <a:endParaRPr lang="de-AT" sz="1600" dirty="0"/>
+                    </a:p>
+                  </a:txBody>
+                  <a:tcPr/>
+                </a:tc>
+                <a:extLst>
+                  <a:ext uri="{0D108BD9-81ED-4DB2-BD59-A6C34878D82A}">
+                    <a16:rowId xmlns:a16="http://schemas.microsoft.com/office/drawing/2014/main" val="3142812775"/>
+                  </a:ext>
+                </a:extLst>
+              </a:tr>
+            </a:tbl>
+          </a:graphicData>
+        </a:graphic>
+      </p:graphicFrame>
+      <p:sp>
+        <p:nvSpPr>
+          <p:cNvPr id="4" name="Inhaltsplatzhalter 3">
+            <a:extLst>
+              <a:ext uri="{FF2B5EF4-FFF2-40B4-BE49-F238E27FC236}">
+                <a16:creationId xmlns:a16="http://schemas.microsoft.com/office/drawing/2014/main" id="{FDA904B8-44EE-3666-ADC3-A3B0F91B04DF}"/>
+              </a:ext>
+            </a:extLst>
+          </p:cNvPr>
+          <p:cNvSpPr>
+            <a:spLocks noGrp="1"/>
+          </p:cNvSpPr>
+          <p:nvPr>
+            <p:ph sz="half" idx="2"/>
           </p:nvPr>
         </p:nvSpPr>
         <p:spPr/>
@@ -4789,7 +5418,7 @@
     </p:spTree>
     <p:extLst>
       <p:ext uri="{BB962C8B-B14F-4D97-AF65-F5344CB8AC3E}">
-        <p14:creationId xmlns:p14="http://schemas.microsoft.com/office/powerpoint/2010/main" val="2183538183"/>
+        <p14:creationId xmlns:p14="http://schemas.microsoft.com/office/powerpoint/2010/main" val="1368333132"/>
       </p:ext>
     </p:extLst>
   </p:cSld>
@@ -4821,7 +5450,7 @@
           <p:cNvPr id="2" name="Titel 1">
             <a:extLst>
               <a:ext uri="{FF2B5EF4-FFF2-40B4-BE49-F238E27FC236}">
-                <a16:creationId xmlns:a16="http://schemas.microsoft.com/office/drawing/2014/main" id="{B0F12AB1-0276-235A-A78F-AC7C856D3ABB}"/>
+                <a16:creationId xmlns:a16="http://schemas.microsoft.com/office/drawing/2014/main" id="{DFE68D6C-E9A8-08F2-72B8-C51F4075EB7A}"/>
               </a:ext>
             </a:extLst>
           </p:cNvPr>
@@ -4839,7 +5468,7 @@
           <a:p>
             <a:r>
               <a:rPr lang="de-DE" dirty="0"/>
-              <a:t>Hochrechnung und lineare Regression</a:t>
+              <a:t>Lineare Funktionen</a:t>
             </a:r>
             <a:endParaRPr lang="de-AT" dirty="0"/>
           </a:p>
@@ -4850,7 +5479,7 @@
           <p:cNvPr id="3" name="Inhaltsplatzhalter 2">
             <a:extLst>
               <a:ext uri="{FF2B5EF4-FFF2-40B4-BE49-F238E27FC236}">
-                <a16:creationId xmlns:a16="http://schemas.microsoft.com/office/drawing/2014/main" id="{AC7F4988-7C23-A449-FACD-67CE41C01E74}"/>
+                <a16:creationId xmlns:a16="http://schemas.microsoft.com/office/drawing/2014/main" id="{8B4F73BC-6221-7151-9E3D-A10E327370F1}"/>
               </a:ext>
             </a:extLst>
           </p:cNvPr>
@@ -4873,7 +5502,7 @@
     </p:spTree>
     <p:extLst>
       <p:ext uri="{BB962C8B-B14F-4D97-AF65-F5344CB8AC3E}">
-        <p14:creationId xmlns:p14="http://schemas.microsoft.com/office/powerpoint/2010/main" val="2130042208"/>
+        <p14:creationId xmlns:p14="http://schemas.microsoft.com/office/powerpoint/2010/main" val="2475301093"/>
       </p:ext>
     </p:extLst>
   </p:cSld>
@@ -4905,7 +5534,7 @@
           <p:cNvPr id="2" name="Titel 1">
             <a:extLst>
               <a:ext uri="{FF2B5EF4-FFF2-40B4-BE49-F238E27FC236}">
-                <a16:creationId xmlns:a16="http://schemas.microsoft.com/office/drawing/2014/main" id="{AB4F34F2-FD1A-FC57-D53E-8A5C1321C35A}"/>
+                <a16:creationId xmlns:a16="http://schemas.microsoft.com/office/drawing/2014/main" id="{BA8B69C5-C240-88A4-BD48-850C48BE733B}"/>
               </a:ext>
             </a:extLst>
           </p:cNvPr>
@@ -4923,7 +5552,7 @@
           <a:p>
             <a:r>
               <a:rPr lang="de-DE" dirty="0"/>
-              <a:t>Hochrechnung in Excel machen</a:t>
+              <a:t>Multivariate lineare Regression</a:t>
             </a:r>
             <a:endParaRPr lang="de-AT" dirty="0"/>
           </a:p>
@@ -4934,7 +5563,7 @@
           <p:cNvPr id="3" name="Inhaltsplatzhalter 2">
             <a:extLst>
               <a:ext uri="{FF2B5EF4-FFF2-40B4-BE49-F238E27FC236}">
-                <a16:creationId xmlns:a16="http://schemas.microsoft.com/office/drawing/2014/main" id="{6471F93C-8191-3241-8A23-E9A5E8781D29}"/>
+                <a16:creationId xmlns:a16="http://schemas.microsoft.com/office/drawing/2014/main" id="{4C57A619-47FE-2F4B-4C80-DBFC185BAAF1}"/>
               </a:ext>
             </a:extLst>
           </p:cNvPr>
@@ -4957,7 +5586,7 @@
     </p:spTree>
     <p:extLst>
       <p:ext uri="{BB962C8B-B14F-4D97-AF65-F5344CB8AC3E}">
-        <p14:creationId xmlns:p14="http://schemas.microsoft.com/office/powerpoint/2010/main" val="4082787262"/>
+        <p14:creationId xmlns:p14="http://schemas.microsoft.com/office/powerpoint/2010/main" val="2183538183"/>
       </p:ext>
     </p:extLst>
   </p:cSld>
@@ -4989,7 +5618,7 @@
           <p:cNvPr id="2" name="Titel 1">
             <a:extLst>
               <a:ext uri="{FF2B5EF4-FFF2-40B4-BE49-F238E27FC236}">
-                <a16:creationId xmlns:a16="http://schemas.microsoft.com/office/drawing/2014/main" id="{BB36368B-FAB8-C20B-35F4-757B95A5D4EF}"/>
+                <a16:creationId xmlns:a16="http://schemas.microsoft.com/office/drawing/2014/main" id="{B0F12AB1-0276-235A-A78F-AC7C856D3ABB}"/>
               </a:ext>
             </a:extLst>
           </p:cNvPr>
@@ -5007,47 +5636,41 @@
           <a:p>
             <a:r>
               <a:rPr lang="de-DE" dirty="0"/>
-              <a:t>Ziel: Urnenwahlergebnis NRW 2024</a:t>
+              <a:t>Hochrechnung und lineare Regression</a:t>
             </a:r>
             <a:endParaRPr lang="de-AT" dirty="0"/>
           </a:p>
         </p:txBody>
       </p:sp>
-      <p:graphicFrame>
-        <p:nvGraphicFramePr>
-          <p:cNvPr id="5" name="Inhaltsplatzhalter 4">
+      <p:sp>
+        <p:nvSpPr>
+          <p:cNvPr id="3" name="Inhaltsplatzhalter 2">
             <a:extLst>
               <a:ext uri="{FF2B5EF4-FFF2-40B4-BE49-F238E27FC236}">
-                <a16:creationId xmlns:a16="http://schemas.microsoft.com/office/drawing/2014/main" id="{0B7A5EA3-4E87-D48C-6EF1-E98D90806FEE}"/>
+                <a16:creationId xmlns:a16="http://schemas.microsoft.com/office/drawing/2014/main" id="{AC7F4988-7C23-A449-FACD-67CE41C01E74}"/>
               </a:ext>
             </a:extLst>
           </p:cNvPr>
-          <p:cNvGraphicFramePr>
-            <a:graphicFrameLocks noGrp="1"/>
-          </p:cNvGraphicFramePr>
+          <p:cNvSpPr>
+            <a:spLocks noGrp="1"/>
+          </p:cNvSpPr>
           <p:nvPr>
             <p:ph idx="1"/>
-            <p:extLst>
-              <p:ext uri="{D42A27DB-BD31-4B8C-83A1-F6EECF244321}">
-                <p14:modId xmlns:p14="http://schemas.microsoft.com/office/powerpoint/2010/main" val="4105898660"/>
-              </p:ext>
-            </p:extLst>
-          </p:nvPr>
-        </p:nvGraphicFramePr>
-        <p:xfrm>
-          <a:off x="838200" y="1825625"/>
-          <a:ext cx="10515600" cy="4351338"/>
-        </p:xfrm>
-        <a:graphic>
-          <a:graphicData uri="http://schemas.openxmlformats.org/drawingml/2006/chart">
-            <c:chart xmlns:c="http://schemas.openxmlformats.org/drawingml/2006/chart" xmlns:r="http://schemas.openxmlformats.org/officeDocument/2006/relationships" r:id="rId2"/>
-          </a:graphicData>
-        </a:graphic>
-      </p:graphicFrame>
+          </p:nvPr>
+        </p:nvSpPr>
+        <p:spPr/>
+        <p:txBody>
+          <a:bodyPr/>
+          <a:lstStyle/>
+          <a:p>
+            <a:endParaRPr lang="de-AT"/>
+          </a:p>
+        </p:txBody>
+      </p:sp>
     </p:spTree>
     <p:extLst>
       <p:ext uri="{BB962C8B-B14F-4D97-AF65-F5344CB8AC3E}">
-        <p14:creationId xmlns:p14="http://schemas.microsoft.com/office/powerpoint/2010/main" val="4171298435"/>
+        <p14:creationId xmlns:p14="http://schemas.microsoft.com/office/powerpoint/2010/main" val="2130042208"/>
       </p:ext>
     </p:extLst>
   </p:cSld>
@@ -5079,7 +5702,7 @@
           <p:cNvPr id="2" name="Titel 1">
             <a:extLst>
               <a:ext uri="{FF2B5EF4-FFF2-40B4-BE49-F238E27FC236}">
-                <a16:creationId xmlns:a16="http://schemas.microsoft.com/office/drawing/2014/main" id="{332DC837-2141-5975-411F-A47B8BE2D2C2}"/>
+                <a16:creationId xmlns:a16="http://schemas.microsoft.com/office/drawing/2014/main" id="{AB4F34F2-FD1A-FC57-D53E-8A5C1321C35A}"/>
               </a:ext>
             </a:extLst>
           </p:cNvPr>
@@ -5097,7 +5720,7 @@
           <a:p>
             <a:r>
               <a:rPr lang="de-DE" dirty="0"/>
-              <a:t>Datenstruktur</a:t>
+              <a:t>Hochrechnung in Excel machen</a:t>
             </a:r>
             <a:endParaRPr lang="de-AT" dirty="0"/>
           </a:p>
@@ -5108,7 +5731,7 @@
           <p:cNvPr id="3" name="Inhaltsplatzhalter 2">
             <a:extLst>
               <a:ext uri="{FF2B5EF4-FFF2-40B4-BE49-F238E27FC236}">
-                <a16:creationId xmlns:a16="http://schemas.microsoft.com/office/drawing/2014/main" id="{84B95D0F-A849-7CA7-C56E-8B67EAE5CCEA}"/>
+                <a16:creationId xmlns:a16="http://schemas.microsoft.com/office/drawing/2014/main" id="{6471F93C-8191-3241-8A23-E9A5E8781D29}"/>
               </a:ext>
             </a:extLst>
           </p:cNvPr>
@@ -5124,50 +5747,14 @@
           <a:bodyPr/>
           <a:lstStyle/>
           <a:p>
-            <a:r>
-              <a:rPr lang="de-DE" dirty="0"/>
-              <a:t>GKZ = Gemeindekennziffer</a:t>
-            </a:r>
-          </a:p>
-          <a:p>
-            <a:pPr lvl="1"/>
-            <a:r>
-              <a:rPr lang="de-DE" dirty="0"/>
-              <a:t>1. Stelle: Bundesland</a:t>
-            </a:r>
-          </a:p>
-          <a:p>
-            <a:pPr lvl="1"/>
-            <a:r>
-              <a:rPr lang="de-DE" dirty="0"/>
-              <a:t>1.-3. Stelle: Bezirkskennziffer BKZ</a:t>
-            </a:r>
-          </a:p>
-          <a:p>
-            <a:pPr lvl="1"/>
-            <a:r>
-              <a:rPr lang="de-AT" dirty="0"/>
-              <a:t>1.-5. Stelle: GKZ</a:t>
-            </a:r>
-          </a:p>
-          <a:p>
-            <a:r>
-              <a:rPr lang="de-DE" dirty="0"/>
-              <a:t>Wahlberechtigte, Abgegebene, Ungültige, Gültige Stimmen</a:t>
-            </a:r>
-          </a:p>
-          <a:p>
-            <a:r>
-              <a:rPr lang="de-DE" dirty="0"/>
-              <a:t>Parteienergebnisse: ÖVP, SPÖ, FPÖ, Grüne, NEOS, Sonstige</a:t>
-            </a:r>
+            <a:endParaRPr lang="de-AT"/>
           </a:p>
         </p:txBody>
       </p:sp>
     </p:spTree>
     <p:extLst>
       <p:ext uri="{BB962C8B-B14F-4D97-AF65-F5344CB8AC3E}">
-        <p14:creationId xmlns:p14="http://schemas.microsoft.com/office/powerpoint/2010/main" val="2842475990"/>
+        <p14:creationId xmlns:p14="http://schemas.microsoft.com/office/powerpoint/2010/main" val="4082787262"/>
       </p:ext>
     </p:extLst>
   </p:cSld>
@@ -5199,7 +5786,7 @@
           <p:cNvPr id="2" name="Titel 1">
             <a:extLst>
               <a:ext uri="{FF2B5EF4-FFF2-40B4-BE49-F238E27FC236}">
-                <a16:creationId xmlns:a16="http://schemas.microsoft.com/office/drawing/2014/main" id="{E598A848-6A90-634E-F347-3421E1503D22}"/>
+                <a16:creationId xmlns:a16="http://schemas.microsoft.com/office/drawing/2014/main" id="{BB36368B-FAB8-C20B-35F4-757B95A5D4EF}"/>
               </a:ext>
             </a:extLst>
           </p:cNvPr>
@@ -5217,51 +5804,47 @@
           <a:p>
             <a:r>
               <a:rPr lang="de-DE" dirty="0"/>
-              <a:t>Kontakt</a:t>
+              <a:t>Ziel: Urnenwahlergebnis NRW 2024</a:t>
             </a:r>
             <a:endParaRPr lang="de-AT" dirty="0"/>
           </a:p>
         </p:txBody>
       </p:sp>
-      <p:sp>
-        <p:nvSpPr>
-          <p:cNvPr id="3" name="Inhaltsplatzhalter 2">
+      <p:graphicFrame>
+        <p:nvGraphicFramePr>
+          <p:cNvPr id="5" name="Inhaltsplatzhalter 4">
             <a:extLst>
               <a:ext uri="{FF2B5EF4-FFF2-40B4-BE49-F238E27FC236}">
-                <a16:creationId xmlns:a16="http://schemas.microsoft.com/office/drawing/2014/main" id="{1FA04347-D704-73DD-249E-ACCB8AB8D9EB}"/>
+                <a16:creationId xmlns:a16="http://schemas.microsoft.com/office/drawing/2014/main" id="{0B7A5EA3-4E87-D48C-6EF1-E98D90806FEE}"/>
               </a:ext>
             </a:extLst>
           </p:cNvPr>
-          <p:cNvSpPr>
-            <a:spLocks noGrp="1"/>
-          </p:cNvSpPr>
+          <p:cNvGraphicFramePr>
+            <a:graphicFrameLocks noGrp="1"/>
+          </p:cNvGraphicFramePr>
           <p:nvPr>
             <p:ph idx="1"/>
-          </p:nvPr>
-        </p:nvSpPr>
-        <p:spPr/>
-        <p:txBody>
-          <a:bodyPr/>
-          <a:lstStyle/>
-          <a:p>
-            <a:r>
-              <a:rPr lang="de-DE" dirty="0">
-                <a:hlinkClick r:id="rId2"/>
-              </a:rPr>
-              <a:t>clara.himmelbauer@wu.ac.at</a:t>
-            </a:r>
-            <a:r>
-              <a:rPr lang="de-DE" dirty="0"/>
-              <a:t> </a:t>
-            </a:r>
-            <a:endParaRPr lang="de-AT" dirty="0"/>
-          </a:p>
-        </p:txBody>
-      </p:sp>
+            <p:extLst>
+              <p:ext uri="{D42A27DB-BD31-4B8C-83A1-F6EECF244321}">
+                <p14:modId xmlns:p14="http://schemas.microsoft.com/office/powerpoint/2010/main" val="4105898660"/>
+              </p:ext>
+            </p:extLst>
+          </p:nvPr>
+        </p:nvGraphicFramePr>
+        <p:xfrm>
+          <a:off x="1262063" y="1828800"/>
+          <a:ext cx="8594725" cy="4351338"/>
+        </p:xfrm>
+        <a:graphic>
+          <a:graphicData uri="http://schemas.openxmlformats.org/drawingml/2006/chart">
+            <c:chart xmlns:c="http://schemas.openxmlformats.org/drawingml/2006/chart" xmlns:r="http://schemas.openxmlformats.org/officeDocument/2006/relationships" r:id="rId2"/>
+          </a:graphicData>
+        </a:graphic>
+      </p:graphicFrame>
     </p:spTree>
     <p:extLst>
       <p:ext uri="{BB962C8B-B14F-4D97-AF65-F5344CB8AC3E}">
-        <p14:creationId xmlns:p14="http://schemas.microsoft.com/office/powerpoint/2010/main" val="1720390971"/>
+        <p14:creationId xmlns:p14="http://schemas.microsoft.com/office/powerpoint/2010/main" val="4171298435"/>
       </p:ext>
     </p:extLst>
   </p:cSld>
@@ -5272,110 +5855,58 @@
 </file>
 
 <file path=ppt/theme/theme1.xml><?xml version="1.0" encoding="utf-8"?>
-<a:theme xmlns:a="http://schemas.openxmlformats.org/drawingml/2006/main" name="Office">
+<a:theme xmlns:a="http://schemas.openxmlformats.org/drawingml/2006/main" name="Aussicht">
   <a:themeElements>
-    <a:clrScheme name="Office">
+    <a:clrScheme name="Aussicht">
       <a:dk1>
-        <a:sysClr val="windowText" lastClr="000000"/>
+        <a:srgbClr val="000000"/>
       </a:dk1>
       <a:lt1>
-        <a:sysClr val="window" lastClr="FFFFFF"/>
+        <a:srgbClr val="FFFFFF"/>
       </a:lt1>
       <a:dk2>
-        <a:srgbClr val="0E2841"/>
+        <a:srgbClr val="46464A"/>
       </a:dk2>
       <a:lt2>
-        <a:srgbClr val="E8E8E8"/>
+        <a:srgbClr val="D6D3CC"/>
       </a:lt2>
       <a:accent1>
-        <a:srgbClr val="156082"/>
+        <a:srgbClr val="6F6F74"/>
       </a:accent1>
       <a:accent2>
-        <a:srgbClr val="E97132"/>
+        <a:srgbClr val="92A9B9"/>
       </a:accent2>
       <a:accent3>
-        <a:srgbClr val="196B24"/>
+        <a:srgbClr val="A7B789"/>
       </a:accent3>
       <a:accent4>
-        <a:srgbClr val="0F9ED5"/>
+        <a:srgbClr val="B9A489"/>
       </a:accent4>
       <a:accent5>
-        <a:srgbClr val="A02B93"/>
+        <a:srgbClr val="8D6374"/>
       </a:accent5>
       <a:accent6>
-        <a:srgbClr val="4EA72E"/>
+        <a:srgbClr val="9B7362"/>
       </a:accent6>
       <a:hlink>
-        <a:srgbClr val="467886"/>
+        <a:srgbClr val="67AABF"/>
       </a:hlink>
       <a:folHlink>
-        <a:srgbClr val="96607D"/>
+        <a:srgbClr val="ABAFA5"/>
       </a:folHlink>
     </a:clrScheme>
-    <a:fontScheme name="Office">
+    <a:fontScheme name="Aussicht">
       <a:majorFont>
-        <a:latin typeface="Aptos Display" panose="02110004020202020204"/>
+        <a:latin typeface="Century Schoolbook" panose="02040604050505020304"/>
         <a:ea typeface=""/>
         <a:cs typeface=""/>
-        <a:font script="Jpan" typeface="游ゴシック Light"/>
+        <a:font script="Jpan" typeface="ＭＳ ゴシック"/>
         <a:font script="Hang" typeface="맑은 고딕"/>
-        <a:font script="Hans" typeface="等线 Light"/>
+        <a:font script="Hans" typeface="宋体"/>
         <a:font script="Hant" typeface="新細明體"/>
-        <a:font script="Arab" typeface="Times New Roman"/>
-        <a:font script="Hebr" typeface="Times New Roman"/>
-        <a:font script="Thai" typeface="Angsana New"/>
-        <a:font script="Ethi" typeface="Nyala"/>
-        <a:font script="Beng" typeface="Vrinda"/>
-        <a:font script="Gujr" typeface="Shruti"/>
-        <a:font script="Khmr" typeface="MoolBoran"/>
-        <a:font script="Knda" typeface="Tunga"/>
-        <a:font script="Guru" typeface="Raavi"/>
-        <a:font script="Cans" typeface="Euphemia"/>
-        <a:font script="Cher" typeface="Plantagenet Cherokee"/>
-        <a:font script="Yiii" typeface="Microsoft Yi Baiti"/>
-        <a:font script="Tibt" typeface="Microsoft Himalaya"/>
-        <a:font script="Thaa" typeface="MV Boli"/>
-        <a:font script="Deva" typeface="Mangal"/>
-        <a:font script="Telu" typeface="Gautami"/>
-        <a:font script="Taml" typeface="Latha"/>
-        <a:font script="Syrc" typeface="Estrangelo Edessa"/>
-        <a:font script="Orya" typeface="Kalinga"/>
-        <a:font script="Mlym" typeface="Kartika"/>
-        <a:font script="Laoo" typeface="DokChampa"/>
-        <a:font script="Sinh" typeface="Iskoola Pota"/>
-        <a:font script="Mong" typeface="Mongolian Baiti"/>
-        <a:font script="Viet" typeface="Times New Roman"/>
-        <a:font script="Uigh" typeface="Microsoft Uighur"/>
-        <a:font script="Geor" typeface="Sylfaen"/>
-        <a:font script="Armn" typeface="Arial"/>
-        <a:font script="Bugi" typeface="Leelawadee UI"/>
-        <a:font script="Bopo" typeface="Microsoft JhengHei"/>
-        <a:font script="Java" typeface="Javanese Text"/>
-        <a:font script="Lisu" typeface="Segoe UI"/>
-        <a:font script="Mymr" typeface="Myanmar Text"/>
-        <a:font script="Nkoo" typeface="Ebrima"/>
-        <a:font script="Olck" typeface="Nirmala UI"/>
-        <a:font script="Osma" typeface="Ebrima"/>
-        <a:font script="Phag" typeface="Phagspa"/>
-        <a:font script="Syrn" typeface="Estrangelo Edessa"/>
-        <a:font script="Syrj" typeface="Estrangelo Edessa"/>
-        <a:font script="Syre" typeface="Estrangelo Edessa"/>
-        <a:font script="Sora" typeface="Nirmala UI"/>
-        <a:font script="Tale" typeface="Microsoft Tai Le"/>
-        <a:font script="Talu" typeface="Microsoft New Tai Lue"/>
-        <a:font script="Tfng" typeface="Ebrima"/>
-      </a:majorFont>
-      <a:minorFont>
-        <a:latin typeface="Aptos" panose="02110004020202020204"/>
-        <a:ea typeface=""/>
-        <a:cs typeface=""/>
-        <a:font script="Jpan" typeface="游ゴシック"/>
-        <a:font script="Hang" typeface="맑은 고딕"/>
-        <a:font script="Hans" typeface="等线"/>
-        <a:font script="Hant" typeface="新細明體"/>
-        <a:font script="Arab" typeface="Arial"/>
-        <a:font script="Hebr" typeface="Arial"/>
-        <a:font script="Thai" typeface="Cordia New"/>
+        <a:font script="Arab" typeface="Tahoma"/>
+        <a:font script="Hebr" typeface="Gisha"/>
+        <a:font script="Thai" typeface="DilleniaUPC"/>
         <a:font script="Ethi" typeface="Nyala"/>
         <a:font script="Beng" typeface="Vrinda"/>
         <a:font script="Gujr" typeface="Shruti"/>
@@ -5396,107 +5927,86 @@
         <a:font script="Laoo" typeface="DokChampa"/>
         <a:font script="Sinh" typeface="Iskoola Pota"/>
         <a:font script="Mong" typeface="Mongolian Baiti"/>
-        <a:font script="Viet" typeface="Arial"/>
+        <a:font script="Viet" typeface="Tahoma"/>
         <a:font script="Uigh" typeface="Microsoft Uighur"/>
         <a:font script="Geor" typeface="Sylfaen"/>
-        <a:font script="Armn" typeface="Arial"/>
-        <a:font script="Bugi" typeface="Leelawadee UI"/>
-        <a:font script="Bopo" typeface="Microsoft JhengHei"/>
-        <a:font script="Java" typeface="Javanese Text"/>
-        <a:font script="Lisu" typeface="Segoe UI"/>
-        <a:font script="Mymr" typeface="Myanmar Text"/>
-        <a:font script="Nkoo" typeface="Ebrima"/>
-        <a:font script="Olck" typeface="Nirmala UI"/>
-        <a:font script="Osma" typeface="Ebrima"/>
-        <a:font script="Phag" typeface="Phagspa"/>
-        <a:font script="Syrn" typeface="Estrangelo Edessa"/>
-        <a:font script="Syrj" typeface="Estrangelo Edessa"/>
-        <a:font script="Syre" typeface="Estrangelo Edessa"/>
-        <a:font script="Sora" typeface="Nirmala UI"/>
-        <a:font script="Tale" typeface="Microsoft Tai Le"/>
-        <a:font script="Talu" typeface="Microsoft New Tai Lue"/>
-        <a:font script="Tfng" typeface="Ebrima"/>
+      </a:majorFont>
+      <a:minorFont>
+        <a:latin typeface="Century Schoolbook" panose="02040604050505020304"/>
+        <a:ea typeface=""/>
+        <a:cs typeface=""/>
+        <a:font script="Jpan" typeface="ＭＳ ゴシック"/>
+        <a:font script="Hang" typeface="맑은 고딕"/>
+        <a:font script="Hans" typeface="宋体"/>
+        <a:font script="Hant" typeface="新細明體"/>
+        <a:font script="Arab" typeface="Tahoma"/>
+        <a:font script="Hebr" typeface="Gisha"/>
+        <a:font script="Thai" typeface="DilleniaUPC"/>
+        <a:font script="Ethi" typeface="Nyala"/>
+        <a:font script="Beng" typeface="Vrinda"/>
+        <a:font script="Gujr" typeface="Shruti"/>
+        <a:font script="Khmr" typeface="DaunPenh"/>
+        <a:font script="Knda" typeface="Tunga"/>
+        <a:font script="Guru" typeface="Raavi"/>
+        <a:font script="Cans" typeface="Euphemia"/>
+        <a:font script="Cher" typeface="Plantagenet Cherokee"/>
+        <a:font script="Yiii" typeface="Microsoft Yi Baiti"/>
+        <a:font script="Tibt" typeface="Microsoft Himalaya"/>
+        <a:font script="Thaa" typeface="MV Boli"/>
+        <a:font script="Deva" typeface="Mangal"/>
+        <a:font script="Telu" typeface="Gautami"/>
+        <a:font script="Taml" typeface="Latha"/>
+        <a:font script="Syrc" typeface="Estrangelo Edessa"/>
+        <a:font script="Orya" typeface="Kalinga"/>
+        <a:font script="Mlym" typeface="Kartika"/>
+        <a:font script="Laoo" typeface="DokChampa"/>
+        <a:font script="Sinh" typeface="Iskoola Pota"/>
+        <a:font script="Mong" typeface="Mongolian Baiti"/>
+        <a:font script="Viet" typeface="Verdana"/>
+        <a:font script="Uigh" typeface="Microsoft Uighur"/>
+        <a:font script="Geor" typeface="Sylfaen"/>
       </a:minorFont>
     </a:fontScheme>
-    <a:fmtScheme name="Office">
+    <a:fmtScheme name="Aussicht">
       <a:fillStyleLst>
         <a:solidFill>
           <a:schemeClr val="phClr"/>
         </a:solidFill>
-        <a:gradFill rotWithShape="1">
-          <a:gsLst>
-            <a:gs pos="0">
-              <a:schemeClr val="phClr">
-                <a:lumMod val="110000"/>
-                <a:satMod val="105000"/>
-                <a:tint val="67000"/>
-              </a:schemeClr>
-            </a:gs>
-            <a:gs pos="50000">
-              <a:schemeClr val="phClr">
-                <a:lumMod val="105000"/>
-                <a:satMod val="103000"/>
-                <a:tint val="73000"/>
-              </a:schemeClr>
-            </a:gs>
-            <a:gs pos="100000">
-              <a:schemeClr val="phClr">
-                <a:lumMod val="105000"/>
-                <a:satMod val="109000"/>
-                <a:tint val="81000"/>
-              </a:schemeClr>
-            </a:gs>
-          </a:gsLst>
-          <a:lin ang="5400000" scaled="0"/>
-        </a:gradFill>
-        <a:gradFill rotWithShape="1">
-          <a:gsLst>
-            <a:gs pos="0">
-              <a:schemeClr val="phClr">
-                <a:satMod val="103000"/>
-                <a:lumMod val="102000"/>
-                <a:tint val="94000"/>
-              </a:schemeClr>
-            </a:gs>
-            <a:gs pos="50000">
-              <a:schemeClr val="phClr">
-                <a:satMod val="110000"/>
-                <a:lumMod val="100000"/>
-                <a:shade val="100000"/>
-              </a:schemeClr>
-            </a:gs>
-            <a:gs pos="100000">
-              <a:schemeClr val="phClr">
-                <a:lumMod val="99000"/>
-                <a:satMod val="120000"/>
-                <a:shade val="78000"/>
-              </a:schemeClr>
-            </a:gs>
-          </a:gsLst>
-          <a:lin ang="5400000" scaled="0"/>
-        </a:gradFill>
+        <a:solidFill>
+          <a:schemeClr val="phClr">
+            <a:tint val="60000"/>
+            <a:satMod val="120000"/>
+          </a:schemeClr>
+        </a:solidFill>
+        <a:solidFill>
+          <a:schemeClr val="phClr">
+            <a:shade val="75000"/>
+            <a:satMod val="160000"/>
+          </a:schemeClr>
+        </a:solidFill>
       </a:fillStyleLst>
       <a:lnStyleLst>
-        <a:ln w="12700" cap="flat" cmpd="sng" algn="ctr">
+        <a:ln w="9525" cap="flat" cmpd="sng" algn="ctr">
           <a:solidFill>
             <a:schemeClr val="phClr"/>
           </a:solidFill>
           <a:prstDash val="solid"/>
-          <a:miter lim="800000"/>
         </a:ln>
-        <a:ln w="19050" cap="flat" cmpd="sng" algn="ctr">
+        <a:ln w="13970" cap="flat" cmpd="sng" algn="ctr">
           <a:solidFill>
             <a:schemeClr val="phClr"/>
           </a:solidFill>
           <a:prstDash val="solid"/>
-          <a:miter lim="800000"/>
         </a:ln>
-        <a:ln w="25400" cap="flat" cmpd="sng" algn="ctr">
+        <a:ln w="17145" cap="flat" cmpd="sng" algn="ctr">
           <a:solidFill>
-            <a:schemeClr val="phClr"/>
+            <a:schemeClr val="phClr">
+              <a:shade val="95000"/>
+              <a:alpha val="95000"/>
+              <a:satMod val="150000"/>
+            </a:schemeClr>
           </a:solidFill>
           <a:prstDash val="solid"/>
-          <a:miter lim="800000"/>
         </a:ln>
       </a:lnStyleLst>
       <a:effectStyleLst>
@@ -5504,16 +6014,52 @@
           <a:effectLst/>
         </a:effectStyle>
         <a:effectStyle>
-          <a:effectLst/>
+          <a:effectLst>
+            <a:outerShdw blurRad="50800" dist="15240" dir="5400000" algn="tl" rotWithShape="0">
+              <a:srgbClr val="000000">
+                <a:alpha val="75000"/>
+              </a:srgbClr>
+            </a:outerShdw>
+          </a:effectLst>
+          <a:scene3d>
+            <a:camera prst="orthographicFront">
+              <a:rot lat="0" lon="0" rev="0"/>
+            </a:camera>
+            <a:lightRig rig="brightRoom" dir="tl"/>
+          </a:scene3d>
+          <a:sp3d contourW="9525" prstMaterial="flat">
+            <a:bevelT w="0" h="0" prst="coolSlant"/>
+            <a:contourClr>
+              <a:schemeClr val="phClr">
+                <a:shade val="35000"/>
+                <a:satMod val="130000"/>
+              </a:schemeClr>
+            </a:contourClr>
+          </a:sp3d>
         </a:effectStyle>
         <a:effectStyle>
           <a:effectLst>
-            <a:outerShdw blurRad="57150" dist="19050" dir="5400000" algn="ctr" rotWithShape="0">
+            <a:outerShdw blurRad="76200" dist="25400" dir="5400000" algn="tl" rotWithShape="0">
               <a:srgbClr val="000000">
-                <a:alpha val="63000"/>
+                <a:alpha val="55000"/>
               </a:srgbClr>
             </a:outerShdw>
           </a:effectLst>
+          <a:scene3d>
+            <a:camera prst="orthographicFront">
+              <a:rot lat="0" lon="0" rev="0"/>
+            </a:camera>
+            <a:lightRig rig="brightRoom" dir="tl"/>
+          </a:scene3d>
+          <a:sp3d contourW="19050" prstMaterial="flat">
+            <a:bevelT w="0" h="0" prst="coolSlant"/>
+            <a:contourClr>
+              <a:schemeClr val="phClr">
+                <a:shade val="25000"/>
+                <a:satMod val="140000"/>
+              </a:schemeClr>
+            </a:contourClr>
+          </a:sp3d>
         </a:effectStyle>
       </a:effectStyleLst>
       <a:bgFillStyleLst>
@@ -5530,57 +6076,32 @@
           <a:gsLst>
             <a:gs pos="0">
               <a:schemeClr val="phClr">
-                <a:tint val="93000"/>
-                <a:satMod val="150000"/>
+                <a:tint val="94000"/>
                 <a:shade val="98000"/>
+                <a:satMod val="130000"/>
                 <a:lumMod val="102000"/>
-              </a:schemeClr>
-            </a:gs>
-            <a:gs pos="50000">
-              <a:schemeClr val="phClr">
-                <a:tint val="98000"/>
-                <a:satMod val="130000"/>
-                <a:shade val="90000"/>
-                <a:lumMod val="103000"/>
               </a:schemeClr>
             </a:gs>
             <a:gs pos="100000">
               <a:schemeClr val="phClr">
-                <a:shade val="63000"/>
-                <a:satMod val="120000"/>
+                <a:tint val="98000"/>
+                <a:shade val="78000"/>
+                <a:satMod val="140000"/>
               </a:schemeClr>
             </a:gs>
           </a:gsLst>
-          <a:lin ang="5400000" scaled="0"/>
+          <a:path path="circle">
+            <a:fillToRect l="100000" t="100000" r="100000" b="100000"/>
+          </a:path>
         </a:gradFill>
       </a:bgFillStyleLst>
     </a:fmtScheme>
   </a:themeElements>
-  <a:objectDefaults>
-    <a:lnDef>
-      <a:spPr/>
-      <a:bodyPr/>
-      <a:lstStyle/>
-      <a:style>
-        <a:lnRef idx="2">
-          <a:schemeClr val="accent1"/>
-        </a:lnRef>
-        <a:fillRef idx="0">
-          <a:schemeClr val="accent1"/>
-        </a:fillRef>
-        <a:effectRef idx="1">
-          <a:schemeClr val="accent1"/>
-        </a:effectRef>
-        <a:fontRef idx="minor">
-          <a:schemeClr val="tx1"/>
-        </a:fontRef>
-      </a:style>
-    </a:lnDef>
-  </a:objectDefaults>
+  <a:objectDefaults/>
   <a:extraClrSchemeLst/>
   <a:extLst>
     <a:ext uri="{05A4C25C-085E-4340-85A3-A5531E510DB2}">
-      <thm15:themeFamily xmlns:thm15="http://schemas.microsoft.com/office/thememl/2012/main" name="Office Theme" id="{2E142A2C-CD16-42D6-873A-C26D2A0506FA}" vid="{1BDDFF52-6CD6-40A5-AB3C-68EB2F1E4D0A}"/>
+      <thm15:themeFamily xmlns:thm15="http://schemas.microsoft.com/office/thememl/2012/main" name="View" id="{BA0EB5A6-F2D4-4F82-977B-64ADEE4A2A69}" vid="{3969A8A2-35DB-4E3B-8885-16FD20568674}"/>
     </a:ext>
   </a:extLst>
 </a:theme>

</xml_diff>